<commit_message>
slide no str auto conversion
</commit_message>
<xml_diff>
--- a/ipsa/slides/operations.pptx
+++ b/ipsa/slides/operations.pptx
@@ -5,7 +5,7 @@
     <p:sldMasterId id="2147483648" r:id="rId1"/>
   </p:sldMasterIdLst>
   <p:notesMasterIdLst>
-    <p:notesMasterId r:id="rId29"/>
+    <p:notesMasterId r:id="rId30"/>
   </p:notesMasterIdLst>
   <p:sldIdLst>
     <p:sldId id="345" r:id="rId2"/>
@@ -27,14 +27,15 @@
     <p:sldId id="438" r:id="rId18"/>
     <p:sldId id="286" r:id="rId19"/>
     <p:sldId id="363" r:id="rId20"/>
-    <p:sldId id="392" r:id="rId21"/>
-    <p:sldId id="445" r:id="rId22"/>
-    <p:sldId id="439" r:id="rId23"/>
-    <p:sldId id="440" r:id="rId24"/>
-    <p:sldId id="285" r:id="rId25"/>
-    <p:sldId id="444" r:id="rId26"/>
-    <p:sldId id="391" r:id="rId27"/>
-    <p:sldId id="443" r:id="rId28"/>
+    <p:sldId id="446" r:id="rId21"/>
+    <p:sldId id="392" r:id="rId22"/>
+    <p:sldId id="445" r:id="rId23"/>
+    <p:sldId id="439" r:id="rId24"/>
+    <p:sldId id="440" r:id="rId25"/>
+    <p:sldId id="285" r:id="rId26"/>
+    <p:sldId id="444" r:id="rId27"/>
+    <p:sldId id="391" r:id="rId28"/>
+    <p:sldId id="443" r:id="rId29"/>
   </p:sldIdLst>
   <p:sldSz cx="12192000" cy="6858000"/>
   <p:notesSz cx="6858000" cy="9144000"/>
@@ -144,7 +145,7 @@
 <file path=ppt/revisionInfo.xml><?xml version="1.0" encoding="utf-8"?>
 <p1510:revInfo xmlns:a="http://schemas.openxmlformats.org/drawingml/2006/main" xmlns:r="http://schemas.openxmlformats.org/officeDocument/2006/relationships" xmlns:p1510="http://schemas.microsoft.com/office/powerpoint/2015/10/main">
   <p1510:revLst>
-    <p1510:client id="{8AE5BBAC-1693-454B-B98D-382185C4CDAF}" v="32" dt="2023-02-04T11:05:44.194"/>
+    <p1510:client id="{56F465E5-64FD-4F2A-935D-395061FAD986}" v="67" dt="2024-02-04T19:35:03.751"/>
   </p1510:revLst>
 </p1510:revInfo>
 </file>
@@ -407,6 +408,115 @@
     </pc:docChg>
   </pc:docChgLst>
   <pc:docChgLst>
+    <pc:chgData name="Gerth Stølting Brodal" userId="04ef4784-6591-4f86-a140-f5c3b108582a" providerId="ADAL" clId="{56F465E5-64FD-4F2A-935D-395061FAD986}"/>
+    <pc:docChg chg="undo redo custSel addSld modSld">
+      <pc:chgData name="Gerth Stølting Brodal" userId="04ef4784-6591-4f86-a140-f5c3b108582a" providerId="ADAL" clId="{56F465E5-64FD-4F2A-935D-395061FAD986}" dt="2024-02-04T19:35:03.751" v="670" actId="20577"/>
+      <pc:docMkLst>
+        <pc:docMk/>
+      </pc:docMkLst>
+      <pc:sldChg chg="modSp mod modNotesTx">
+        <pc:chgData name="Gerth Stølting Brodal" userId="04ef4784-6591-4f86-a140-f5c3b108582a" providerId="ADAL" clId="{56F465E5-64FD-4F2A-935D-395061FAD986}" dt="2024-02-04T19:34:30.157" v="663" actId="313"/>
+        <pc:sldMkLst>
+          <pc:docMk/>
+          <pc:sldMk cId="2761965666" sldId="363"/>
+        </pc:sldMkLst>
+        <pc:spChg chg="mod">
+          <ac:chgData name="Gerth Stølting Brodal" userId="04ef4784-6591-4f86-a140-f5c3b108582a" providerId="ADAL" clId="{56F465E5-64FD-4F2A-935D-395061FAD986}" dt="2024-02-04T18:51:08.656" v="12" actId="6549"/>
+          <ac:spMkLst>
+            <pc:docMk/>
+            <pc:sldMk cId="2761965666" sldId="363"/>
+            <ac:spMk id="9" creationId="{00000000-0000-0000-0000-000000000000}"/>
+          </ac:spMkLst>
+        </pc:spChg>
+        <pc:graphicFrameChg chg="modGraphic">
+          <ac:chgData name="Gerth Stølting Brodal" userId="04ef4784-6591-4f86-a140-f5c3b108582a" providerId="ADAL" clId="{56F465E5-64FD-4F2A-935D-395061FAD986}" dt="2024-02-04T19:34:30.157" v="663" actId="313"/>
+          <ac:graphicFrameMkLst>
+            <pc:docMk/>
+            <pc:sldMk cId="2761965666" sldId="363"/>
+            <ac:graphicFrameMk id="8" creationId="{00000000-0000-0000-0000-000000000000}"/>
+          </ac:graphicFrameMkLst>
+        </pc:graphicFrameChg>
+      </pc:sldChg>
+      <pc:sldChg chg="modSp mod">
+        <pc:chgData name="Gerth Stølting Brodal" userId="04ef4784-6591-4f86-a140-f5c3b108582a" providerId="ADAL" clId="{56F465E5-64FD-4F2A-935D-395061FAD986}" dt="2024-02-04T18:47:10.141" v="10" actId="20577"/>
+        <pc:sldMkLst>
+          <pc:docMk/>
+          <pc:sldMk cId="3808754555" sldId="372"/>
+        </pc:sldMkLst>
+        <pc:spChg chg="mod">
+          <ac:chgData name="Gerth Stølting Brodal" userId="04ef4784-6591-4f86-a140-f5c3b108582a" providerId="ADAL" clId="{56F465E5-64FD-4F2A-935D-395061FAD986}" dt="2024-02-04T18:47:10.141" v="10" actId="20577"/>
+          <ac:spMkLst>
+            <pc:docMk/>
+            <pc:sldMk cId="3808754555" sldId="372"/>
+            <ac:spMk id="3" creationId="{00000000-0000-0000-0000-000000000000}"/>
+          </ac:spMkLst>
+        </pc:spChg>
+      </pc:sldChg>
+      <pc:sldChg chg="modSp mod">
+        <pc:chgData name="Gerth Stølting Brodal" userId="04ef4784-6591-4f86-a140-f5c3b108582a" providerId="ADAL" clId="{56F465E5-64FD-4F2A-935D-395061FAD986}" dt="2024-02-02T12:05:25.839" v="3" actId="6549"/>
+        <pc:sldMkLst>
+          <pc:docMk/>
+          <pc:sldMk cId="4003465609" sldId="445"/>
+        </pc:sldMkLst>
+        <pc:graphicFrameChg chg="modGraphic">
+          <ac:chgData name="Gerth Stølting Brodal" userId="04ef4784-6591-4f86-a140-f5c3b108582a" providerId="ADAL" clId="{56F465E5-64FD-4F2A-935D-395061FAD986}" dt="2024-02-02T12:05:25.839" v="3" actId="6549"/>
+          <ac:graphicFrameMkLst>
+            <pc:docMk/>
+            <pc:sldMk cId="4003465609" sldId="445"/>
+            <ac:graphicFrameMk id="6" creationId="{16A6ED07-F050-B0E1-8313-E3A78881EFE5}"/>
+          </ac:graphicFrameMkLst>
+        </pc:graphicFrameChg>
+      </pc:sldChg>
+      <pc:sldChg chg="addSp modSp new mod modAnim modNotesTx">
+        <pc:chgData name="Gerth Stølting Brodal" userId="04ef4784-6591-4f86-a140-f5c3b108582a" providerId="ADAL" clId="{56F465E5-64FD-4F2A-935D-395061FAD986}" dt="2024-02-04T19:35:03.751" v="670" actId="20577"/>
+        <pc:sldMkLst>
+          <pc:docMk/>
+          <pc:sldMk cId="4179547408" sldId="446"/>
+        </pc:sldMkLst>
+        <pc:spChg chg="mod">
+          <ac:chgData name="Gerth Stølting Brodal" userId="04ef4784-6591-4f86-a140-f5c3b108582a" providerId="ADAL" clId="{56F465E5-64FD-4F2A-935D-395061FAD986}" dt="2024-02-04T19:21:02.270" v="635" actId="20577"/>
+          <ac:spMkLst>
+            <pc:docMk/>
+            <pc:sldMk cId="4179547408" sldId="446"/>
+            <ac:spMk id="2" creationId="{19AE9108-3205-9EB6-BEF3-A32540F39AFC}"/>
+          </ac:spMkLst>
+        </pc:spChg>
+        <pc:spChg chg="mod">
+          <ac:chgData name="Gerth Stølting Brodal" userId="04ef4784-6591-4f86-a140-f5c3b108582a" providerId="ADAL" clId="{56F465E5-64FD-4F2A-935D-395061FAD986}" dt="2024-02-04T19:35:03.751" v="670" actId="20577"/>
+          <ac:spMkLst>
+            <pc:docMk/>
+            <pc:sldMk cId="4179547408" sldId="446"/>
+            <ac:spMk id="3" creationId="{B961D846-31C1-1F84-A347-4978C8C5E7FE}"/>
+          </ac:spMkLst>
+        </pc:spChg>
+        <pc:spChg chg="add mod">
+          <ac:chgData name="Gerth Stølting Brodal" userId="04ef4784-6591-4f86-a140-f5c3b108582a" providerId="ADAL" clId="{56F465E5-64FD-4F2A-935D-395061FAD986}" dt="2024-02-04T19:23:27.896" v="659" actId="1076"/>
+          <ac:spMkLst>
+            <pc:docMk/>
+            <pc:sldMk cId="4179547408" sldId="446"/>
+            <ac:spMk id="5" creationId="{DE1A517F-9AE3-9B0A-52FF-B625F2865B8B}"/>
+          </ac:spMkLst>
+        </pc:spChg>
+        <pc:graphicFrameChg chg="add mod modGraphic">
+          <ac:chgData name="Gerth Stølting Brodal" userId="04ef4784-6591-4f86-a140-f5c3b108582a" providerId="ADAL" clId="{56F465E5-64FD-4F2A-935D-395061FAD986}" dt="2024-02-04T19:23:27.896" v="659" actId="1076"/>
+          <ac:graphicFrameMkLst>
+            <pc:docMk/>
+            <pc:sldMk cId="4179547408" sldId="446"/>
+            <ac:graphicFrameMk id="4" creationId="{EE6745CC-789B-67DC-601B-568E63AF1905}"/>
+          </ac:graphicFrameMkLst>
+        </pc:graphicFrameChg>
+        <pc:picChg chg="add mod">
+          <ac:chgData name="Gerth Stølting Brodal" userId="04ef4784-6591-4f86-a140-f5c3b108582a" providerId="ADAL" clId="{56F465E5-64FD-4F2A-935D-395061FAD986}" dt="2024-02-04T19:21:53.829" v="642" actId="1076"/>
+          <ac:picMkLst>
+            <pc:docMk/>
+            <pc:sldMk cId="4179547408" sldId="446"/>
+            <ac:picMk id="6" creationId="{BC49D55E-DBEF-D87D-C77B-BA8A9E026885}"/>
+          </ac:picMkLst>
+        </pc:picChg>
+      </pc:sldChg>
+    </pc:docChg>
+  </pc:docChgLst>
+  <pc:docChgLst>
     <pc:chgData name="Gerth Stølting Brodal" userId="04ef4784-6591-4f86-a140-f5c3b108582a" providerId="ADAL" clId="{172B73B0-B8C1-4702-9D4D-C752051A4849}"/>
     <pc:docChg chg="custSel modSld">
       <pc:chgData name="Gerth Stølting Brodal" userId="04ef4784-6591-4f86-a140-f5c3b108582a" providerId="ADAL" clId="{172B73B0-B8C1-4702-9D4D-C752051A4849}" dt="2022-04-07T17:48:48.997" v="202" actId="20577"/>
@@ -555,7 +665,7 @@
           <a:p>
             <a:fld id="{FB1A172F-81D4-4DC4-9113-1DBD56EC3646}" type="datetimeFigureOut">
               <a:rPr lang="en-US" smtClean="0"/>
-              <a:t>2/8/2023</a:t>
+              <a:t>2/4/2024</a:t>
             </a:fld>
             <a:endParaRPr lang="en-US"/>
           </a:p>
@@ -984,6 +1094,132 @@
           <a:bodyPr/>
           <a:lstStyle/>
           <a:p>
+            <a:r>
+              <a:rPr lang="en-US" dirty="0"/>
+              <a:t>is,</a:t>
+            </a:r>
+            <a:r>
+              <a:rPr lang="en-US" baseline="0" dirty="0"/>
+              <a:t> is not ...</a:t>
+            </a:r>
+          </a:p>
+          <a:p>
+            <a:r>
+              <a:rPr lang="en-US" baseline="0" dirty="0"/>
+              <a:t>in, not in ... </a:t>
+            </a:r>
+            <a:endParaRPr lang="en-US" dirty="0"/>
+          </a:p>
+          <a:p>
+            <a:r>
+              <a:rPr lang="en-US" dirty="0"/>
+              <a:t>@ matrix multiplication (for</a:t>
+            </a:r>
+            <a:r>
+              <a:rPr lang="en-US" baseline="0" dirty="0"/>
+              <a:t> </a:t>
+            </a:r>
+            <a:r>
+              <a:rPr lang="en-US" baseline="0" dirty="0" err="1"/>
+              <a:t>numpy</a:t>
+            </a:r>
+            <a:r>
+              <a:rPr lang="en-US" baseline="0" dirty="0"/>
+              <a:t>)</a:t>
+            </a:r>
+            <a:endParaRPr lang="en-US" dirty="0"/>
+          </a:p>
+          <a:p>
+            <a:endParaRPr lang="en-US" dirty="0"/>
+          </a:p>
+          <a:p>
+            <a:r>
+              <a:rPr lang="en-US" dirty="0"/>
+              <a:t>https://docs.python.org/3/reference/expressions.html#summary</a:t>
+            </a:r>
+          </a:p>
+        </p:txBody>
+      </p:sp>
+      <p:sp>
+        <p:nvSpPr>
+          <p:cNvPr id="4" name="Slide Number Placeholder 3"/>
+          <p:cNvSpPr>
+            <a:spLocks noGrp="1"/>
+          </p:cNvSpPr>
+          <p:nvPr>
+            <p:ph type="sldNum" sz="quarter" idx="10"/>
+          </p:nvPr>
+        </p:nvSpPr>
+        <p:spPr/>
+        <p:txBody>
+          <a:bodyPr/>
+          <a:lstStyle/>
+          <a:p>
+            <a:fld id="{CD563DD8-32AB-41BE-B1C6-8EAC45222ACE}" type="slidenum">
+              <a:rPr lang="en-US" smtClean="0"/>
+              <a:t>25</a:t>
+            </a:fld>
+            <a:endParaRPr lang="en-US"/>
+          </a:p>
+        </p:txBody>
+      </p:sp>
+    </p:spTree>
+    <p:extLst>
+      <p:ext uri="{BB962C8B-B14F-4D97-AF65-F5344CB8AC3E}">
+        <p14:creationId xmlns:p14="http://schemas.microsoft.com/office/powerpoint/2010/main" val="1288328173"/>
+      </p:ext>
+    </p:extLst>
+  </p:cSld>
+  <p:clrMapOvr>
+    <a:masterClrMapping/>
+  </p:clrMapOvr>
+</p:notes>
+</file>
+
+<file path=ppt/notesSlides/notesSlide11.xml><?xml version="1.0" encoding="utf-8"?>
+<p:notes xmlns:a="http://schemas.openxmlformats.org/drawingml/2006/main" xmlns:r="http://schemas.openxmlformats.org/officeDocument/2006/relationships" xmlns:p="http://schemas.openxmlformats.org/presentationml/2006/main">
+  <p:cSld>
+    <p:spTree>
+      <p:nvGrpSpPr>
+        <p:cNvPr id="1" name=""/>
+        <p:cNvGrpSpPr/>
+        <p:nvPr/>
+      </p:nvGrpSpPr>
+      <p:grpSpPr>
+        <a:xfrm>
+          <a:off x="0" y="0"/>
+          <a:ext cx="0" cy="0"/>
+          <a:chOff x="0" y="0"/>
+          <a:chExt cx="0" cy="0"/>
+        </a:xfrm>
+      </p:grpSpPr>
+      <p:sp>
+        <p:nvSpPr>
+          <p:cNvPr id="2" name="Slide Image Placeholder 1"/>
+          <p:cNvSpPr>
+            <a:spLocks noGrp="1" noRot="1" noChangeAspect="1"/>
+          </p:cNvSpPr>
+          <p:nvPr>
+            <p:ph type="sldImg"/>
+          </p:nvPr>
+        </p:nvSpPr>
+        <p:spPr/>
+      </p:sp>
+      <p:sp>
+        <p:nvSpPr>
+          <p:cNvPr id="3" name="Notes Placeholder 2"/>
+          <p:cNvSpPr>
+            <a:spLocks noGrp="1"/>
+          </p:cNvSpPr>
+          <p:nvPr>
+            <p:ph type="body" idx="1"/>
+          </p:nvPr>
+        </p:nvSpPr>
+        <p:spPr/>
+        <p:txBody>
+          <a:bodyPr/>
+          <a:lstStyle/>
+          <a:p>
             <a:pPr marL="0" marR="0" lvl="0" indent="0" algn="l" defTabSz="914400" rtl="0" eaLnBrk="1" fontAlgn="auto" latinLnBrk="0" hangingPunct="1">
               <a:lnSpc>
                 <a:spcPct val="100000"/>
@@ -1053,7 +1289,7 @@
           <a:p>
             <a:fld id="{CD563DD8-32AB-41BE-B1C6-8EAC45222ACE}" type="slidenum">
               <a:rPr lang="en-US" smtClean="0"/>
-              <a:t>27</a:t>
+              <a:t>28</a:t>
             </a:fld>
             <a:endParaRPr lang="en-US"/>
           </a:p>
@@ -1633,16 +1869,57 @@
           <a:p>
             <a:r>
               <a:rPr lang="da-DK" dirty="0"/>
-              <a:t>f'et tal </a:t>
-            </a:r>
-            <a:r>
-              <a:rPr lang="da-DK"/>
-              <a:t>{1/3 = :.{</a:t>
-            </a:r>
+              <a:t>f'et tal {1/3 = :.{decimaler}}’</a:t>
+            </a:r>
+          </a:p>
+          <a:p>
             <a:r>
               <a:rPr lang="da-DK" dirty="0"/>
-              <a:t>decimaler}}'</a:t>
-            </a:r>
+              <a:t>.format </a:t>
+            </a:r>
+            <a:r>
+              <a:rPr lang="da-DK" dirty="0" err="1"/>
+              <a:t>useful</a:t>
+            </a:r>
+            <a:r>
+              <a:rPr lang="da-DK" dirty="0"/>
+              <a:t> </a:t>
+            </a:r>
+            <a:r>
+              <a:rPr lang="da-DK" dirty="0" err="1"/>
+              <a:t>when</a:t>
+            </a:r>
+            <a:r>
+              <a:rPr lang="da-DK" dirty="0"/>
+              <a:t> same </a:t>
+            </a:r>
+            <a:r>
+              <a:rPr lang="da-DK" dirty="0" err="1"/>
+              <a:t>value</a:t>
+            </a:r>
+            <a:r>
+              <a:rPr lang="da-DK" dirty="0"/>
+              <a:t> has to </a:t>
+            </a:r>
+            <a:r>
+              <a:rPr lang="da-DK" dirty="0" err="1"/>
+              <a:t>be</a:t>
+            </a:r>
+            <a:r>
+              <a:rPr lang="da-DK" dirty="0"/>
+              <a:t> </a:t>
+            </a:r>
+            <a:r>
+              <a:rPr lang="da-DK" dirty="0" err="1"/>
+              <a:t>inserted</a:t>
+            </a:r>
+            <a:r>
+              <a:rPr lang="da-DK" dirty="0"/>
+              <a:t> multiple times: '{1} {1} {0}'.format('abc', 42)</a:t>
+            </a:r>
+          </a:p>
+          <a:p>
+            <a:endParaRPr lang="da-DK" dirty="0"/>
           </a:p>
           <a:p>
             <a:endParaRPr lang="da-DK" dirty="0"/>
@@ -1729,44 +2006,43 @@
           <a:bodyPr/>
           <a:lstStyle/>
           <a:p>
-            <a:pPr marL="0" marR="0" lvl="0" indent="0" algn="l" defTabSz="914400" rtl="0" eaLnBrk="1" fontAlgn="auto" latinLnBrk="0" hangingPunct="1">
-              <a:lnSpc>
-                <a:spcPct val="100000"/>
-              </a:lnSpc>
-              <a:spcBef>
-                <a:spcPts val="0"/>
-              </a:spcBef>
-              <a:spcAft>
-                <a:spcPts val="0"/>
-              </a:spcAft>
-              <a:buClrTx/>
-              <a:buSzTx/>
-              <a:buFontTx/>
-              <a:buNone/>
-              <a:tabLst/>
-              <a:defRPr/>
-            </a:pPr>
-            <a:r>
-              <a:rPr lang="en-US" dirty="0">
-                <a:latin typeface="Courier"/>
-              </a:rPr>
-              <a:t>for i in range(256): print(i, "'" + </a:t>
-            </a:r>
-            <a:r>
-              <a:rPr lang="en-US" dirty="0" err="1">
-                <a:latin typeface="Courier"/>
-              </a:rPr>
-              <a:t>chr</a:t>
-            </a:r>
-            <a:r>
-              <a:rPr lang="en-US" dirty="0">
-                <a:latin typeface="Courier"/>
-              </a:rPr>
-              <a:t>(i) + "'")</a:t>
-            </a:r>
-          </a:p>
-          <a:p>
-            <a:endParaRPr lang="en-US" dirty="0"/>
+            <a:r>
+              <a:rPr lang="da-DK" dirty="0" err="1"/>
+              <a:t>Javascript</a:t>
+            </a:r>
+            <a:r>
+              <a:rPr lang="da-DK" dirty="0"/>
+              <a:t> </a:t>
+            </a:r>
+            <a:r>
+              <a:rPr lang="da-DK" dirty="0" err="1"/>
+              <a:t>example</a:t>
+            </a:r>
+            <a:r>
+              <a:rPr lang="da-DK" dirty="0"/>
+              <a:t>: Open Google Chrome + F12 + Console: ‘abc’ + 42</a:t>
+            </a:r>
+          </a:p>
+          <a:p>
+            <a:endParaRPr lang="da-DK" dirty="0"/>
+          </a:p>
+          <a:p>
+            <a:r>
+              <a:rPr lang="da-DK" dirty="0" err="1"/>
+              <a:t>document.body.style.background</a:t>
+            </a:r>
+            <a:r>
+              <a:rPr lang="da-DK" dirty="0"/>
+              <a:t> = '</a:t>
+            </a:r>
+            <a:r>
+              <a:rPr lang="da-DK" dirty="0" err="1"/>
+              <a:t>lightblue</a:t>
+            </a:r>
+            <a:r>
+              <a:rPr lang="da-DK" dirty="0"/>
+              <a:t>'</a:t>
+            </a:r>
           </a:p>
         </p:txBody>
       </p:sp>
@@ -1777,7 +2053,7 @@
             <a:spLocks noGrp="1"/>
           </p:cNvSpPr>
           <p:nvPr>
-            <p:ph type="sldNum" sz="quarter" idx="10"/>
+            <p:ph type="sldNum" sz="quarter" idx="5"/>
           </p:nvPr>
         </p:nvSpPr>
         <p:spPr/>
@@ -1796,7 +2072,7 @@
     </p:spTree>
     <p:extLst>
       <p:ext uri="{BB962C8B-B14F-4D97-AF65-F5344CB8AC3E}">
-        <p14:creationId xmlns:p14="http://schemas.microsoft.com/office/powerpoint/2010/main" val="2331057724"/>
+        <p14:creationId xmlns:p14="http://schemas.microsoft.com/office/powerpoint/2010/main" val="744337484"/>
       </p:ext>
     </p:extLst>
   </p:cSld>
@@ -1850,49 +2126,44 @@
           <a:bodyPr/>
           <a:lstStyle/>
           <a:p>
-            <a:r>
-              <a:rPr lang="en-US" dirty="0"/>
-              <a:t>is,</a:t>
-            </a:r>
-            <a:r>
-              <a:rPr lang="en-US" baseline="0" dirty="0"/>
-              <a:t> is not ...</a:t>
-            </a:r>
-          </a:p>
-          <a:p>
-            <a:r>
-              <a:rPr lang="en-US" baseline="0" dirty="0"/>
-              <a:t>in, not in ... </a:t>
-            </a:r>
+            <a:pPr marL="0" marR="0" lvl="0" indent="0" algn="l" defTabSz="914400" rtl="0" eaLnBrk="1" fontAlgn="auto" latinLnBrk="0" hangingPunct="1">
+              <a:lnSpc>
+                <a:spcPct val="100000"/>
+              </a:lnSpc>
+              <a:spcBef>
+                <a:spcPts val="0"/>
+              </a:spcBef>
+              <a:spcAft>
+                <a:spcPts val="0"/>
+              </a:spcAft>
+              <a:buClrTx/>
+              <a:buSzTx/>
+              <a:buFontTx/>
+              <a:buNone/>
+              <a:tabLst/>
+              <a:defRPr/>
+            </a:pPr>
+            <a:r>
+              <a:rPr lang="en-US" dirty="0">
+                <a:latin typeface="Courier"/>
+              </a:rPr>
+              <a:t>for i in range(256): print(i, "'" + </a:t>
+            </a:r>
+            <a:r>
+              <a:rPr lang="en-US" dirty="0" err="1">
+                <a:latin typeface="Courier"/>
+              </a:rPr>
+              <a:t>chr</a:t>
+            </a:r>
+            <a:r>
+              <a:rPr lang="en-US" dirty="0">
+                <a:latin typeface="Courier"/>
+              </a:rPr>
+              <a:t>(i) + "'")</a:t>
+            </a:r>
+          </a:p>
+          <a:p>
             <a:endParaRPr lang="en-US" dirty="0"/>
-          </a:p>
-          <a:p>
-            <a:r>
-              <a:rPr lang="en-US" dirty="0"/>
-              <a:t>@ matrix multiplication (for</a:t>
-            </a:r>
-            <a:r>
-              <a:rPr lang="en-US" baseline="0" dirty="0"/>
-              <a:t> </a:t>
-            </a:r>
-            <a:r>
-              <a:rPr lang="en-US" baseline="0" dirty="0" err="1"/>
-              <a:t>numpy</a:t>
-            </a:r>
-            <a:r>
-              <a:rPr lang="en-US" baseline="0" dirty="0"/>
-              <a:t>)</a:t>
-            </a:r>
-            <a:endParaRPr lang="en-US" dirty="0"/>
-          </a:p>
-          <a:p>
-            <a:endParaRPr lang="en-US" dirty="0"/>
-          </a:p>
-          <a:p>
-            <a:r>
-              <a:rPr lang="en-US" dirty="0"/>
-              <a:t>https://docs.python.org/3/reference/expressions.html#summary</a:t>
-            </a:r>
           </a:p>
         </p:txBody>
       </p:sp>
@@ -1913,7 +2184,7 @@
           <a:p>
             <a:fld id="{CD563DD8-32AB-41BE-B1C6-8EAC45222ACE}" type="slidenum">
               <a:rPr lang="en-US" smtClean="0"/>
-              <a:t>24</a:t>
+              <a:t>21</a:t>
             </a:fld>
             <a:endParaRPr lang="en-US"/>
           </a:p>
@@ -1922,7 +2193,7 @@
     </p:spTree>
     <p:extLst>
       <p:ext uri="{BB962C8B-B14F-4D97-AF65-F5344CB8AC3E}">
-        <p14:creationId xmlns:p14="http://schemas.microsoft.com/office/powerpoint/2010/main" val="1288328173"/>
+        <p14:creationId xmlns:p14="http://schemas.microsoft.com/office/powerpoint/2010/main" val="2331057724"/>
       </p:ext>
     </p:extLst>
   </p:cSld>
@@ -2069,7 +2340,7 @@
           <a:p>
             <a:fld id="{0560A9CD-0304-4E0B-9E82-E7E0115DE05B}" type="datetimeFigureOut">
               <a:rPr lang="en-US" smtClean="0"/>
-              <a:t>2/8/2023</a:t>
+              <a:t>2/4/2024</a:t>
             </a:fld>
             <a:endParaRPr lang="en-US"/>
           </a:p>
@@ -2237,7 +2508,7 @@
           <a:p>
             <a:fld id="{0560A9CD-0304-4E0B-9E82-E7E0115DE05B}" type="datetimeFigureOut">
               <a:rPr lang="en-US" smtClean="0"/>
-              <a:t>2/8/2023</a:t>
+              <a:t>2/4/2024</a:t>
             </a:fld>
             <a:endParaRPr lang="en-US"/>
           </a:p>
@@ -2415,7 +2686,7 @@
           <a:p>
             <a:fld id="{0560A9CD-0304-4E0B-9E82-E7E0115DE05B}" type="datetimeFigureOut">
               <a:rPr lang="en-US" smtClean="0"/>
-              <a:t>2/8/2023</a:t>
+              <a:t>2/4/2024</a:t>
             </a:fld>
             <a:endParaRPr lang="en-US"/>
           </a:p>
@@ -2592,7 +2863,7 @@
           <a:p>
             <a:fld id="{0560A9CD-0304-4E0B-9E82-E7E0115DE05B}" type="datetimeFigureOut">
               <a:rPr lang="en-US" smtClean="0"/>
-              <a:t>2/8/2023</a:t>
+              <a:t>2/4/2024</a:t>
             </a:fld>
             <a:endParaRPr lang="en-US"/>
           </a:p>
@@ -2837,7 +3108,7 @@
           <a:p>
             <a:fld id="{0560A9CD-0304-4E0B-9E82-E7E0115DE05B}" type="datetimeFigureOut">
               <a:rPr lang="en-US" smtClean="0"/>
-              <a:t>2/8/2023</a:t>
+              <a:t>2/4/2024</a:t>
             </a:fld>
             <a:endParaRPr lang="en-US"/>
           </a:p>
@@ -3066,7 +3337,7 @@
           <a:p>
             <a:fld id="{0560A9CD-0304-4E0B-9E82-E7E0115DE05B}" type="datetimeFigureOut">
               <a:rPr lang="en-US" smtClean="0"/>
-              <a:t>2/8/2023</a:t>
+              <a:t>2/4/2024</a:t>
             </a:fld>
             <a:endParaRPr lang="en-US"/>
           </a:p>
@@ -3430,7 +3701,7 @@
           <a:p>
             <a:fld id="{0560A9CD-0304-4E0B-9E82-E7E0115DE05B}" type="datetimeFigureOut">
               <a:rPr lang="en-US" smtClean="0"/>
-              <a:t>2/8/2023</a:t>
+              <a:t>2/4/2024</a:t>
             </a:fld>
             <a:endParaRPr lang="en-US"/>
           </a:p>
@@ -3547,7 +3818,7 @@
           <a:p>
             <a:fld id="{0560A9CD-0304-4E0B-9E82-E7E0115DE05B}" type="datetimeFigureOut">
               <a:rPr lang="en-US" smtClean="0"/>
-              <a:t>2/8/2023</a:t>
+              <a:t>2/4/2024</a:t>
             </a:fld>
             <a:endParaRPr lang="en-US"/>
           </a:p>
@@ -3642,7 +3913,7 @@
           <a:p>
             <a:fld id="{0560A9CD-0304-4E0B-9E82-E7E0115DE05B}" type="datetimeFigureOut">
               <a:rPr lang="en-US" smtClean="0"/>
-              <a:t>2/8/2023</a:t>
+              <a:t>2/4/2024</a:t>
             </a:fld>
             <a:endParaRPr lang="en-US"/>
           </a:p>
@@ -3917,7 +4188,7 @@
           <a:p>
             <a:fld id="{0560A9CD-0304-4E0B-9E82-E7E0115DE05B}" type="datetimeFigureOut">
               <a:rPr lang="en-US" smtClean="0"/>
-              <a:t>2/8/2023</a:t>
+              <a:t>2/4/2024</a:t>
             </a:fld>
             <a:endParaRPr lang="en-US"/>
           </a:p>
@@ -4169,7 +4440,7 @@
           <a:p>
             <a:fld id="{0560A9CD-0304-4E0B-9E82-E7E0115DE05B}" type="datetimeFigureOut">
               <a:rPr lang="en-US" smtClean="0"/>
-              <a:t>2/8/2023</a:t>
+              <a:t>2/4/2024</a:t>
             </a:fld>
             <a:endParaRPr lang="en-US"/>
           </a:p>
@@ -4380,7 +4651,7 @@
           <a:p>
             <a:fld id="{0560A9CD-0304-4E0B-9E82-E7E0115DE05B}" type="datetimeFigureOut">
               <a:rPr lang="en-US" smtClean="0"/>
-              <a:t>2/8/2023</a:t>
+              <a:t>2/4/2024</a:t>
             </a:fld>
             <a:endParaRPr lang="en-US"/>
           </a:p>
@@ -9049,14 +9320,11 @@
               </a:rPr>
               <a:t>	False, None, 0, 0.0, "", []</a:t>
             </a:r>
-            <a:r>
-              <a:rPr lang="en-US" sz="2000" dirty="0">
-                <a:solidFill>
-                  <a:srgbClr val="C00000"/>
-                </a:solidFill>
-              </a:rPr>
-              <a:t>, ...</a:t>
-            </a:r>
+            <a:endParaRPr lang="en-US" sz="2000" dirty="0">
+              <a:solidFill>
+                <a:srgbClr val="C00000"/>
+              </a:solidFill>
+            </a:endParaRPr>
           </a:p>
           <a:p>
             <a:pPr marL="457200" lvl="1" indent="0">
@@ -13524,7 +13792,7 @@
           <p:nvPr>
             <p:extLst>
               <p:ext uri="{D42A27DB-BD31-4B8C-83A1-F6EECF244321}">
-                <p14:modId xmlns:p14="http://schemas.microsoft.com/office/powerpoint/2010/main" val="3122193394"/>
+                <p14:modId xmlns:p14="http://schemas.microsoft.com/office/powerpoint/2010/main" val="613275363"/>
               </p:ext>
             </p:extLst>
           </p:nvPr>
@@ -13833,7 +14101,7 @@
                           <a:latin typeface="Courier New" panose="02070309020205020404" pitchFamily="49" charset="0"/>
                           <a:cs typeface="Courier New" panose="02070309020205020404" pitchFamily="49" charset="0"/>
                         </a:rPr>
-                        <a:t>X, y = 2, 3</a:t>
+                        <a:t>x, y = 2, 3</a:t>
                       </a:r>
                     </a:p>
                     <a:p>
@@ -14933,7 +15201,7 @@
             <a:pPr algn="ctr"/>
             <a:r>
               <a:rPr lang="en-US" dirty="0"/>
-              <a:t>% formatting (inherited from C’s sprint() function) was supposed to be on the way out - but is still going strong in Python 3.11</a:t>
+              <a:t>% formatting (inherited from C’s sprint() function) was supposed to be on the way out - but is still going strong in Python 3.12</a:t>
             </a:r>
           </a:p>
         </p:txBody>
@@ -15865,6 +16133,812 @@
       </p:grpSpPr>
       <p:sp>
         <p:nvSpPr>
+          <p:cNvPr id="2" name="Title 1">
+            <a:extLst>
+              <a:ext uri="{FF2B5EF4-FFF2-40B4-BE49-F238E27FC236}">
+                <a16:creationId xmlns:a16="http://schemas.microsoft.com/office/drawing/2014/main" id="{19AE9108-3205-9EB6-BEF3-A32540F39AFC}"/>
+              </a:ext>
+            </a:extLst>
+          </p:cNvPr>
+          <p:cNvSpPr>
+            <a:spLocks noGrp="1"/>
+          </p:cNvSpPr>
+          <p:nvPr>
+            <p:ph type="title"/>
+          </p:nvPr>
+        </p:nvSpPr>
+        <p:spPr/>
+        <p:txBody>
+          <a:bodyPr/>
+          <a:lstStyle/>
+          <a:p>
+            <a:r>
+              <a:rPr lang="da-DK" dirty="0"/>
+              <a:t>Python </a:t>
+            </a:r>
+            <a:r>
+              <a:rPr lang="da-DK" dirty="0" err="1"/>
+              <a:t>does</a:t>
+            </a:r>
+            <a:r>
+              <a:rPr lang="da-DK" dirty="0"/>
+              <a:t> not </a:t>
+            </a:r>
+            <a:r>
+              <a:rPr lang="da-DK" dirty="0" err="1"/>
+              <a:t>automatic</a:t>
+            </a:r>
+            <a:r>
+              <a:rPr lang="da-DK" dirty="0"/>
+              <a:t> </a:t>
+            </a:r>
+            <a:r>
+              <a:rPr lang="da-DK" dirty="0" err="1"/>
+              <a:t>convert</a:t>
+            </a:r>
+            <a:r>
+              <a:rPr lang="da-DK" dirty="0"/>
+              <a:t> to </a:t>
+            </a:r>
+            <a:r>
+              <a:rPr lang="da-DK" dirty="0" err="1"/>
+              <a:t>string</a:t>
+            </a:r>
+            <a:endParaRPr lang="da-DK" dirty="0"/>
+          </a:p>
+        </p:txBody>
+      </p:sp>
+      <p:sp>
+        <p:nvSpPr>
+          <p:cNvPr id="3" name="Content Placeholder 2">
+            <a:extLst>
+              <a:ext uri="{FF2B5EF4-FFF2-40B4-BE49-F238E27FC236}">
+                <a16:creationId xmlns:a16="http://schemas.microsoft.com/office/drawing/2014/main" id="{B961D846-31C1-1F84-A347-4978C8C5E7FE}"/>
+              </a:ext>
+            </a:extLst>
+          </p:cNvPr>
+          <p:cNvSpPr>
+            <a:spLocks noGrp="1"/>
+          </p:cNvSpPr>
+          <p:nvPr>
+            <p:ph idx="1"/>
+          </p:nvPr>
+        </p:nvSpPr>
+        <p:spPr>
+          <a:xfrm>
+            <a:off x="838200" y="1825625"/>
+            <a:ext cx="10515600" cy="4827936"/>
+          </a:xfrm>
+        </p:spPr>
+        <p:txBody>
+          <a:bodyPr>
+            <a:normAutofit/>
+          </a:bodyPr>
+          <a:lstStyle/>
+          <a:p>
+            <a:r>
+              <a:rPr lang="da-DK" dirty="0"/>
+              <a:t>A </a:t>
+            </a:r>
+            <a:r>
+              <a:rPr lang="da-DK" dirty="0" err="1">
+                <a:latin typeface="Courier"/>
+              </a:rPr>
+              <a:t>str</a:t>
+            </a:r>
+            <a:r>
+              <a:rPr lang="da-DK" dirty="0"/>
+              <a:t> </a:t>
+            </a:r>
+            <a:r>
+              <a:rPr lang="da-DK" dirty="0" err="1"/>
+              <a:t>can</a:t>
+            </a:r>
+            <a:r>
+              <a:rPr lang="da-DK" dirty="0"/>
+              <a:t> not </a:t>
+            </a:r>
+            <a:r>
+              <a:rPr lang="da-DK" dirty="0" err="1"/>
+              <a:t>be</a:t>
+            </a:r>
+            <a:r>
+              <a:rPr lang="da-DK" dirty="0"/>
+              <a:t> </a:t>
+            </a:r>
+            <a:r>
+              <a:rPr lang="da-DK" dirty="0" err="1"/>
+              <a:t>concatenated</a:t>
+            </a:r>
+            <a:r>
+              <a:rPr lang="da-DK" dirty="0"/>
+              <a:t> with an </a:t>
+            </a:r>
+            <a:r>
+              <a:rPr lang="da-DK" dirty="0" err="1">
+                <a:latin typeface="Courier"/>
+              </a:rPr>
+              <a:t>int</a:t>
+            </a:r>
+            <a:endParaRPr lang="da-DK" dirty="0">
+              <a:latin typeface="Courier"/>
+            </a:endParaRPr>
+          </a:p>
+          <a:p>
+            <a:r>
+              <a:rPr lang="da-DK" dirty="0"/>
+              <a:t>The </a:t>
+            </a:r>
+            <a:r>
+              <a:rPr lang="da-DK" dirty="0" err="1">
+                <a:latin typeface="Courier"/>
+              </a:rPr>
+              <a:t>int</a:t>
+            </a:r>
+            <a:r>
+              <a:rPr lang="da-DK" dirty="0"/>
+              <a:t> must </a:t>
+            </a:r>
+            <a:r>
+              <a:rPr lang="da-DK" dirty="0" err="1"/>
+              <a:t>first</a:t>
+            </a:r>
+            <a:r>
+              <a:rPr lang="da-DK" dirty="0"/>
+              <a:t> </a:t>
+            </a:r>
+            <a:r>
+              <a:rPr lang="da-DK" dirty="0" err="1"/>
+              <a:t>be</a:t>
+            </a:r>
+            <a:r>
+              <a:rPr lang="da-DK" dirty="0"/>
+              <a:t> </a:t>
+            </a:r>
+            <a:r>
+              <a:rPr lang="da-DK" dirty="0" err="1"/>
+              <a:t>converted</a:t>
+            </a:r>
+            <a:r>
+              <a:rPr lang="da-DK" dirty="0"/>
+              <a:t> to a </a:t>
+            </a:r>
+            <a:r>
+              <a:rPr lang="da-DK" dirty="0" err="1">
+                <a:latin typeface="Courier"/>
+              </a:rPr>
+              <a:t>str</a:t>
+            </a:r>
+            <a:r>
+              <a:rPr lang="da-DK" dirty="0"/>
+              <a:t> </a:t>
+            </a:r>
+            <a:r>
+              <a:rPr lang="da-DK" dirty="0" err="1"/>
+              <a:t>using</a:t>
+            </a:r>
+            <a:r>
+              <a:rPr lang="da-DK" dirty="0"/>
+              <a:t> </a:t>
+            </a:r>
+            <a:r>
+              <a:rPr lang="da-DK" dirty="0" err="1">
+                <a:latin typeface="Courier"/>
+              </a:rPr>
+              <a:t>str</a:t>
+            </a:r>
+            <a:r>
+              <a:rPr lang="da-DK" dirty="0">
+                <a:latin typeface="Courier"/>
+              </a:rPr>
+              <a:t>(</a:t>
+            </a:r>
+            <a:r>
+              <a:rPr lang="da-DK" i="1" dirty="0" err="1">
+                <a:latin typeface="Courier"/>
+              </a:rPr>
+              <a:t>int</a:t>
+            </a:r>
+            <a:r>
+              <a:rPr lang="da-DK" i="1" dirty="0">
+                <a:latin typeface="Courier"/>
+              </a:rPr>
+              <a:t> </a:t>
+            </a:r>
+            <a:r>
+              <a:rPr lang="da-DK" i="1" dirty="0" err="1">
+                <a:latin typeface="Courier"/>
+              </a:rPr>
+              <a:t>value</a:t>
+            </a:r>
+            <a:r>
+              <a:rPr lang="da-DK" dirty="0">
+                <a:latin typeface="Courier"/>
+              </a:rPr>
+              <a:t>)</a:t>
+            </a:r>
+          </a:p>
+          <a:p>
+            <a:endParaRPr lang="da-DK" dirty="0"/>
+          </a:p>
+          <a:p>
+            <a:endParaRPr lang="da-DK" dirty="0"/>
+          </a:p>
+          <a:p>
+            <a:endParaRPr lang="da-DK" dirty="0"/>
+          </a:p>
+          <a:p>
+            <a:endParaRPr lang="da-DK" dirty="0"/>
+          </a:p>
+          <a:p>
+            <a:r>
+              <a:rPr lang="da-DK" dirty="0"/>
+              <a:t>In </a:t>
+            </a:r>
+            <a:r>
+              <a:rPr lang="da-DK" dirty="0" err="1"/>
+              <a:t>some</a:t>
+            </a:r>
+            <a:r>
+              <a:rPr lang="da-DK" dirty="0"/>
+              <a:t> </a:t>
+            </a:r>
+            <a:r>
+              <a:rPr lang="da-DK" dirty="0" err="1"/>
+              <a:t>languages</a:t>
+            </a:r>
+            <a:r>
+              <a:rPr lang="da-DK" dirty="0"/>
+              <a:t>, like Java and </a:t>
+            </a:r>
+            <a:r>
+              <a:rPr lang="da-DK" dirty="0" err="1"/>
+              <a:t>Javascript</a:t>
+            </a:r>
+            <a:r>
+              <a:rPr lang="da-DK" dirty="0"/>
+              <a:t>, the </a:t>
+            </a:r>
+            <a:r>
+              <a:rPr lang="da-DK" dirty="0" err="1"/>
+              <a:t>conversion</a:t>
+            </a:r>
+            <a:r>
+              <a:rPr lang="da-DK" dirty="0"/>
+              <a:t> to </a:t>
+            </a:r>
+            <a:r>
+              <a:rPr lang="da-DK" dirty="0" err="1"/>
+              <a:t>string</a:t>
+            </a:r>
+            <a:r>
+              <a:rPr lang="da-DK" dirty="0"/>
+              <a:t> </a:t>
+            </a:r>
+            <a:r>
+              <a:rPr lang="da-DK" dirty="0" err="1"/>
+              <a:t>happens</a:t>
+            </a:r>
+            <a:r>
+              <a:rPr lang="da-DK" dirty="0"/>
+              <a:t> </a:t>
+            </a:r>
+            <a:r>
+              <a:rPr lang="da-DK" dirty="0" err="1"/>
+              <a:t>automatically</a:t>
+            </a:r>
+            <a:r>
+              <a:rPr lang="da-DK" dirty="0"/>
+              <a:t> (just a </a:t>
+            </a:r>
+            <a:r>
+              <a:rPr lang="da-DK" dirty="0" err="1"/>
+              <a:t>language</a:t>
+            </a:r>
+            <a:r>
+              <a:rPr lang="da-DK" dirty="0"/>
+              <a:t> design </a:t>
+            </a:r>
+            <a:r>
+              <a:rPr lang="da-DK" dirty="0" err="1"/>
+              <a:t>choice</a:t>
+            </a:r>
+            <a:r>
+              <a:rPr lang="da-DK" dirty="0"/>
+              <a:t>)</a:t>
+            </a:r>
+            <a:endParaRPr lang="da-DK" dirty="0">
+              <a:latin typeface="Courier"/>
+            </a:endParaRPr>
+          </a:p>
+        </p:txBody>
+      </p:sp>
+      <p:graphicFrame>
+        <p:nvGraphicFramePr>
+          <p:cNvPr id="4" name="Table 3">
+            <a:extLst>
+              <a:ext uri="{FF2B5EF4-FFF2-40B4-BE49-F238E27FC236}">
+                <a16:creationId xmlns:a16="http://schemas.microsoft.com/office/drawing/2014/main" id="{EE6745CC-789B-67DC-601B-568E63AF1905}"/>
+              </a:ext>
+            </a:extLst>
+          </p:cNvPr>
+          <p:cNvGraphicFramePr>
+            <a:graphicFrameLocks noGrp="1"/>
+          </p:cNvGraphicFramePr>
+          <p:nvPr>
+            <p:extLst>
+              <p:ext uri="{D42A27DB-BD31-4B8C-83A1-F6EECF244321}">
+                <p14:modId xmlns:p14="http://schemas.microsoft.com/office/powerpoint/2010/main" val="1662977430"/>
+              </p:ext>
+            </p:extLst>
+          </p:nvPr>
+        </p:nvGraphicFramePr>
+        <p:xfrm>
+          <a:off x="2491795" y="3123743"/>
+          <a:ext cx="7208409" cy="1429974"/>
+        </p:xfrm>
+        <a:graphic>
+          <a:graphicData uri="http://schemas.openxmlformats.org/drawingml/2006/table">
+            <a:tbl>
+              <a:tblPr firstRow="1" bandRow="1">
+                <a:tableStyleId>{5C22544A-7EE6-4342-B048-85BDC9FD1C3A}</a:tableStyleId>
+              </a:tblPr>
+              <a:tblGrid>
+                <a:gridCol w="7208409">
+                  <a:extLst>
+                    <a:ext uri="{9D8B030D-6E8A-4147-A177-3AD203B41FA5}">
+                      <a16:colId xmlns:a16="http://schemas.microsoft.com/office/drawing/2014/main" val="1873682825"/>
+                    </a:ext>
+                  </a:extLst>
+                </a:gridCol>
+              </a:tblGrid>
+              <a:tr h="286591">
+                <a:tc>
+                  <a:txBody>
+                    <a:bodyPr/>
+                    <a:lstStyle/>
+                    <a:p>
+                      <a:r>
+                        <a:rPr lang="da-DK" sz="1600" b="1" dirty="0" err="1">
+                          <a:latin typeface="Courier New" panose="02070309020205020404" pitchFamily="49" charset="0"/>
+                          <a:cs typeface="Courier New" panose="02070309020205020404" pitchFamily="49" charset="0"/>
+                        </a:rPr>
+                        <a:t>Python</a:t>
+                      </a:r>
+                      <a:r>
+                        <a:rPr lang="da-DK" sz="1600" b="1" dirty="0">
+                          <a:latin typeface="Courier New" panose="02070309020205020404" pitchFamily="49" charset="0"/>
+                          <a:cs typeface="Courier New" panose="02070309020205020404" pitchFamily="49" charset="0"/>
+                        </a:rPr>
+                        <a:t> </a:t>
+                      </a:r>
+                      <a:r>
+                        <a:rPr lang="da-DK" sz="1600" b="1" dirty="0" err="1">
+                          <a:latin typeface="Courier New" panose="02070309020205020404" pitchFamily="49" charset="0"/>
+                          <a:cs typeface="Courier New" panose="02070309020205020404" pitchFamily="49" charset="0"/>
+                        </a:rPr>
+                        <a:t>shell</a:t>
+                      </a:r>
+                      <a:endParaRPr lang="da-DK" sz="1600" b="1" dirty="0">
+                        <a:latin typeface="Courier New" panose="02070309020205020404" pitchFamily="49" charset="0"/>
+                        <a:cs typeface="Courier New" panose="02070309020205020404" pitchFamily="49" charset="0"/>
+                      </a:endParaRPr>
+                    </a:p>
+                  </a:txBody>
+                  <a:tcPr anchor="ctr">
+                    <a:lnL w="6350" cap="flat" cmpd="sng" algn="ctr">
+                      <a:solidFill>
+                        <a:schemeClr val="tx1"/>
+                      </a:solidFill>
+                      <a:prstDash val="solid"/>
+                      <a:round/>
+                      <a:headEnd type="none" w="med" len="med"/>
+                      <a:tailEnd type="none" w="med" len="med"/>
+                    </a:lnL>
+                    <a:lnR w="6350" cap="flat" cmpd="sng" algn="ctr">
+                      <a:solidFill>
+                        <a:schemeClr val="tx1"/>
+                      </a:solidFill>
+                      <a:prstDash val="solid"/>
+                      <a:round/>
+                      <a:headEnd type="none" w="med" len="med"/>
+                      <a:tailEnd type="none" w="med" len="med"/>
+                    </a:lnR>
+                    <a:lnT w="6350" cap="flat" cmpd="sng" algn="ctr">
+                      <a:solidFill>
+                        <a:schemeClr val="tx1"/>
+                      </a:solidFill>
+                      <a:prstDash val="solid"/>
+                      <a:round/>
+                      <a:headEnd type="none" w="med" len="med"/>
+                      <a:tailEnd type="none" w="med" len="med"/>
+                    </a:lnT>
+                    <a:lnB w="6350" cap="flat" cmpd="sng" algn="ctr">
+                      <a:solidFill>
+                        <a:schemeClr val="tx1"/>
+                      </a:solidFill>
+                      <a:prstDash val="solid"/>
+                      <a:round/>
+                      <a:headEnd type="none" w="med" len="med"/>
+                      <a:tailEnd type="none" w="med" len="med"/>
+                    </a:lnB>
+                    <a:lnTlToBr w="12700" cmpd="sng">
+                      <a:noFill/>
+                      <a:prstDash val="solid"/>
+                    </a:lnTlToBr>
+                    <a:lnBlToTr w="12700" cmpd="sng">
+                      <a:noFill/>
+                      <a:prstDash val="solid"/>
+                    </a:lnBlToTr>
+                    <a:solidFill>
+                      <a:srgbClr val="C00000"/>
+                    </a:solidFill>
+                  </a:tcPr>
+                </a:tc>
+                <a:extLst>
+                  <a:ext uri="{0D108BD9-81ED-4DB2-BD59-A6C34878D82A}">
+                    <a16:rowId xmlns:a16="http://schemas.microsoft.com/office/drawing/2014/main" val="3330819881"/>
+                  </a:ext>
+                </a:extLst>
+              </a:tr>
+              <a:tr h="1094694">
+                <a:tc>
+                  <a:txBody>
+                    <a:bodyPr/>
+                    <a:lstStyle/>
+                    <a:p>
+                      <a:pPr marL="266700" marR="0" lvl="0" indent="-266700" algn="l" defTabSz="914400" rtl="0" eaLnBrk="1" fontAlgn="auto" latinLnBrk="0" hangingPunct="1">
+                        <a:lnSpc>
+                          <a:spcPct val="100000"/>
+                        </a:lnSpc>
+                        <a:spcBef>
+                          <a:spcPts val="0"/>
+                        </a:spcBef>
+                        <a:spcAft>
+                          <a:spcPts val="0"/>
+                        </a:spcAft>
+                        <a:buClr>
+                          <a:srgbClr val="C00000"/>
+                        </a:buClr>
+                        <a:buSzPct val="100000"/>
+                        <a:buFont typeface="Courier New" panose="02070309020205020404" pitchFamily="49" charset="0"/>
+                        <a:buChar char="&gt;"/>
+                        <a:tabLst/>
+                        <a:defRPr/>
+                      </a:pPr>
+                      <a:r>
+                        <a:rPr lang="es-ES" sz="1600" b="1" baseline="0" dirty="0">
+                          <a:latin typeface="Courier New" panose="02070309020205020404" pitchFamily="49" charset="0"/>
+                          <a:cs typeface="Courier New" panose="02070309020205020404" pitchFamily="49" charset="0"/>
+                        </a:rPr>
+                        <a:t>'</a:t>
+                      </a:r>
+                      <a:r>
+                        <a:rPr lang="es-ES" sz="1600" b="1" baseline="0" dirty="0" err="1">
+                          <a:latin typeface="Courier New" panose="02070309020205020404" pitchFamily="49" charset="0"/>
+                          <a:cs typeface="Courier New" panose="02070309020205020404" pitchFamily="49" charset="0"/>
+                        </a:rPr>
+                        <a:t>abc</a:t>
+                      </a:r>
+                      <a:r>
+                        <a:rPr lang="es-ES" sz="1600" b="1" baseline="0" dirty="0">
+                          <a:latin typeface="Courier New" panose="02070309020205020404" pitchFamily="49" charset="0"/>
+                          <a:cs typeface="Courier New" panose="02070309020205020404" pitchFamily="49" charset="0"/>
+                        </a:rPr>
+                        <a:t>' + 42</a:t>
+                      </a:r>
+                      <a:endParaRPr lang="en-US" sz="1600" b="1" baseline="0" dirty="0">
+                        <a:latin typeface="Courier New" panose="02070309020205020404" pitchFamily="49" charset="0"/>
+                        <a:cs typeface="Courier New" panose="02070309020205020404" pitchFamily="49" charset="0"/>
+                      </a:endParaRPr>
+                    </a:p>
+                    <a:p>
+                      <a:pPr marL="266700" marR="0" lvl="0" indent="-266700" algn="l" defTabSz="914400" rtl="0" eaLnBrk="1" fontAlgn="auto" latinLnBrk="0" hangingPunct="1">
+                        <a:lnSpc>
+                          <a:spcPct val="100000"/>
+                        </a:lnSpc>
+                        <a:spcBef>
+                          <a:spcPts val="0"/>
+                        </a:spcBef>
+                        <a:spcAft>
+                          <a:spcPts val="0"/>
+                        </a:spcAft>
+                        <a:buClr>
+                          <a:schemeClr val="accent1">
+                            <a:lumMod val="50000"/>
+                          </a:schemeClr>
+                        </a:buClr>
+                        <a:buSzPct val="120000"/>
+                        <a:buFont typeface="Courier New" panose="02070309020205020404" pitchFamily="49" charset="0"/>
+                        <a:buChar char="|"/>
+                        <a:tabLst/>
+                        <a:defRPr/>
+                      </a:pPr>
+                      <a:r>
+                        <a:rPr lang="en-US" sz="1600" b="1" baseline="0" dirty="0" err="1">
+                          <a:latin typeface="Courier New" panose="02070309020205020404" pitchFamily="49" charset="0"/>
+                          <a:cs typeface="Courier New" panose="02070309020205020404" pitchFamily="49" charset="0"/>
+                        </a:rPr>
+                        <a:t>TypeError</a:t>
+                      </a:r>
+                      <a:r>
+                        <a:rPr lang="en-US" sz="1600" b="1" baseline="0" dirty="0">
+                          <a:latin typeface="Courier New" panose="02070309020205020404" pitchFamily="49" charset="0"/>
+                          <a:cs typeface="Courier New" panose="02070309020205020404" pitchFamily="49" charset="0"/>
+                        </a:rPr>
+                        <a:t>: can only concatenate str (not "int") to str</a:t>
+                      </a:r>
+                    </a:p>
+                    <a:p>
+                      <a:pPr marL="266700" marR="0" lvl="0" indent="-266700" algn="l" defTabSz="914400" rtl="0" eaLnBrk="1" fontAlgn="auto" latinLnBrk="0" hangingPunct="1">
+                        <a:lnSpc>
+                          <a:spcPct val="100000"/>
+                        </a:lnSpc>
+                        <a:spcBef>
+                          <a:spcPts val="0"/>
+                        </a:spcBef>
+                        <a:spcAft>
+                          <a:spcPts val="0"/>
+                        </a:spcAft>
+                        <a:buClr>
+                          <a:srgbClr val="C00000"/>
+                        </a:buClr>
+                        <a:buSzPct val="100000"/>
+                        <a:buFont typeface="Courier New" panose="02070309020205020404" pitchFamily="49" charset="0"/>
+                        <a:buChar char="&gt;"/>
+                        <a:tabLst/>
+                        <a:defRPr/>
+                      </a:pPr>
+                      <a:r>
+                        <a:rPr lang="en-US" sz="1600" b="1" baseline="0" dirty="0">
+                          <a:latin typeface="Courier New" panose="02070309020205020404" pitchFamily="49" charset="0"/>
+                          <a:cs typeface="Courier New" panose="02070309020205020404" pitchFamily="49" charset="0"/>
+                        </a:rPr>
+                        <a:t>'</a:t>
+                      </a:r>
+                      <a:r>
+                        <a:rPr lang="en-US" sz="1600" b="1" baseline="0" dirty="0" err="1">
+                          <a:latin typeface="Courier New" panose="02070309020205020404" pitchFamily="49" charset="0"/>
+                          <a:cs typeface="Courier New" panose="02070309020205020404" pitchFamily="49" charset="0"/>
+                        </a:rPr>
+                        <a:t>abc</a:t>
+                      </a:r>
+                      <a:r>
+                        <a:rPr lang="en-US" sz="1600" b="1" baseline="0" dirty="0">
+                          <a:latin typeface="Courier New" panose="02070309020205020404" pitchFamily="49" charset="0"/>
+                          <a:cs typeface="Courier New" panose="02070309020205020404" pitchFamily="49" charset="0"/>
+                        </a:rPr>
+                        <a:t>' + str(42)</a:t>
+                      </a:r>
+                    </a:p>
+                    <a:p>
+                      <a:pPr marL="266700" marR="0" lvl="0" indent="-266700" algn="l" defTabSz="914400" rtl="0" eaLnBrk="1" fontAlgn="auto" latinLnBrk="0" hangingPunct="1">
+                        <a:lnSpc>
+                          <a:spcPct val="100000"/>
+                        </a:lnSpc>
+                        <a:spcBef>
+                          <a:spcPts val="0"/>
+                        </a:spcBef>
+                        <a:spcAft>
+                          <a:spcPts val="0"/>
+                        </a:spcAft>
+                        <a:buClr>
+                          <a:schemeClr val="accent1">
+                            <a:lumMod val="50000"/>
+                          </a:schemeClr>
+                        </a:buClr>
+                        <a:buSzPct val="120000"/>
+                        <a:buFont typeface="Courier New" panose="02070309020205020404" pitchFamily="49" charset="0"/>
+                        <a:buChar char="|"/>
+                        <a:tabLst/>
+                        <a:defRPr/>
+                      </a:pPr>
+                      <a:r>
+                        <a:rPr lang="es-ES" sz="1600" b="1" baseline="0" dirty="0">
+                          <a:latin typeface="Courier New" panose="02070309020205020404" pitchFamily="49" charset="0"/>
+                          <a:cs typeface="Courier New" panose="02070309020205020404" pitchFamily="49" charset="0"/>
+                        </a:rPr>
+                        <a:t>'abc42'</a:t>
+                      </a:r>
+                    </a:p>
+                  </a:txBody>
+                  <a:tcPr>
+                    <a:lnL w="6350" cap="flat" cmpd="sng" algn="ctr">
+                      <a:solidFill>
+                        <a:schemeClr val="tx1"/>
+                      </a:solidFill>
+                      <a:prstDash val="solid"/>
+                      <a:round/>
+                      <a:headEnd type="none" w="med" len="med"/>
+                      <a:tailEnd type="none" w="med" len="med"/>
+                    </a:lnL>
+                    <a:lnR w="6350" cap="flat" cmpd="sng" algn="ctr">
+                      <a:solidFill>
+                        <a:schemeClr val="tx1"/>
+                      </a:solidFill>
+                      <a:prstDash val="solid"/>
+                      <a:round/>
+                      <a:headEnd type="none" w="med" len="med"/>
+                      <a:tailEnd type="none" w="med" len="med"/>
+                    </a:lnR>
+                    <a:lnT w="6350" cap="flat" cmpd="sng" algn="ctr">
+                      <a:solidFill>
+                        <a:schemeClr val="tx1"/>
+                      </a:solidFill>
+                      <a:prstDash val="solid"/>
+                      <a:round/>
+                      <a:headEnd type="none" w="med" len="med"/>
+                      <a:tailEnd type="none" w="med" len="med"/>
+                    </a:lnT>
+                    <a:lnB w="6350" cap="flat" cmpd="sng" algn="ctr">
+                      <a:solidFill>
+                        <a:schemeClr val="tx1"/>
+                      </a:solidFill>
+                      <a:prstDash val="solid"/>
+                      <a:round/>
+                      <a:headEnd type="none" w="med" len="med"/>
+                      <a:tailEnd type="none" w="med" len="med"/>
+                    </a:lnB>
+                    <a:lnTlToBr w="12700" cmpd="sng">
+                      <a:noFill/>
+                      <a:prstDash val="solid"/>
+                    </a:lnTlToBr>
+                    <a:lnBlToTr w="12700" cmpd="sng">
+                      <a:noFill/>
+                      <a:prstDash val="solid"/>
+                    </a:lnBlToTr>
+                    <a:solidFill>
+                      <a:schemeClr val="accent5">
+                        <a:lumMod val="20000"/>
+                        <a:lumOff val="80000"/>
+                      </a:schemeClr>
+                    </a:solidFill>
+                  </a:tcPr>
+                </a:tc>
+                <a:extLst>
+                  <a:ext uri="{0D108BD9-81ED-4DB2-BD59-A6C34878D82A}">
+                    <a16:rowId xmlns:a16="http://schemas.microsoft.com/office/drawing/2014/main" val="4112970457"/>
+                  </a:ext>
+                </a:extLst>
+              </a:tr>
+            </a:tbl>
+          </a:graphicData>
+        </a:graphic>
+      </p:graphicFrame>
+      <p:sp>
+        <p:nvSpPr>
+          <p:cNvPr id="5" name="Down Arrow 4">
+            <a:extLst>
+              <a:ext uri="{FF2B5EF4-FFF2-40B4-BE49-F238E27FC236}">
+                <a16:creationId xmlns:a16="http://schemas.microsoft.com/office/drawing/2014/main" id="{DE1A517F-9AE3-9B0A-52FF-B625F2865B8B}"/>
+              </a:ext>
+            </a:extLst>
+          </p:cNvPr>
+          <p:cNvSpPr/>
+          <p:nvPr/>
+        </p:nvSpPr>
+        <p:spPr>
+          <a:xfrm rot="16200000">
+            <a:off x="1326681" y="2864603"/>
+            <a:ext cx="888384" cy="1522717"/>
+          </a:xfrm>
+          <a:prstGeom prst="downArrow">
+            <a:avLst/>
+          </a:prstGeom>
+          <a:solidFill>
+            <a:srgbClr val="C00000"/>
+          </a:solidFill>
+          <a:ln>
+            <a:solidFill>
+              <a:schemeClr val="bg1"/>
+            </a:solidFill>
+          </a:ln>
+        </p:spPr>
+        <p:style>
+          <a:lnRef idx="2">
+            <a:schemeClr val="accent1">
+              <a:shade val="50000"/>
+            </a:schemeClr>
+          </a:lnRef>
+          <a:fillRef idx="1">
+            <a:schemeClr val="accent1"/>
+          </a:fillRef>
+          <a:effectRef idx="0">
+            <a:schemeClr val="accent1"/>
+          </a:effectRef>
+          <a:fontRef idx="minor">
+            <a:schemeClr val="lt1"/>
+          </a:fontRef>
+        </p:style>
+        <p:txBody>
+          <a:bodyPr vert="vert" rtlCol="0" anchor="ctr"/>
+          <a:lstStyle/>
+          <a:p>
+            <a:pPr algn="ctr">
+              <a:lnSpc>
+                <a:spcPts val="1200"/>
+              </a:lnSpc>
+            </a:pPr>
+            <a:r>
+              <a:rPr lang="en-US" sz="1400" dirty="0"/>
+              <a:t>works in Java and </a:t>
+            </a:r>
+            <a:r>
+              <a:rPr lang="en-US" sz="1400" dirty="0" err="1"/>
+              <a:t>Javascript</a:t>
+            </a:r>
+            <a:endParaRPr lang="en-US" sz="1400" dirty="0"/>
+          </a:p>
+        </p:txBody>
+      </p:sp>
+      <p:pic>
+        <p:nvPicPr>
+          <p:cNvPr id="6" name="Picture 5">
+            <a:extLst>
+              <a:ext uri="{FF2B5EF4-FFF2-40B4-BE49-F238E27FC236}">
+                <a16:creationId xmlns:a16="http://schemas.microsoft.com/office/drawing/2014/main" id="{BC49D55E-DBEF-D87D-C77B-BA8A9E026885}"/>
+              </a:ext>
+            </a:extLst>
+          </p:cNvPr>
+          <p:cNvPicPr>
+            <a:picLocks noChangeAspect="1"/>
+          </p:cNvPicPr>
+          <p:nvPr/>
+        </p:nvPicPr>
+        <p:blipFill>
+          <a:blip r:embed="rId3" cstate="print">
+            <a:extLst>
+              <a:ext uri="{28A0092B-C50C-407E-A947-70E740481C1C}">
+                <a14:useLocalDpi xmlns:a14="http://schemas.microsoft.com/office/drawing/2010/main" val="0"/>
+              </a:ext>
+            </a:extLst>
+          </a:blip>
+          <a:stretch>
+            <a:fillRect/>
+          </a:stretch>
+        </p:blipFill>
+        <p:spPr>
+          <a:xfrm>
+            <a:off x="10864584" y="694974"/>
+            <a:ext cx="799989" cy="665863"/>
+          </a:xfrm>
+          <a:prstGeom prst="rect">
+            <a:avLst/>
+          </a:prstGeom>
+        </p:spPr>
+      </p:pic>
+    </p:spTree>
+    <p:extLst>
+      <p:ext uri="{BB962C8B-B14F-4D97-AF65-F5344CB8AC3E}">
+        <p14:creationId xmlns:p14="http://schemas.microsoft.com/office/powerpoint/2010/main" val="4179547408"/>
+      </p:ext>
+    </p:extLst>
+  </p:cSld>
+  <p:clrMapOvr>
+    <a:masterClrMapping/>
+  </p:clrMapOvr>
+</p:sld>
+</file>
+
+<file path=ppt/slides/slide21.xml><?xml version="1.0" encoding="utf-8"?>
+<p:sld xmlns:a="http://schemas.openxmlformats.org/drawingml/2006/main" xmlns:r="http://schemas.openxmlformats.org/officeDocument/2006/relationships" xmlns:p="http://schemas.openxmlformats.org/presentationml/2006/main">
+  <p:cSld>
+    <p:spTree>
+      <p:nvGrpSpPr>
+        <p:cNvPr id="1" name=""/>
+        <p:cNvGrpSpPr/>
+        <p:nvPr/>
+      </p:nvGrpSpPr>
+      <p:grpSpPr>
+        <a:xfrm>
+          <a:off x="0" y="0"/>
+          <a:ext cx="0" cy="0"/>
+          <a:chOff x="0" y="0"/>
+          <a:chExt cx="0" cy="0"/>
+        </a:xfrm>
+      </p:grpSpPr>
+      <p:sp>
+        <p:nvSpPr>
           <p:cNvPr id="2" name="Title 1"/>
           <p:cNvSpPr>
             <a:spLocks noGrp="1"/>
@@ -16358,7 +17432,7 @@
 </p:sld>
 </file>
 
-<file path=ppt/slides/slide21.xml><?xml version="1.0" encoding="utf-8"?>
+<file path=ppt/slides/slide22.xml><?xml version="1.0" encoding="utf-8"?>
 <p:sld xmlns:a="http://schemas.openxmlformats.org/drawingml/2006/main" xmlns:r="http://schemas.openxmlformats.org/officeDocument/2006/relationships" xmlns:p="http://schemas.openxmlformats.org/presentationml/2006/main">
   <p:cSld>
     <p:spTree>
@@ -16390,7 +17464,7 @@
           <p:nvPr>
             <p:extLst>
               <p:ext uri="{D42A27DB-BD31-4B8C-83A1-F6EECF244321}">
-                <p14:modId xmlns:p14="http://schemas.microsoft.com/office/powerpoint/2010/main" val="4155152047"/>
+                <p14:modId xmlns:p14="http://schemas.microsoft.com/office/powerpoint/2010/main" val="2829510456"/>
               </p:ext>
             </p:extLst>
           </p:nvPr>
@@ -17118,8 +18192,19 @@
                           <a:latin typeface="Courier New" panose="02070309020205020404" pitchFamily="49" charset="0"/>
                           <a:cs typeface="Courier New" panose="02070309020205020404" pitchFamily="49" charset="0"/>
                         </a:rPr>
-                        <a:t> IS a string’</a:t>
-                      </a:r>
+                        <a:t> IS </a:t>
+                      </a:r>
+                      <a:r>
+                        <a:rPr lang="en-US" sz="1600" b="1" baseline="0">
+                          <a:latin typeface="Courier New" panose="02070309020205020404" pitchFamily="49" charset="0"/>
+                          <a:cs typeface="Courier New" panose="02070309020205020404" pitchFamily="49" charset="0"/>
+                        </a:rPr>
+                        <a:t>a string'</a:t>
+                      </a:r>
+                      <a:endParaRPr lang="en-US" sz="1600" b="1" baseline="0" dirty="0">
+                        <a:latin typeface="Courier New" panose="02070309020205020404" pitchFamily="49" charset="0"/>
+                        <a:cs typeface="Courier New" panose="02070309020205020404" pitchFamily="49" charset="0"/>
+                      </a:endParaRPr>
                     </a:p>
                     <a:p>
                       <a:pPr marL="266700" marR="0" lvl="0" indent="-266700" algn="l" defTabSz="914400" rtl="0" eaLnBrk="1" fontAlgn="auto" latinLnBrk="0" hangingPunct="1">
@@ -17625,7 +18710,7 @@
 </p:sld>
 </file>
 
-<file path=ppt/slides/slide22.xml><?xml version="1.0" encoding="utf-8"?>
+<file path=ppt/slides/slide23.xml><?xml version="1.0" encoding="utf-8"?>
 <p:sld xmlns:a="http://schemas.openxmlformats.org/drawingml/2006/main" xmlns:r="http://schemas.openxmlformats.org/officeDocument/2006/relationships" xmlns:p="http://schemas.openxmlformats.org/presentationml/2006/main">
   <p:cSld>
     <p:bg>
@@ -22835,256 +23920,6 @@
 </p:sld>
 </file>
 
-<file path=ppt/slides/slide23.xml><?xml version="1.0" encoding="utf-8"?>
-<p:sld xmlns:a="http://schemas.openxmlformats.org/drawingml/2006/main" xmlns:r="http://schemas.openxmlformats.org/officeDocument/2006/relationships" xmlns:p="http://schemas.openxmlformats.org/presentationml/2006/main">
-  <p:cSld>
-    <p:spTree>
-      <p:nvGrpSpPr>
-        <p:cNvPr id="1" name=""/>
-        <p:cNvGrpSpPr/>
-        <p:nvPr/>
-      </p:nvGrpSpPr>
-      <p:grpSpPr>
-        <a:xfrm>
-          <a:off x="0" y="0"/>
-          <a:ext cx="0" cy="0"/>
-          <a:chOff x="0" y="0"/>
-          <a:chExt cx="0" cy="0"/>
-        </a:xfrm>
-      </p:grpSpPr>
-      <p:sp>
-        <p:nvSpPr>
-          <p:cNvPr id="2" name="Title 1"/>
-          <p:cNvSpPr>
-            <a:spLocks noGrp="1"/>
-          </p:cNvSpPr>
-          <p:nvPr>
-            <p:ph type="title"/>
-          </p:nvPr>
-        </p:nvSpPr>
-        <p:spPr/>
-        <p:txBody>
-          <a:bodyPr/>
-          <a:lstStyle/>
-          <a:p>
-            <a:r>
-              <a:rPr lang="en-US" dirty="0"/>
-              <a:t>Strings are immutable</a:t>
-            </a:r>
-          </a:p>
-        </p:txBody>
-      </p:sp>
-      <p:sp>
-        <p:nvSpPr>
-          <p:cNvPr id="3" name="Content Placeholder 2"/>
-          <p:cNvSpPr>
-            <a:spLocks noGrp="1"/>
-          </p:cNvSpPr>
-          <p:nvPr>
-            <p:ph idx="1"/>
-          </p:nvPr>
-        </p:nvSpPr>
-        <p:spPr>
-          <a:xfrm>
-            <a:off x="861060" y="1825625"/>
-            <a:ext cx="11014710" cy="4351338"/>
-          </a:xfrm>
-        </p:spPr>
-        <p:txBody>
-          <a:bodyPr/>
-          <a:lstStyle/>
-          <a:p>
-            <a:pPr>
-              <a:spcAft>
-                <a:spcPts val="1200"/>
-              </a:spcAft>
-            </a:pPr>
-            <a:r>
-              <a:rPr lang="en-US" dirty="0"/>
-              <a:t>Strings are non-scalar, i.e. for </a:t>
-            </a:r>
-            <a:r>
-              <a:rPr lang="en-US" dirty="0">
-                <a:latin typeface="Courier"/>
-              </a:rPr>
-              <a:t>s = "</a:t>
-            </a:r>
-            <a:r>
-              <a:rPr lang="en-US" dirty="0" err="1">
-                <a:latin typeface="Courier"/>
-              </a:rPr>
-              <a:t>abcdef</a:t>
-            </a:r>
-            <a:r>
-              <a:rPr lang="en-US" dirty="0">
-                <a:latin typeface="Courier"/>
-              </a:rPr>
-              <a:t>"</a:t>
-            </a:r>
-            <a:r>
-              <a:rPr lang="en-US" dirty="0"/>
-              <a:t>, </a:t>
-            </a:r>
-            <a:r>
-              <a:rPr lang="en-US" dirty="0">
-                <a:latin typeface="Courier"/>
-              </a:rPr>
-              <a:t>s[3]</a:t>
-            </a:r>
-            <a:r>
-              <a:rPr lang="en-US" dirty="0"/>
-              <a:t> will return </a:t>
-            </a:r>
-            <a:r>
-              <a:rPr lang="en-US" dirty="0">
-                <a:latin typeface="Courier"/>
-              </a:rPr>
-              <a:t>"d"</a:t>
-            </a:r>
-          </a:p>
-          <a:p>
-            <a:pPr>
-              <a:spcAft>
-                <a:spcPts val="1200"/>
-              </a:spcAft>
-            </a:pPr>
-            <a:r>
-              <a:rPr lang="en-US" dirty="0"/>
-              <a:t>Strings are </a:t>
-            </a:r>
-            <a:r>
-              <a:rPr lang="en-US" dirty="0">
-                <a:solidFill>
-                  <a:srgbClr val="C00000"/>
-                </a:solidFill>
-              </a:rPr>
-              <a:t>immutable</a:t>
-            </a:r>
-            <a:r>
-              <a:rPr lang="en-US" dirty="0"/>
-              <a:t> and cannot be changed once created.</a:t>
-            </a:r>
-            <a:br>
-              <a:rPr lang="en-US" dirty="0"/>
-            </a:br>
-            <a:r>
-              <a:rPr lang="en-US" dirty="0"/>
-              <a:t>I.e. the following natural update </a:t>
-            </a:r>
-            <a:r>
-              <a:rPr lang="en-US" dirty="0">
-                <a:solidFill>
-                  <a:srgbClr val="C00000"/>
-                </a:solidFill>
-              </a:rPr>
-              <a:t>is not possible </a:t>
-            </a:r>
-            <a:r>
-              <a:rPr lang="en-US" dirty="0"/>
-              <a:t>(but is e.g. allowed in C)</a:t>
-            </a:r>
-            <a:endParaRPr lang="en-US" dirty="0">
-              <a:solidFill>
-                <a:srgbClr val="C00000"/>
-              </a:solidFill>
-            </a:endParaRPr>
-          </a:p>
-          <a:p>
-            <a:pPr marL="0" indent="0" algn="ctr">
-              <a:spcAft>
-                <a:spcPts val="1200"/>
-              </a:spcAft>
-              <a:buNone/>
-            </a:pPr>
-            <a:r>
-              <a:rPr lang="en-US" dirty="0">
-                <a:solidFill>
-                  <a:srgbClr val="C00000"/>
-                </a:solidFill>
-                <a:latin typeface="Courier"/>
-              </a:rPr>
-              <a:t>s[3] = "x"</a:t>
-            </a:r>
-          </a:p>
-          <a:p>
-            <a:pPr>
-              <a:spcAft>
-                <a:spcPts val="1200"/>
-              </a:spcAft>
-            </a:pPr>
-            <a:r>
-              <a:rPr lang="en-US" dirty="0"/>
-              <a:t>To replace the </a:t>
-            </a:r>
-            <a:r>
-              <a:rPr lang="en-US" dirty="0">
-                <a:latin typeface="Courier"/>
-              </a:rPr>
-              <a:t>"d"</a:t>
-            </a:r>
-            <a:r>
-              <a:rPr lang="en-US" dirty="0"/>
-              <a:t> with </a:t>
-            </a:r>
-            <a:r>
-              <a:rPr lang="en-US" dirty="0">
-                <a:latin typeface="Courier"/>
-              </a:rPr>
-              <a:t>"x"</a:t>
-            </a:r>
-            <a:r>
-              <a:rPr lang="en-US" dirty="0"/>
-              <a:t> in </a:t>
-            </a:r>
-            <a:r>
-              <a:rPr lang="en-US" dirty="0">
-                <a:latin typeface="Courier"/>
-              </a:rPr>
-              <a:t>s</a:t>
-            </a:r>
-            <a:r>
-              <a:rPr lang="en-US" dirty="0"/>
-              <a:t>, instead </a:t>
-            </a:r>
-            <a:r>
-              <a:rPr lang="en-US"/>
-              <a:t>create the new string</a:t>
-            </a:r>
-            <a:endParaRPr lang="en-US" dirty="0"/>
-          </a:p>
-          <a:p>
-            <a:pPr marL="0" indent="0" algn="ctr">
-              <a:spcAft>
-                <a:spcPts val="1200"/>
-              </a:spcAft>
-              <a:buNone/>
-            </a:pPr>
-            <a:r>
-              <a:rPr lang="en-US" dirty="0">
-                <a:latin typeface="Courier"/>
-              </a:rPr>
-              <a:t>s = s[:3] + "x" + s[4:]</a:t>
-            </a:r>
-            <a:br>
-              <a:rPr lang="en-US" dirty="0"/>
-            </a:br>
-            <a:endParaRPr lang="en-US" dirty="0"/>
-          </a:p>
-        </p:txBody>
-      </p:sp>
-    </p:spTree>
-    <p:extLst>
-      <p:ext uri="{BB962C8B-B14F-4D97-AF65-F5344CB8AC3E}">
-        <p14:creationId xmlns:p14="http://schemas.microsoft.com/office/powerpoint/2010/main" val="3203409752"/>
-      </p:ext>
-    </p:extLst>
-  </p:cSld>
-  <p:clrMapOvr>
-    <a:masterClrMapping/>
-  </p:clrMapOvr>
-</p:sld>
-</file>
-
 <file path=ppt/slides/slide24.xml><?xml version="1.0" encoding="utf-8"?>
 <p:sld xmlns:a="http://schemas.openxmlformats.org/drawingml/2006/main" xmlns:r="http://schemas.openxmlformats.org/officeDocument/2006/relationships" xmlns:p="http://schemas.openxmlformats.org/presentationml/2006/main">
   <p:cSld>
@@ -23119,14 +23954,7 @@
           <a:p>
             <a:r>
               <a:rPr lang="en-US" dirty="0"/>
-              <a:t>Operators</a:t>
-            </a:r>
-            <a:br>
-              <a:rPr lang="en-US" dirty="0"/>
-            </a:br>
-            <a:r>
-              <a:rPr lang="en-US" dirty="0"/>
-              <a:t>Precedence rules &amp; Associativity</a:t>
+              <a:t>Strings are immutable</a:t>
             </a:r>
           </a:p>
         </p:txBody>
@@ -23143,1303 +23971,188 @@
         </p:nvSpPr>
         <p:spPr>
           <a:xfrm>
-            <a:off x="838200" y="1791569"/>
-            <a:ext cx="8602683" cy="4831492"/>
+            <a:off x="861060" y="1825625"/>
+            <a:ext cx="11014710" cy="4351338"/>
           </a:xfrm>
         </p:spPr>
         <p:txBody>
-          <a:bodyPr>
-            <a:normAutofit/>
-          </a:bodyPr>
+          <a:bodyPr/>
           <a:lstStyle/>
           <a:p>
-            <a:pPr marL="0" indent="0">
-              <a:spcBef>
-                <a:spcPts val="1800"/>
-              </a:spcBef>
-              <a:buNone/>
+            <a:pPr>
+              <a:spcAft>
+                <a:spcPts val="1200"/>
+              </a:spcAft>
             </a:pPr>
             <a:r>
               <a:rPr lang="en-US" dirty="0"/>
-              <a:t>Example: * has higher precedence than +</a:t>
-            </a:r>
-          </a:p>
-          <a:p>
-            <a:pPr marL="0" indent="0" algn="ctr">
-              <a:spcBef>
-                <a:spcPts val="1800"/>
-              </a:spcBef>
-              <a:buNone/>
+              <a:t>Strings are non-scalar, i.e. for </a:t>
+            </a:r>
+            <a:r>
+              <a:rPr lang="en-US" dirty="0">
+                <a:latin typeface="Courier"/>
+              </a:rPr>
+              <a:t>s = "</a:t>
+            </a:r>
+            <a:r>
+              <a:rPr lang="en-US" dirty="0" err="1">
+                <a:latin typeface="Courier"/>
+              </a:rPr>
+              <a:t>abcdef</a:t>
+            </a:r>
+            <a:r>
+              <a:rPr lang="en-US" dirty="0">
+                <a:latin typeface="Courier"/>
+              </a:rPr>
+              <a:t>"</a:t>
+            </a:r>
+            <a:r>
+              <a:rPr lang="en-US" dirty="0"/>
+              <a:t>, </a:t>
+            </a:r>
+            <a:r>
+              <a:rPr lang="en-US" dirty="0">
+                <a:latin typeface="Courier"/>
+              </a:rPr>
+              <a:t>s[3]</a:t>
+            </a:r>
+            <a:r>
+              <a:rPr lang="en-US" dirty="0"/>
+              <a:t> will return </a:t>
+            </a:r>
+            <a:r>
+              <a:rPr lang="en-US" dirty="0">
+                <a:latin typeface="Courier"/>
+              </a:rPr>
+              <a:t>"d"</a:t>
+            </a:r>
+          </a:p>
+          <a:p>
+            <a:pPr>
+              <a:spcAft>
+                <a:spcPts val="1200"/>
+              </a:spcAft>
             </a:pPr>
             <a:r>
               <a:rPr lang="en-US" dirty="0"/>
-              <a:t>2 + 3 * 4  </a:t>
-            </a:r>
-            <a:r>
-              <a:rPr lang="en-US" dirty="0">
-                <a:sym typeface="Wingdings" panose="05000000000000000000" pitchFamily="2" charset="2"/>
-              </a:rPr>
-              <a:t> ≡ </a:t>
-            </a:r>
-            <a:r>
-              <a:rPr lang="en-US" dirty="0"/>
-              <a:t>  2 + (3 * 4) </a:t>
-            </a:r>
-            <a:r>
-              <a:rPr lang="en-US" dirty="0">
-                <a:sym typeface="Wingdings" panose="05000000000000000000" pitchFamily="2" charset="2"/>
-              </a:rPr>
-              <a:t> 14    and  (2 + 3) * 4  20</a:t>
-            </a:r>
-          </a:p>
-          <a:p>
-            <a:pPr marL="0" indent="0">
-              <a:spcBef>
-                <a:spcPts val="1800"/>
-              </a:spcBef>
-              <a:buNone/>
-            </a:pPr>
-            <a:r>
-              <a:rPr lang="en-US" dirty="0">
-                <a:sym typeface="Wingdings" panose="05000000000000000000" pitchFamily="2" charset="2"/>
-              </a:rPr>
-              <a:t>All operators in same group are evaluated left-to-right</a:t>
-            </a:r>
-          </a:p>
-          <a:p>
-            <a:pPr marL="0" indent="0" algn="ctr">
-              <a:spcBef>
-                <a:spcPts val="1800"/>
-              </a:spcBef>
-              <a:buNone/>
-            </a:pPr>
-            <a:r>
-              <a:rPr lang="en-US" dirty="0">
-                <a:sym typeface="Wingdings" panose="05000000000000000000" pitchFamily="2" charset="2"/>
-              </a:rPr>
-              <a:t>2 + 3 - 4 - 5   ≡   ((2 + 3) - 4) - 5      -4</a:t>
-            </a:r>
-          </a:p>
-          <a:p>
-            <a:pPr marL="0" indent="0">
-              <a:spcBef>
-                <a:spcPts val="1800"/>
-              </a:spcBef>
-              <a:buNone/>
-            </a:pPr>
-            <a:r>
-              <a:rPr lang="en-US" dirty="0">
-                <a:sym typeface="Wingdings" panose="05000000000000000000" pitchFamily="2" charset="2"/>
-              </a:rPr>
-              <a:t>except for **, that is evaluated right-to-left</a:t>
-            </a:r>
-          </a:p>
-          <a:p>
-            <a:pPr marL="0" indent="0" algn="ctr">
-              <a:spcBef>
-                <a:spcPts val="1800"/>
-              </a:spcBef>
-              <a:buNone/>
-            </a:pPr>
-            <a:r>
-              <a:rPr lang="en-US" dirty="0">
-                <a:sym typeface="Wingdings" panose="05000000000000000000" pitchFamily="2" charset="2"/>
-              </a:rPr>
-              <a:t>2**2**3   ≡   2**(2**3)      256</a:t>
-            </a:r>
-          </a:p>
-          <a:p>
-            <a:pPr marL="0" indent="0">
-              <a:spcBef>
-                <a:spcPts val="1800"/>
-              </a:spcBef>
-              <a:buNone/>
-            </a:pPr>
-            <a:r>
-              <a:rPr lang="en-US" dirty="0">
-                <a:sym typeface="Wingdings" panose="05000000000000000000" pitchFamily="2" charset="2"/>
-              </a:rPr>
-              <a:t>Rule: Use </a:t>
+              <a:t>Strings are </a:t>
             </a:r>
             <a:r>
               <a:rPr lang="en-US" dirty="0">
                 <a:solidFill>
                   <a:srgbClr val="C00000"/>
                 </a:solidFill>
-                <a:sym typeface="Wingdings" panose="05000000000000000000" pitchFamily="2" charset="2"/>
               </a:rPr>
-              <a:t>parenthesis</a:t>
+              <a:t>immutable</a:t>
+            </a:r>
+            <a:r>
+              <a:rPr lang="en-US" dirty="0"/>
+              <a:t> and cannot be changed once created.</a:t>
+            </a:r>
+            <a:br>
+              <a:rPr lang="en-US" dirty="0"/>
+            </a:br>
+            <a:r>
+              <a:rPr lang="en-US" dirty="0"/>
+              <a:t>I.e. the following natural update </a:t>
             </a:r>
             <a:r>
               <a:rPr lang="en-US" dirty="0">
-                <a:sym typeface="Wingdings" panose="05000000000000000000" pitchFamily="2" charset="2"/>
+                <a:solidFill>
+                  <a:srgbClr val="C00000"/>
+                </a:solidFill>
               </a:rPr>
-              <a:t> whenever in doubt of precedence!</a:t>
-            </a:r>
-            <a:endParaRPr lang="en-US" dirty="0"/>
+              <a:t>is not possible </a:t>
+            </a:r>
+            <a:r>
+              <a:rPr lang="en-US" dirty="0"/>
+              <a:t>(but is e.g. allowed in C)</a:t>
+            </a:r>
+            <a:endParaRPr lang="en-US" dirty="0">
+              <a:solidFill>
+                <a:srgbClr val="C00000"/>
+              </a:solidFill>
+            </a:endParaRPr>
           </a:p>
           <a:p>
             <a:pPr marL="0" indent="0" algn="ctr">
-              <a:spcBef>
-                <a:spcPts val="1800"/>
-              </a:spcBef>
+              <a:spcAft>
+                <a:spcPts val="1200"/>
+              </a:spcAft>
               <a:buNone/>
             </a:pPr>
-            <a:endParaRPr lang="en-US" dirty="0">
-              <a:sym typeface="Wingdings" panose="05000000000000000000" pitchFamily="2" charset="2"/>
-            </a:endParaRPr>
-          </a:p>
-        </p:txBody>
-      </p:sp>
-      <p:graphicFrame>
-        <p:nvGraphicFramePr>
-          <p:cNvPr id="4" name="Table 3"/>
-          <p:cNvGraphicFramePr>
-            <a:graphicFrameLocks noGrp="1"/>
-          </p:cNvGraphicFramePr>
-          <p:nvPr>
-            <p:extLst>
-              <p:ext uri="{D42A27DB-BD31-4B8C-83A1-F6EECF244321}">
-                <p14:modId xmlns:p14="http://schemas.microsoft.com/office/powerpoint/2010/main" val="3756868397"/>
-              </p:ext>
-            </p:extLst>
-          </p:nvPr>
-        </p:nvGraphicFramePr>
-        <p:xfrm>
-          <a:off x="9440883" y="190003"/>
-          <a:ext cx="2589786" cy="6533940"/>
-        </p:xfrm>
-        <a:graphic>
-          <a:graphicData uri="http://schemas.openxmlformats.org/drawingml/2006/table">
-            <a:tbl>
-              <a:tblPr/>
-              <a:tblGrid>
-                <a:gridCol w="2589786">
-                  <a:extLst>
-                    <a:ext uri="{9D8B030D-6E8A-4147-A177-3AD203B41FA5}">
-                      <a16:colId xmlns:a16="http://schemas.microsoft.com/office/drawing/2014/main" val="2486659109"/>
-                    </a:ext>
-                  </a:extLst>
-                </a:gridCol>
-              </a:tblGrid>
-              <a:tr h="324928">
-                <a:tc>
-                  <a:txBody>
-                    <a:bodyPr/>
-                    <a:lstStyle/>
-                    <a:p>
-                      <a:pPr algn="ctr"/>
-                      <a:r>
-                        <a:rPr lang="da-DK" sz="2000" u="none" dirty="0" err="1">
-                          <a:solidFill>
-                            <a:schemeClr val="bg1"/>
-                          </a:solidFill>
-                        </a:rPr>
-                        <a:t>Precedence</a:t>
-                      </a:r>
-                      <a:br>
-                        <a:rPr lang="da-DK" sz="2000" u="none" dirty="0">
-                          <a:solidFill>
-                            <a:schemeClr val="bg1"/>
-                          </a:solidFill>
-                        </a:rPr>
-                      </a:br>
-                      <a:r>
-                        <a:rPr lang="da-DK" sz="2000" u="none" baseline="0" dirty="0">
-                          <a:solidFill>
-                            <a:schemeClr val="bg1"/>
-                          </a:solidFill>
-                        </a:rPr>
-                        <a:t> (</a:t>
-                      </a:r>
-                      <a:r>
-                        <a:rPr lang="da-DK" sz="2000" u="none" baseline="0" dirty="0" err="1">
-                          <a:solidFill>
-                            <a:schemeClr val="bg1"/>
-                          </a:solidFill>
-                        </a:rPr>
-                        <a:t>low</a:t>
-                      </a:r>
-                      <a:r>
-                        <a:rPr lang="da-DK" sz="2000" u="none" baseline="0" dirty="0">
-                          <a:solidFill>
-                            <a:schemeClr val="bg1"/>
-                          </a:solidFill>
-                        </a:rPr>
-                        <a:t> to </a:t>
-                      </a:r>
-                      <a:r>
-                        <a:rPr lang="da-DK" sz="2000" u="none" baseline="0" dirty="0" err="1">
-                          <a:solidFill>
-                            <a:schemeClr val="bg1"/>
-                          </a:solidFill>
-                        </a:rPr>
-                        <a:t>high</a:t>
-                      </a:r>
-                      <a:r>
-                        <a:rPr lang="da-DK" sz="2000" u="none" baseline="0" dirty="0">
-                          <a:solidFill>
-                            <a:schemeClr val="bg1"/>
-                          </a:solidFill>
-                        </a:rPr>
-                        <a:t>)</a:t>
-                      </a:r>
-                      <a:endParaRPr lang="da-DK" sz="2000" u="none" dirty="0">
-                        <a:solidFill>
-                          <a:schemeClr val="bg1"/>
-                        </a:solidFill>
-                      </a:endParaRPr>
-                    </a:p>
-                  </a:txBody>
-                  <a:tcPr marL="80580" marR="80580" marT="40290" marB="40290" anchor="ctr">
-                    <a:lnL w="12700" cap="flat" cmpd="sng" algn="ctr">
-                      <a:solidFill>
-                        <a:schemeClr val="tx1"/>
-                      </a:solidFill>
-                      <a:prstDash val="solid"/>
-                      <a:round/>
-                      <a:headEnd type="none" w="med" len="med"/>
-                      <a:tailEnd type="none" w="med" len="med"/>
-                    </a:lnL>
-                    <a:lnR w="12700" cap="flat" cmpd="sng" algn="ctr">
-                      <a:solidFill>
-                        <a:schemeClr val="tx1"/>
-                      </a:solidFill>
-                      <a:prstDash val="solid"/>
-                      <a:round/>
-                      <a:headEnd type="none" w="med" len="med"/>
-                      <a:tailEnd type="none" w="med" len="med"/>
-                    </a:lnR>
-                    <a:lnT w="12700" cap="flat" cmpd="sng" algn="ctr">
-                      <a:solidFill>
-                        <a:schemeClr val="tx1"/>
-                      </a:solidFill>
-                      <a:prstDash val="solid"/>
-                      <a:round/>
-                      <a:headEnd type="none" w="med" len="med"/>
-                      <a:tailEnd type="none" w="med" len="med"/>
-                    </a:lnT>
-                    <a:lnB w="12700" cap="flat" cmpd="sng" algn="ctr">
-                      <a:solidFill>
-                        <a:schemeClr val="tx1"/>
-                      </a:solidFill>
-                      <a:prstDash val="solid"/>
-                      <a:round/>
-                      <a:headEnd type="none" w="med" len="med"/>
-                      <a:tailEnd type="none" w="med" len="med"/>
-                    </a:lnB>
-                    <a:solidFill>
-                      <a:srgbClr val="C00000"/>
-                    </a:solidFill>
-                  </a:tcPr>
-                </a:tc>
-                <a:extLst>
-                  <a:ext uri="{0D108BD9-81ED-4DB2-BD59-A6C34878D82A}">
-                    <a16:rowId xmlns:a16="http://schemas.microsoft.com/office/drawing/2014/main" val="3138802606"/>
-                  </a:ext>
-                </a:extLst>
-              </a:tr>
-              <a:tr h="324928">
-                <a:tc>
-                  <a:txBody>
-                    <a:bodyPr/>
-                    <a:lstStyle/>
-                    <a:p>
-                      <a:pPr algn="ctr"/>
-                      <a:r>
-                        <a:rPr lang="da-DK" sz="2000" u="none" dirty="0">
-                          <a:latin typeface="Courier New" panose="02070309020205020404" pitchFamily="49" charset="0"/>
-                          <a:cs typeface="Courier New" panose="02070309020205020404" pitchFamily="49" charset="0"/>
-                        </a:rPr>
-                        <a:t>or</a:t>
-                      </a:r>
-                    </a:p>
-                  </a:txBody>
-                  <a:tcPr marL="80580" marR="80580" marT="40290" marB="40290" anchor="ctr">
-                    <a:lnL w="12700" cap="flat" cmpd="sng" algn="ctr">
-                      <a:solidFill>
-                        <a:schemeClr val="tx1"/>
-                      </a:solidFill>
-                      <a:prstDash val="solid"/>
-                      <a:round/>
-                      <a:headEnd type="none" w="med" len="med"/>
-                      <a:tailEnd type="none" w="med" len="med"/>
-                    </a:lnL>
-                    <a:lnR w="12700" cap="flat" cmpd="sng" algn="ctr">
-                      <a:solidFill>
-                        <a:schemeClr val="tx1"/>
-                      </a:solidFill>
-                      <a:prstDash val="solid"/>
-                      <a:round/>
-                      <a:headEnd type="none" w="med" len="med"/>
-                      <a:tailEnd type="none" w="med" len="med"/>
-                    </a:lnR>
-                    <a:lnT w="12700" cap="flat" cmpd="sng" algn="ctr">
-                      <a:solidFill>
-                        <a:schemeClr val="tx1"/>
-                      </a:solidFill>
-                      <a:prstDash val="solid"/>
-                      <a:round/>
-                      <a:headEnd type="none" w="med" len="med"/>
-                      <a:tailEnd type="none" w="med" len="med"/>
-                    </a:lnT>
-                    <a:lnB w="12700" cap="flat" cmpd="sng" algn="ctr">
-                      <a:solidFill>
-                        <a:schemeClr val="tx1"/>
-                      </a:solidFill>
-                      <a:prstDash val="solid"/>
-                      <a:round/>
-                      <a:headEnd type="none" w="med" len="med"/>
-                      <a:tailEnd type="none" w="med" len="med"/>
-                    </a:lnB>
-                    <a:solidFill>
-                      <a:schemeClr val="accent5">
-                        <a:lumMod val="20000"/>
-                        <a:lumOff val="80000"/>
-                      </a:schemeClr>
-                    </a:solidFill>
-                  </a:tcPr>
-                </a:tc>
-                <a:extLst>
-                  <a:ext uri="{0D108BD9-81ED-4DB2-BD59-A6C34878D82A}">
-                    <a16:rowId xmlns:a16="http://schemas.microsoft.com/office/drawing/2014/main" val="564454404"/>
-                  </a:ext>
-                </a:extLst>
-              </a:tr>
-              <a:tr h="324928">
-                <a:tc>
-                  <a:txBody>
-                    <a:bodyPr/>
-                    <a:lstStyle/>
-                    <a:p>
-                      <a:pPr algn="ctr"/>
-                      <a:r>
-                        <a:rPr lang="da-DK" sz="2000" u="none" dirty="0">
-                          <a:latin typeface="Courier New" panose="02070309020205020404" pitchFamily="49" charset="0"/>
-                          <a:cs typeface="Courier New" panose="02070309020205020404" pitchFamily="49" charset="0"/>
-                        </a:rPr>
-                        <a:t>and</a:t>
-                      </a:r>
-                    </a:p>
-                  </a:txBody>
-                  <a:tcPr marL="80580" marR="80580" marT="40290" marB="40290" anchor="ctr">
-                    <a:lnL w="12700" cap="flat" cmpd="sng" algn="ctr">
-                      <a:solidFill>
-                        <a:schemeClr val="tx1"/>
-                      </a:solidFill>
-                      <a:prstDash val="solid"/>
-                      <a:round/>
-                      <a:headEnd type="none" w="med" len="med"/>
-                      <a:tailEnd type="none" w="med" len="med"/>
-                    </a:lnL>
-                    <a:lnR w="12700" cap="flat" cmpd="sng" algn="ctr">
-                      <a:solidFill>
-                        <a:schemeClr val="tx1"/>
-                      </a:solidFill>
-                      <a:prstDash val="solid"/>
-                      <a:round/>
-                      <a:headEnd type="none" w="med" len="med"/>
-                      <a:tailEnd type="none" w="med" len="med"/>
-                    </a:lnR>
-                    <a:lnT w="12700" cap="flat" cmpd="sng" algn="ctr">
-                      <a:solidFill>
-                        <a:schemeClr val="tx1"/>
-                      </a:solidFill>
-                      <a:prstDash val="solid"/>
-                      <a:round/>
-                      <a:headEnd type="none" w="med" len="med"/>
-                      <a:tailEnd type="none" w="med" len="med"/>
-                    </a:lnT>
-                    <a:lnB w="12700" cap="flat" cmpd="sng" algn="ctr">
-                      <a:solidFill>
-                        <a:schemeClr val="tx1"/>
-                      </a:solidFill>
-                      <a:prstDash val="solid"/>
-                      <a:round/>
-                      <a:headEnd type="none" w="med" len="med"/>
-                      <a:tailEnd type="none" w="med" len="med"/>
-                    </a:lnB>
-                    <a:solidFill>
-                      <a:schemeClr val="accent5">
-                        <a:lumMod val="20000"/>
-                        <a:lumOff val="80000"/>
-                      </a:schemeClr>
-                    </a:solidFill>
-                  </a:tcPr>
-                </a:tc>
-                <a:extLst>
-                  <a:ext uri="{0D108BD9-81ED-4DB2-BD59-A6C34878D82A}">
-                    <a16:rowId xmlns:a16="http://schemas.microsoft.com/office/drawing/2014/main" val="2863982840"/>
-                  </a:ext>
-                </a:extLst>
-              </a:tr>
-              <a:tr h="324928">
-                <a:tc>
-                  <a:txBody>
-                    <a:bodyPr/>
-                    <a:lstStyle/>
-                    <a:p>
-                      <a:pPr algn="ctr"/>
-                      <a:r>
-                        <a:rPr lang="da-DK" sz="2000" u="none" dirty="0">
-                          <a:latin typeface="Courier New" panose="02070309020205020404" pitchFamily="49" charset="0"/>
-                          <a:cs typeface="Courier New" panose="02070309020205020404" pitchFamily="49" charset="0"/>
-                        </a:rPr>
-                        <a:t>not </a:t>
-                      </a:r>
-                      <a:r>
-                        <a:rPr lang="da-DK" sz="2000" i="1" u="none" dirty="0">
-                          <a:latin typeface="Courier New" panose="02070309020205020404" pitchFamily="49" charset="0"/>
-                          <a:cs typeface="Courier New" panose="02070309020205020404" pitchFamily="49" charset="0"/>
-                        </a:rPr>
-                        <a:t>x</a:t>
-                      </a:r>
-                    </a:p>
-                  </a:txBody>
-                  <a:tcPr marL="80580" marR="80580" marT="40290" marB="40290" anchor="ctr">
-                    <a:lnL w="12700" cap="flat" cmpd="sng" algn="ctr">
-                      <a:solidFill>
-                        <a:schemeClr val="tx1"/>
-                      </a:solidFill>
-                      <a:prstDash val="solid"/>
-                      <a:round/>
-                      <a:headEnd type="none" w="med" len="med"/>
-                      <a:tailEnd type="none" w="med" len="med"/>
-                    </a:lnL>
-                    <a:lnR w="12700" cap="flat" cmpd="sng" algn="ctr">
-                      <a:solidFill>
-                        <a:schemeClr val="tx1"/>
-                      </a:solidFill>
-                      <a:prstDash val="solid"/>
-                      <a:round/>
-                      <a:headEnd type="none" w="med" len="med"/>
-                      <a:tailEnd type="none" w="med" len="med"/>
-                    </a:lnR>
-                    <a:lnT w="12700" cap="flat" cmpd="sng" algn="ctr">
-                      <a:solidFill>
-                        <a:schemeClr val="tx1"/>
-                      </a:solidFill>
-                      <a:prstDash val="solid"/>
-                      <a:round/>
-                      <a:headEnd type="none" w="med" len="med"/>
-                      <a:tailEnd type="none" w="med" len="med"/>
-                    </a:lnT>
-                    <a:lnB w="12700" cap="flat" cmpd="sng" algn="ctr">
-                      <a:solidFill>
-                        <a:schemeClr val="tx1"/>
-                      </a:solidFill>
-                      <a:prstDash val="solid"/>
-                      <a:round/>
-                      <a:headEnd type="none" w="med" len="med"/>
-                      <a:tailEnd type="none" w="med" len="med"/>
-                    </a:lnB>
-                    <a:solidFill>
-                      <a:schemeClr val="accent5">
-                        <a:lumMod val="20000"/>
-                        <a:lumOff val="80000"/>
-                      </a:schemeClr>
-                    </a:solidFill>
-                  </a:tcPr>
-                </a:tc>
-                <a:extLst>
-                  <a:ext uri="{0D108BD9-81ED-4DB2-BD59-A6C34878D82A}">
-                    <a16:rowId xmlns:a16="http://schemas.microsoft.com/office/drawing/2014/main" val="2243352647"/>
-                  </a:ext>
-                </a:extLst>
-              </a:tr>
-              <a:tr h="564945">
-                <a:tc>
-                  <a:txBody>
-                    <a:bodyPr/>
-                    <a:lstStyle/>
-                    <a:p>
-                      <a:pPr algn="ctr"/>
-                      <a:r>
-                        <a:rPr lang="en-US" sz="2000" u="none" dirty="0">
-                          <a:latin typeface="Courier New" panose="02070309020205020404" pitchFamily="49" charset="0"/>
-                          <a:cs typeface="Courier New" panose="02070309020205020404" pitchFamily="49" charset="0"/>
-                        </a:rPr>
-                        <a:t>in</a:t>
-                      </a:r>
-                      <a:r>
-                        <a:rPr lang="en-US" sz="2000" u="none" baseline="0" dirty="0">
-                          <a:latin typeface="Courier New" panose="02070309020205020404" pitchFamily="49" charset="0"/>
-                          <a:cs typeface="Courier New" panose="02070309020205020404" pitchFamily="49" charset="0"/>
-                        </a:rPr>
-                        <a:t>  </a:t>
-                      </a:r>
-                      <a:r>
-                        <a:rPr lang="en-US" sz="2000" u="none" dirty="0">
-                          <a:latin typeface="Courier New" panose="02070309020205020404" pitchFamily="49" charset="0"/>
-                          <a:cs typeface="Courier New" panose="02070309020205020404" pitchFamily="49" charset="0"/>
-                        </a:rPr>
-                        <a:t> not in</a:t>
-                      </a:r>
-                    </a:p>
-                    <a:p>
-                      <a:pPr algn="ctr"/>
-                      <a:r>
-                        <a:rPr lang="en-US" sz="2000" u="none" dirty="0">
-                          <a:latin typeface="Courier New" panose="02070309020205020404" pitchFamily="49" charset="0"/>
-                          <a:cs typeface="Courier New" panose="02070309020205020404" pitchFamily="49" charset="0"/>
-                        </a:rPr>
-                        <a:t>is   </a:t>
-                      </a:r>
-                      <a:r>
-                        <a:rPr lang="en-US" sz="2000" u="none" dirty="0" err="1">
-                          <a:latin typeface="Courier New" panose="02070309020205020404" pitchFamily="49" charset="0"/>
-                          <a:cs typeface="Courier New" panose="02070309020205020404" pitchFamily="49" charset="0"/>
-                        </a:rPr>
-                        <a:t>is</a:t>
-                      </a:r>
-                      <a:r>
-                        <a:rPr lang="en-US" sz="2000" u="none" dirty="0">
-                          <a:latin typeface="Courier New" panose="02070309020205020404" pitchFamily="49" charset="0"/>
-                          <a:cs typeface="Courier New" panose="02070309020205020404" pitchFamily="49" charset="0"/>
-                        </a:rPr>
-                        <a:t> not</a:t>
-                      </a:r>
-                    </a:p>
-                    <a:p>
-                      <a:pPr algn="ctr"/>
-                      <a:r>
-                        <a:rPr lang="en-US" sz="2000" u="none" dirty="0">
-                          <a:latin typeface="Courier New" panose="02070309020205020404" pitchFamily="49" charset="0"/>
-                          <a:cs typeface="Courier New" panose="02070309020205020404" pitchFamily="49" charset="0"/>
-                        </a:rPr>
-                        <a:t>==   &lt;   &lt;=</a:t>
-                      </a:r>
-                    </a:p>
-                    <a:p>
-                      <a:pPr algn="ctr"/>
-                      <a:r>
-                        <a:rPr lang="en-US" sz="2000" u="none" dirty="0">
-                          <a:latin typeface="Courier New" panose="02070309020205020404" pitchFamily="49" charset="0"/>
-                          <a:cs typeface="Courier New" panose="02070309020205020404" pitchFamily="49" charset="0"/>
-                        </a:rPr>
-                        <a:t>!=   &gt;</a:t>
-                      </a:r>
-                      <a:r>
-                        <a:rPr lang="en-US" sz="2000" u="none" baseline="0" dirty="0">
-                          <a:latin typeface="Courier New" panose="02070309020205020404" pitchFamily="49" charset="0"/>
-                          <a:cs typeface="Courier New" panose="02070309020205020404" pitchFamily="49" charset="0"/>
-                        </a:rPr>
-                        <a:t>  </a:t>
-                      </a:r>
-                      <a:r>
-                        <a:rPr lang="en-US" sz="2000" u="none" dirty="0">
-                          <a:latin typeface="Courier New" panose="02070309020205020404" pitchFamily="49" charset="0"/>
-                          <a:cs typeface="Courier New" panose="02070309020205020404" pitchFamily="49" charset="0"/>
-                        </a:rPr>
-                        <a:t> &gt;=</a:t>
-                      </a:r>
-                    </a:p>
-                  </a:txBody>
-                  <a:tcPr marL="80580" marR="80580" marT="40290" marB="40290" anchor="ctr">
-                    <a:lnL w="12700" cap="flat" cmpd="sng" algn="ctr">
-                      <a:solidFill>
-                        <a:schemeClr val="tx1"/>
-                      </a:solidFill>
-                      <a:prstDash val="solid"/>
-                      <a:round/>
-                      <a:headEnd type="none" w="med" len="med"/>
-                      <a:tailEnd type="none" w="med" len="med"/>
-                    </a:lnL>
-                    <a:lnR w="12700" cap="flat" cmpd="sng" algn="ctr">
-                      <a:solidFill>
-                        <a:schemeClr val="tx1"/>
-                      </a:solidFill>
-                      <a:prstDash val="solid"/>
-                      <a:round/>
-                      <a:headEnd type="none" w="med" len="med"/>
-                      <a:tailEnd type="none" w="med" len="med"/>
-                    </a:lnR>
-                    <a:lnT w="12700" cap="flat" cmpd="sng" algn="ctr">
-                      <a:solidFill>
-                        <a:schemeClr val="tx1"/>
-                      </a:solidFill>
-                      <a:prstDash val="solid"/>
-                      <a:round/>
-                      <a:headEnd type="none" w="med" len="med"/>
-                      <a:tailEnd type="none" w="med" len="med"/>
-                    </a:lnT>
-                    <a:lnB w="12700" cap="flat" cmpd="sng" algn="ctr">
-                      <a:solidFill>
-                        <a:schemeClr val="tx1"/>
-                      </a:solidFill>
-                      <a:prstDash val="solid"/>
-                      <a:round/>
-                      <a:headEnd type="none" w="med" len="med"/>
-                      <a:tailEnd type="none" w="med" len="med"/>
-                    </a:lnB>
-                    <a:solidFill>
-                      <a:schemeClr val="accent5">
-                        <a:lumMod val="20000"/>
-                        <a:lumOff val="80000"/>
-                      </a:schemeClr>
-                    </a:solidFill>
-                  </a:tcPr>
-                </a:tc>
-                <a:extLst>
-                  <a:ext uri="{0D108BD9-81ED-4DB2-BD59-A6C34878D82A}">
-                    <a16:rowId xmlns:a16="http://schemas.microsoft.com/office/drawing/2014/main" val="268387812"/>
-                  </a:ext>
-                </a:extLst>
-              </a:tr>
-              <a:tr h="324928">
-                <a:tc>
-                  <a:txBody>
-                    <a:bodyPr/>
-                    <a:lstStyle/>
-                    <a:p>
-                      <a:pPr algn="ctr"/>
-                      <a:r>
-                        <a:rPr lang="da-DK" sz="2000" u="none" dirty="0">
-                          <a:latin typeface="Courier New" panose="02070309020205020404" pitchFamily="49" charset="0"/>
-                          <a:cs typeface="Courier New" panose="02070309020205020404" pitchFamily="49" charset="0"/>
-                        </a:rPr>
-                        <a:t>|</a:t>
-                      </a:r>
-                    </a:p>
-                  </a:txBody>
-                  <a:tcPr marL="80580" marR="80580" marT="40290" marB="40290" anchor="ctr">
-                    <a:lnL w="12700" cap="flat" cmpd="sng" algn="ctr">
-                      <a:solidFill>
-                        <a:schemeClr val="tx1"/>
-                      </a:solidFill>
-                      <a:prstDash val="solid"/>
-                      <a:round/>
-                      <a:headEnd type="none" w="med" len="med"/>
-                      <a:tailEnd type="none" w="med" len="med"/>
-                    </a:lnL>
-                    <a:lnR w="12700" cap="flat" cmpd="sng" algn="ctr">
-                      <a:solidFill>
-                        <a:schemeClr val="tx1"/>
-                      </a:solidFill>
-                      <a:prstDash val="solid"/>
-                      <a:round/>
-                      <a:headEnd type="none" w="med" len="med"/>
-                      <a:tailEnd type="none" w="med" len="med"/>
-                    </a:lnR>
-                    <a:lnT w="12700" cap="flat" cmpd="sng" algn="ctr">
-                      <a:solidFill>
-                        <a:schemeClr val="tx1"/>
-                      </a:solidFill>
-                      <a:prstDash val="solid"/>
-                      <a:round/>
-                      <a:headEnd type="none" w="med" len="med"/>
-                      <a:tailEnd type="none" w="med" len="med"/>
-                    </a:lnT>
-                    <a:lnB w="12700" cap="flat" cmpd="sng" algn="ctr">
-                      <a:solidFill>
-                        <a:schemeClr val="tx1"/>
-                      </a:solidFill>
-                      <a:prstDash val="solid"/>
-                      <a:round/>
-                      <a:headEnd type="none" w="med" len="med"/>
-                      <a:tailEnd type="none" w="med" len="med"/>
-                    </a:lnB>
-                    <a:solidFill>
-                      <a:schemeClr val="accent5">
-                        <a:lumMod val="20000"/>
-                        <a:lumOff val="80000"/>
-                      </a:schemeClr>
-                    </a:solidFill>
-                  </a:tcPr>
-                </a:tc>
-                <a:extLst>
-                  <a:ext uri="{0D108BD9-81ED-4DB2-BD59-A6C34878D82A}">
-                    <a16:rowId xmlns:a16="http://schemas.microsoft.com/office/drawing/2014/main" val="2141160183"/>
-                  </a:ext>
-                </a:extLst>
-              </a:tr>
-              <a:tr h="324928">
-                <a:tc>
-                  <a:txBody>
-                    <a:bodyPr/>
-                    <a:lstStyle/>
-                    <a:p>
-                      <a:pPr algn="ctr"/>
-                      <a:r>
-                        <a:rPr lang="da-DK" sz="2000" u="none" dirty="0">
-                          <a:latin typeface="Courier New" panose="02070309020205020404" pitchFamily="49" charset="0"/>
-                          <a:cs typeface="Courier New" panose="02070309020205020404" pitchFamily="49" charset="0"/>
-                        </a:rPr>
-                        <a:t>^</a:t>
-                      </a:r>
-                    </a:p>
-                  </a:txBody>
-                  <a:tcPr marL="80580" marR="80580" marT="40290" marB="40290" anchor="ctr">
-                    <a:lnL w="12700" cap="flat" cmpd="sng" algn="ctr">
-                      <a:solidFill>
-                        <a:schemeClr val="tx1"/>
-                      </a:solidFill>
-                      <a:prstDash val="solid"/>
-                      <a:round/>
-                      <a:headEnd type="none" w="med" len="med"/>
-                      <a:tailEnd type="none" w="med" len="med"/>
-                    </a:lnL>
-                    <a:lnR w="12700" cap="flat" cmpd="sng" algn="ctr">
-                      <a:solidFill>
-                        <a:schemeClr val="tx1"/>
-                      </a:solidFill>
-                      <a:prstDash val="solid"/>
-                      <a:round/>
-                      <a:headEnd type="none" w="med" len="med"/>
-                      <a:tailEnd type="none" w="med" len="med"/>
-                    </a:lnR>
-                    <a:lnT w="12700" cap="flat" cmpd="sng" algn="ctr">
-                      <a:solidFill>
-                        <a:schemeClr val="tx1"/>
-                      </a:solidFill>
-                      <a:prstDash val="solid"/>
-                      <a:round/>
-                      <a:headEnd type="none" w="med" len="med"/>
-                      <a:tailEnd type="none" w="med" len="med"/>
-                    </a:lnT>
-                    <a:lnB w="12700" cap="flat" cmpd="sng" algn="ctr">
-                      <a:solidFill>
-                        <a:schemeClr val="tx1"/>
-                      </a:solidFill>
-                      <a:prstDash val="solid"/>
-                      <a:round/>
-                      <a:headEnd type="none" w="med" len="med"/>
-                      <a:tailEnd type="none" w="med" len="med"/>
-                    </a:lnB>
-                    <a:solidFill>
-                      <a:schemeClr val="accent5">
-                        <a:lumMod val="20000"/>
-                        <a:lumOff val="80000"/>
-                      </a:schemeClr>
-                    </a:solidFill>
-                  </a:tcPr>
-                </a:tc>
-                <a:extLst>
-                  <a:ext uri="{0D108BD9-81ED-4DB2-BD59-A6C34878D82A}">
-                    <a16:rowId xmlns:a16="http://schemas.microsoft.com/office/drawing/2014/main" val="751939433"/>
-                  </a:ext>
-                </a:extLst>
-              </a:tr>
-              <a:tr h="324928">
-                <a:tc>
-                  <a:txBody>
-                    <a:bodyPr/>
-                    <a:lstStyle/>
-                    <a:p>
-                      <a:pPr algn="ctr"/>
-                      <a:r>
-                        <a:rPr lang="da-DK" sz="2000" u="none" dirty="0">
-                          <a:latin typeface="Courier New" panose="02070309020205020404" pitchFamily="49" charset="0"/>
-                          <a:cs typeface="Courier New" panose="02070309020205020404" pitchFamily="49" charset="0"/>
-                        </a:rPr>
-                        <a:t>&amp;</a:t>
-                      </a:r>
-                    </a:p>
-                  </a:txBody>
-                  <a:tcPr marL="80580" marR="80580" marT="40290" marB="40290" anchor="ctr">
-                    <a:lnL w="12700" cap="flat" cmpd="sng" algn="ctr">
-                      <a:solidFill>
-                        <a:schemeClr val="tx1"/>
-                      </a:solidFill>
-                      <a:prstDash val="solid"/>
-                      <a:round/>
-                      <a:headEnd type="none" w="med" len="med"/>
-                      <a:tailEnd type="none" w="med" len="med"/>
-                    </a:lnL>
-                    <a:lnR w="12700" cap="flat" cmpd="sng" algn="ctr">
-                      <a:solidFill>
-                        <a:schemeClr val="tx1"/>
-                      </a:solidFill>
-                      <a:prstDash val="solid"/>
-                      <a:round/>
-                      <a:headEnd type="none" w="med" len="med"/>
-                      <a:tailEnd type="none" w="med" len="med"/>
-                    </a:lnR>
-                    <a:lnT w="12700" cap="flat" cmpd="sng" algn="ctr">
-                      <a:solidFill>
-                        <a:schemeClr val="tx1"/>
-                      </a:solidFill>
-                      <a:prstDash val="solid"/>
-                      <a:round/>
-                      <a:headEnd type="none" w="med" len="med"/>
-                      <a:tailEnd type="none" w="med" len="med"/>
-                    </a:lnT>
-                    <a:lnB w="12700" cap="flat" cmpd="sng" algn="ctr">
-                      <a:solidFill>
-                        <a:schemeClr val="tx1"/>
-                      </a:solidFill>
-                      <a:prstDash val="solid"/>
-                      <a:round/>
-                      <a:headEnd type="none" w="med" len="med"/>
-                      <a:tailEnd type="none" w="med" len="med"/>
-                    </a:lnB>
-                    <a:solidFill>
-                      <a:schemeClr val="accent5">
-                        <a:lumMod val="20000"/>
-                        <a:lumOff val="80000"/>
-                      </a:schemeClr>
-                    </a:solidFill>
-                  </a:tcPr>
-                </a:tc>
-                <a:extLst>
-                  <a:ext uri="{0D108BD9-81ED-4DB2-BD59-A6C34878D82A}">
-                    <a16:rowId xmlns:a16="http://schemas.microsoft.com/office/drawing/2014/main" val="3957012914"/>
-                  </a:ext>
-                </a:extLst>
-              </a:tr>
-              <a:tr h="324928">
-                <a:tc>
-                  <a:txBody>
-                    <a:bodyPr/>
-                    <a:lstStyle/>
-                    <a:p>
-                      <a:pPr algn="ctr"/>
-                      <a:r>
-                        <a:rPr lang="da-DK" sz="2000" u="none" dirty="0">
-                          <a:latin typeface="Courier New" panose="02070309020205020404" pitchFamily="49" charset="0"/>
-                          <a:cs typeface="Courier New" panose="02070309020205020404" pitchFamily="49" charset="0"/>
-                        </a:rPr>
-                        <a:t>&lt;&lt;</a:t>
-                      </a:r>
-                      <a:r>
-                        <a:rPr lang="da-DK" sz="2000" u="none" baseline="0" dirty="0">
-                          <a:latin typeface="Courier New" panose="02070309020205020404" pitchFamily="49" charset="0"/>
-                          <a:cs typeface="Courier New" panose="02070309020205020404" pitchFamily="49" charset="0"/>
-                        </a:rPr>
-                        <a:t>  </a:t>
-                      </a:r>
-                      <a:r>
-                        <a:rPr lang="da-DK" sz="2000" u="none" dirty="0">
-                          <a:latin typeface="Courier New" panose="02070309020205020404" pitchFamily="49" charset="0"/>
-                          <a:cs typeface="Courier New" panose="02070309020205020404" pitchFamily="49" charset="0"/>
-                        </a:rPr>
-                        <a:t> &gt;&gt;</a:t>
-                      </a:r>
-                    </a:p>
-                  </a:txBody>
-                  <a:tcPr marL="80580" marR="80580" marT="40290" marB="40290" anchor="ctr">
-                    <a:lnL w="12700" cap="flat" cmpd="sng" algn="ctr">
-                      <a:solidFill>
-                        <a:schemeClr val="tx1"/>
-                      </a:solidFill>
-                      <a:prstDash val="solid"/>
-                      <a:round/>
-                      <a:headEnd type="none" w="med" len="med"/>
-                      <a:tailEnd type="none" w="med" len="med"/>
-                    </a:lnL>
-                    <a:lnR w="12700" cap="flat" cmpd="sng" algn="ctr">
-                      <a:solidFill>
-                        <a:schemeClr val="tx1"/>
-                      </a:solidFill>
-                      <a:prstDash val="solid"/>
-                      <a:round/>
-                      <a:headEnd type="none" w="med" len="med"/>
-                      <a:tailEnd type="none" w="med" len="med"/>
-                    </a:lnR>
-                    <a:lnT w="12700" cap="flat" cmpd="sng" algn="ctr">
-                      <a:solidFill>
-                        <a:schemeClr val="tx1"/>
-                      </a:solidFill>
-                      <a:prstDash val="solid"/>
-                      <a:round/>
-                      <a:headEnd type="none" w="med" len="med"/>
-                      <a:tailEnd type="none" w="med" len="med"/>
-                    </a:lnT>
-                    <a:lnB w="12700" cap="flat" cmpd="sng" algn="ctr">
-                      <a:solidFill>
-                        <a:schemeClr val="tx1"/>
-                      </a:solidFill>
-                      <a:prstDash val="solid"/>
-                      <a:round/>
-                      <a:headEnd type="none" w="med" len="med"/>
-                      <a:tailEnd type="none" w="med" len="med"/>
-                    </a:lnB>
-                    <a:solidFill>
-                      <a:schemeClr val="accent5">
-                        <a:lumMod val="20000"/>
-                        <a:lumOff val="80000"/>
-                      </a:schemeClr>
-                    </a:solidFill>
-                  </a:tcPr>
-                </a:tc>
-                <a:extLst>
-                  <a:ext uri="{0D108BD9-81ED-4DB2-BD59-A6C34878D82A}">
-                    <a16:rowId xmlns:a16="http://schemas.microsoft.com/office/drawing/2014/main" val="672009882"/>
-                  </a:ext>
-                </a:extLst>
-              </a:tr>
-              <a:tr h="324928">
-                <a:tc>
-                  <a:txBody>
-                    <a:bodyPr/>
-                    <a:lstStyle/>
-                    <a:p>
-                      <a:pPr algn="ctr"/>
-                      <a:r>
-                        <a:rPr lang="da-DK" sz="2000" u="none" dirty="0">
-                          <a:latin typeface="Courier New" panose="02070309020205020404" pitchFamily="49" charset="0"/>
-                          <a:cs typeface="Courier New" panose="02070309020205020404" pitchFamily="49" charset="0"/>
-                        </a:rPr>
-                        <a:t>+</a:t>
-                      </a:r>
-                      <a:r>
-                        <a:rPr lang="da-DK" sz="2000" u="none" baseline="0" dirty="0">
-                          <a:latin typeface="Courier New" panose="02070309020205020404" pitchFamily="49" charset="0"/>
-                          <a:cs typeface="Courier New" panose="02070309020205020404" pitchFamily="49" charset="0"/>
-                        </a:rPr>
-                        <a:t>  </a:t>
-                      </a:r>
-                      <a:r>
-                        <a:rPr lang="da-DK" sz="2000" u="none" dirty="0">
-                          <a:latin typeface="Courier New" panose="02070309020205020404" pitchFamily="49" charset="0"/>
-                          <a:cs typeface="Courier New" panose="02070309020205020404" pitchFamily="49" charset="0"/>
-                        </a:rPr>
-                        <a:t> -</a:t>
-                      </a:r>
-                    </a:p>
-                  </a:txBody>
-                  <a:tcPr marL="80580" marR="80580" marT="40290" marB="40290" anchor="ctr">
-                    <a:lnL w="12700" cap="flat" cmpd="sng" algn="ctr">
-                      <a:solidFill>
-                        <a:schemeClr val="tx1"/>
-                      </a:solidFill>
-                      <a:prstDash val="solid"/>
-                      <a:round/>
-                      <a:headEnd type="none" w="med" len="med"/>
-                      <a:tailEnd type="none" w="med" len="med"/>
-                    </a:lnL>
-                    <a:lnR w="12700" cap="flat" cmpd="sng" algn="ctr">
-                      <a:solidFill>
-                        <a:schemeClr val="tx1"/>
-                      </a:solidFill>
-                      <a:prstDash val="solid"/>
-                      <a:round/>
-                      <a:headEnd type="none" w="med" len="med"/>
-                      <a:tailEnd type="none" w="med" len="med"/>
-                    </a:lnR>
-                    <a:lnT w="12700" cap="flat" cmpd="sng" algn="ctr">
-                      <a:solidFill>
-                        <a:schemeClr val="tx1"/>
-                      </a:solidFill>
-                      <a:prstDash val="solid"/>
-                      <a:round/>
-                      <a:headEnd type="none" w="med" len="med"/>
-                      <a:tailEnd type="none" w="med" len="med"/>
-                    </a:lnT>
-                    <a:lnB w="12700" cap="flat" cmpd="sng" algn="ctr">
-                      <a:solidFill>
-                        <a:schemeClr val="tx1"/>
-                      </a:solidFill>
-                      <a:prstDash val="solid"/>
-                      <a:round/>
-                      <a:headEnd type="none" w="med" len="med"/>
-                      <a:tailEnd type="none" w="med" len="med"/>
-                    </a:lnB>
-                    <a:solidFill>
-                      <a:schemeClr val="accent5">
-                        <a:lumMod val="20000"/>
-                        <a:lumOff val="80000"/>
-                      </a:schemeClr>
-                    </a:solidFill>
-                  </a:tcPr>
-                </a:tc>
-                <a:extLst>
-                  <a:ext uri="{0D108BD9-81ED-4DB2-BD59-A6C34878D82A}">
-                    <a16:rowId xmlns:a16="http://schemas.microsoft.com/office/drawing/2014/main" val="662020469"/>
-                  </a:ext>
-                </a:extLst>
-              </a:tr>
-              <a:tr h="564945">
-                <a:tc>
-                  <a:txBody>
-                    <a:bodyPr/>
-                    <a:lstStyle/>
-                    <a:p>
-                      <a:pPr algn="ctr"/>
-                      <a:r>
-                        <a:rPr lang="da-DK" sz="2000" u="none" dirty="0">
-                          <a:latin typeface="Courier New" panose="02070309020205020404" pitchFamily="49" charset="0"/>
-                          <a:cs typeface="Courier New" panose="02070309020205020404" pitchFamily="49" charset="0"/>
-                        </a:rPr>
-                        <a:t>*   @   </a:t>
-                      </a:r>
-                    </a:p>
-                    <a:p>
-                      <a:pPr algn="ctr"/>
-                      <a:r>
-                        <a:rPr lang="da-DK" sz="2000" u="none" dirty="0">
-                          <a:latin typeface="Courier New" panose="02070309020205020404" pitchFamily="49" charset="0"/>
-                          <a:cs typeface="Courier New" panose="02070309020205020404" pitchFamily="49" charset="0"/>
-                        </a:rPr>
-                        <a:t>/   //   %</a:t>
-                      </a:r>
-                    </a:p>
-                  </a:txBody>
-                  <a:tcPr marL="80580" marR="80580" marT="40290" marB="40290" anchor="ctr">
-                    <a:lnL w="12700" cap="flat" cmpd="sng" algn="ctr">
-                      <a:solidFill>
-                        <a:schemeClr val="tx1"/>
-                      </a:solidFill>
-                      <a:prstDash val="solid"/>
-                      <a:round/>
-                      <a:headEnd type="none" w="med" len="med"/>
-                      <a:tailEnd type="none" w="med" len="med"/>
-                    </a:lnL>
-                    <a:lnR w="12700" cap="flat" cmpd="sng" algn="ctr">
-                      <a:solidFill>
-                        <a:schemeClr val="tx1"/>
-                      </a:solidFill>
-                      <a:prstDash val="solid"/>
-                      <a:round/>
-                      <a:headEnd type="none" w="med" len="med"/>
-                      <a:tailEnd type="none" w="med" len="med"/>
-                    </a:lnR>
-                    <a:lnT w="12700" cap="flat" cmpd="sng" algn="ctr">
-                      <a:solidFill>
-                        <a:schemeClr val="tx1"/>
-                      </a:solidFill>
-                      <a:prstDash val="solid"/>
-                      <a:round/>
-                      <a:headEnd type="none" w="med" len="med"/>
-                      <a:tailEnd type="none" w="med" len="med"/>
-                    </a:lnT>
-                    <a:lnB w="12700" cap="flat" cmpd="sng" algn="ctr">
-                      <a:solidFill>
-                        <a:schemeClr val="tx1"/>
-                      </a:solidFill>
-                      <a:prstDash val="solid"/>
-                      <a:round/>
-                      <a:headEnd type="none" w="med" len="med"/>
-                      <a:tailEnd type="none" w="med" len="med"/>
-                    </a:lnB>
-                    <a:solidFill>
-                      <a:schemeClr val="accent5">
-                        <a:lumMod val="20000"/>
-                        <a:lumOff val="80000"/>
-                      </a:schemeClr>
-                    </a:solidFill>
-                  </a:tcPr>
-                </a:tc>
-                <a:extLst>
-                  <a:ext uri="{0D108BD9-81ED-4DB2-BD59-A6C34878D82A}">
-                    <a16:rowId xmlns:a16="http://schemas.microsoft.com/office/drawing/2014/main" val="2838861763"/>
-                  </a:ext>
-                </a:extLst>
-              </a:tr>
-              <a:tr h="0">
-                <a:tc>
-                  <a:txBody>
-                    <a:bodyPr/>
-                    <a:lstStyle/>
-                    <a:p>
-                      <a:pPr algn="ctr"/>
-                      <a:r>
-                        <a:rPr lang="da-DK" sz="2000" u="none" dirty="0">
-                          <a:latin typeface="Courier New" panose="02070309020205020404" pitchFamily="49" charset="0"/>
-                          <a:cs typeface="Courier New" panose="02070309020205020404" pitchFamily="49" charset="0"/>
-                        </a:rPr>
-                        <a:t>+</a:t>
-                      </a:r>
-                      <a:r>
-                        <a:rPr lang="da-DK" sz="2000" i="1" u="none" dirty="0">
-                          <a:latin typeface="Courier New" panose="02070309020205020404" pitchFamily="49" charset="0"/>
-                          <a:cs typeface="Courier New" panose="02070309020205020404" pitchFamily="49" charset="0"/>
-                        </a:rPr>
-                        <a:t>x</a:t>
-                      </a:r>
-                      <a:r>
-                        <a:rPr lang="da-DK" sz="2000" u="none" baseline="0" dirty="0">
-                          <a:latin typeface="Courier New" panose="02070309020205020404" pitchFamily="49" charset="0"/>
-                          <a:cs typeface="Courier New" panose="02070309020205020404" pitchFamily="49" charset="0"/>
-                        </a:rPr>
-                        <a:t>  </a:t>
-                      </a:r>
-                      <a:r>
-                        <a:rPr lang="da-DK" sz="2000" u="none" dirty="0">
-                          <a:latin typeface="Courier New" panose="02070309020205020404" pitchFamily="49" charset="0"/>
-                          <a:cs typeface="Courier New" panose="02070309020205020404" pitchFamily="49" charset="0"/>
-                        </a:rPr>
-                        <a:t> -</a:t>
-                      </a:r>
-                      <a:r>
-                        <a:rPr lang="da-DK" sz="2000" i="1" u="none" dirty="0">
-                          <a:latin typeface="Courier New" panose="02070309020205020404" pitchFamily="49" charset="0"/>
-                          <a:cs typeface="Courier New" panose="02070309020205020404" pitchFamily="49" charset="0"/>
-                        </a:rPr>
-                        <a:t>x</a:t>
-                      </a:r>
-                      <a:r>
-                        <a:rPr lang="da-DK" sz="2000" u="none" baseline="0" dirty="0">
-                          <a:latin typeface="Courier New" panose="02070309020205020404" pitchFamily="49" charset="0"/>
-                          <a:cs typeface="Courier New" panose="02070309020205020404" pitchFamily="49" charset="0"/>
-                        </a:rPr>
-                        <a:t>  </a:t>
-                      </a:r>
-                      <a:r>
-                        <a:rPr lang="da-DK" sz="2000" u="none" dirty="0">
-                          <a:latin typeface="Courier New" panose="02070309020205020404" pitchFamily="49" charset="0"/>
-                          <a:cs typeface="Courier New" panose="02070309020205020404" pitchFamily="49" charset="0"/>
-                        </a:rPr>
-                        <a:t> ~</a:t>
-                      </a:r>
-                      <a:r>
-                        <a:rPr lang="da-DK" sz="2000" i="1" u="none" dirty="0">
-                          <a:latin typeface="Courier New" panose="02070309020205020404" pitchFamily="49" charset="0"/>
-                          <a:cs typeface="Courier New" panose="02070309020205020404" pitchFamily="49" charset="0"/>
-                        </a:rPr>
-                        <a:t>x</a:t>
-                      </a:r>
-                    </a:p>
-                  </a:txBody>
-                  <a:tcPr marL="80580" marR="80580" marT="40290" marB="40290" anchor="ctr">
-                    <a:lnL w="12700" cap="flat" cmpd="sng" algn="ctr">
-                      <a:solidFill>
-                        <a:schemeClr val="tx1"/>
-                      </a:solidFill>
-                      <a:prstDash val="solid"/>
-                      <a:round/>
-                      <a:headEnd type="none" w="med" len="med"/>
-                      <a:tailEnd type="none" w="med" len="med"/>
-                    </a:lnL>
-                    <a:lnR w="12700" cap="flat" cmpd="sng" algn="ctr">
-                      <a:solidFill>
-                        <a:schemeClr val="tx1"/>
-                      </a:solidFill>
-                      <a:prstDash val="solid"/>
-                      <a:round/>
-                      <a:headEnd type="none" w="med" len="med"/>
-                      <a:tailEnd type="none" w="med" len="med"/>
-                    </a:lnR>
-                    <a:lnT w="12700" cap="flat" cmpd="sng" algn="ctr">
-                      <a:solidFill>
-                        <a:schemeClr val="tx1"/>
-                      </a:solidFill>
-                      <a:prstDash val="solid"/>
-                      <a:round/>
-                      <a:headEnd type="none" w="med" len="med"/>
-                      <a:tailEnd type="none" w="med" len="med"/>
-                    </a:lnT>
-                    <a:lnB w="12700" cap="flat" cmpd="sng" algn="ctr">
-                      <a:solidFill>
-                        <a:schemeClr val="tx1"/>
-                      </a:solidFill>
-                      <a:prstDash val="solid"/>
-                      <a:round/>
-                      <a:headEnd type="none" w="med" len="med"/>
-                      <a:tailEnd type="none" w="med" len="med"/>
-                    </a:lnB>
-                    <a:solidFill>
-                      <a:schemeClr val="accent5">
-                        <a:lumMod val="20000"/>
-                        <a:lumOff val="80000"/>
-                      </a:schemeClr>
-                    </a:solidFill>
-                  </a:tcPr>
-                </a:tc>
-                <a:extLst>
-                  <a:ext uri="{0D108BD9-81ED-4DB2-BD59-A6C34878D82A}">
-                    <a16:rowId xmlns:a16="http://schemas.microsoft.com/office/drawing/2014/main" val="1553472579"/>
-                  </a:ext>
-                </a:extLst>
-              </a:tr>
-              <a:tr h="324928">
-                <a:tc>
-                  <a:txBody>
-                    <a:bodyPr/>
-                    <a:lstStyle/>
-                    <a:p>
-                      <a:pPr algn="ctr"/>
-                      <a:r>
-                        <a:rPr lang="da-DK" sz="2000" u="none" dirty="0">
-                          <a:latin typeface="Courier New" panose="02070309020205020404" pitchFamily="49" charset="0"/>
-                          <a:cs typeface="Courier New" panose="02070309020205020404" pitchFamily="49" charset="0"/>
-                        </a:rPr>
-                        <a:t>**</a:t>
-                      </a:r>
-                    </a:p>
-                  </a:txBody>
-                  <a:tcPr marL="80580" marR="80580" marT="40290" marB="40290" anchor="ctr">
-                    <a:lnL w="12700" cap="flat" cmpd="sng" algn="ctr">
-                      <a:solidFill>
-                        <a:schemeClr val="tx1"/>
-                      </a:solidFill>
-                      <a:prstDash val="solid"/>
-                      <a:round/>
-                      <a:headEnd type="none" w="med" len="med"/>
-                      <a:tailEnd type="none" w="med" len="med"/>
-                    </a:lnL>
-                    <a:lnR w="12700" cap="flat" cmpd="sng" algn="ctr">
-                      <a:solidFill>
-                        <a:schemeClr val="tx1"/>
-                      </a:solidFill>
-                      <a:prstDash val="solid"/>
-                      <a:round/>
-                      <a:headEnd type="none" w="med" len="med"/>
-                      <a:tailEnd type="none" w="med" len="med"/>
-                    </a:lnR>
-                    <a:lnT w="12700" cap="flat" cmpd="sng" algn="ctr">
-                      <a:solidFill>
-                        <a:schemeClr val="tx1"/>
-                      </a:solidFill>
-                      <a:prstDash val="solid"/>
-                      <a:round/>
-                      <a:headEnd type="none" w="med" len="med"/>
-                      <a:tailEnd type="none" w="med" len="med"/>
-                    </a:lnT>
-                    <a:lnB w="12700" cap="flat" cmpd="sng" algn="ctr">
-                      <a:solidFill>
-                        <a:schemeClr val="tx1"/>
-                      </a:solidFill>
-                      <a:prstDash val="solid"/>
-                      <a:round/>
-                      <a:headEnd type="none" w="med" len="med"/>
-                      <a:tailEnd type="none" w="med" len="med"/>
-                    </a:lnB>
-                    <a:solidFill>
-                      <a:schemeClr val="accent5">
-                        <a:lumMod val="20000"/>
-                        <a:lumOff val="80000"/>
-                      </a:schemeClr>
-                    </a:solidFill>
-                  </a:tcPr>
-                </a:tc>
-                <a:extLst>
-                  <a:ext uri="{0D108BD9-81ED-4DB2-BD59-A6C34878D82A}">
-                    <a16:rowId xmlns:a16="http://schemas.microsoft.com/office/drawing/2014/main" val="1975563258"/>
-                  </a:ext>
-                </a:extLst>
-              </a:tr>
-            </a:tbl>
-          </a:graphicData>
-        </a:graphic>
-      </p:graphicFrame>
-      <p:sp>
-        <p:nvSpPr>
-          <p:cNvPr id="5" name="Rectangle 4"/>
-          <p:cNvSpPr/>
-          <p:nvPr/>
-        </p:nvSpPr>
-        <p:spPr>
-          <a:xfrm>
-            <a:off x="184332" y="6438395"/>
-            <a:ext cx="4579395" cy="369332"/>
-          </a:xfrm>
-          <a:prstGeom prst="rect">
-            <a:avLst/>
-          </a:prstGeom>
-        </p:spPr>
-        <p:txBody>
-          <a:bodyPr wrap="none">
-            <a:spAutoFit/>
-          </a:bodyPr>
-          <a:lstStyle/>
-          <a:p>
             <a:r>
               <a:rPr lang="en-US" dirty="0">
-                <a:hlinkClick r:id="rId3"/>
+                <a:solidFill>
+                  <a:srgbClr val="C00000"/>
+                </a:solidFill>
+                <a:latin typeface="Courier"/>
               </a:rPr>
-              <a:t>docs.python.org/3/reference/expressions.html</a:t>
-            </a:r>
+              <a:t>s[3] = "x"</a:t>
+            </a:r>
+          </a:p>
+          <a:p>
+            <a:pPr>
+              <a:spcAft>
+                <a:spcPts val="1200"/>
+              </a:spcAft>
+            </a:pPr>
+            <a:r>
+              <a:rPr lang="en-US" dirty="0"/>
+              <a:t>To replace the </a:t>
+            </a:r>
+            <a:r>
+              <a:rPr lang="en-US" dirty="0">
+                <a:latin typeface="Courier"/>
+              </a:rPr>
+              <a:t>"d"</a:t>
+            </a:r>
+            <a:r>
+              <a:rPr lang="en-US" dirty="0"/>
+              <a:t> with </a:t>
+            </a:r>
+            <a:r>
+              <a:rPr lang="en-US" dirty="0">
+                <a:latin typeface="Courier"/>
+              </a:rPr>
+              <a:t>"x"</a:t>
+            </a:r>
+            <a:r>
+              <a:rPr lang="en-US" dirty="0"/>
+              <a:t> in </a:t>
+            </a:r>
+            <a:r>
+              <a:rPr lang="en-US" dirty="0">
+                <a:latin typeface="Courier"/>
+              </a:rPr>
+              <a:t>s</a:t>
+            </a:r>
+            <a:r>
+              <a:rPr lang="en-US" dirty="0"/>
+              <a:t>, instead </a:t>
+            </a:r>
+            <a:r>
+              <a:rPr lang="en-US"/>
+              <a:t>create the new string</a:t>
+            </a:r>
+            <a:endParaRPr lang="en-US" dirty="0"/>
+          </a:p>
+          <a:p>
+            <a:pPr marL="0" indent="0" algn="ctr">
+              <a:spcAft>
+                <a:spcPts val="1200"/>
+              </a:spcAft>
+              <a:buNone/>
+            </a:pPr>
+            <a:r>
+              <a:rPr lang="en-US" dirty="0">
+                <a:latin typeface="Courier"/>
+              </a:rPr>
+              <a:t>s = s[:3] + "x" + s[4:]</a:t>
+            </a:r>
+            <a:br>
+              <a:rPr lang="en-US" dirty="0"/>
+            </a:br>
             <a:endParaRPr lang="en-US" dirty="0"/>
           </a:p>
         </p:txBody>
@@ -24447,7 +24160,7 @@
     </p:spTree>
     <p:extLst>
       <p:ext uri="{BB962C8B-B14F-4D97-AF65-F5344CB8AC3E}">
-        <p14:creationId xmlns:p14="http://schemas.microsoft.com/office/powerpoint/2010/main" val="3996596200"/>
+        <p14:creationId xmlns:p14="http://schemas.microsoft.com/office/powerpoint/2010/main" val="3203409752"/>
       </p:ext>
     </p:extLst>
   </p:cSld>
@@ -24491,6 +24204,1378 @@
           <a:p>
             <a:r>
               <a:rPr lang="en-US" dirty="0"/>
+              <a:t>Operators</a:t>
+            </a:r>
+            <a:br>
+              <a:rPr lang="en-US" dirty="0"/>
+            </a:br>
+            <a:r>
+              <a:rPr lang="en-US" dirty="0"/>
+              <a:t>Precedence rules &amp; Associativity</a:t>
+            </a:r>
+          </a:p>
+        </p:txBody>
+      </p:sp>
+      <p:sp>
+        <p:nvSpPr>
+          <p:cNvPr id="3" name="Content Placeholder 2"/>
+          <p:cNvSpPr>
+            <a:spLocks noGrp="1"/>
+          </p:cNvSpPr>
+          <p:nvPr>
+            <p:ph idx="1"/>
+          </p:nvPr>
+        </p:nvSpPr>
+        <p:spPr>
+          <a:xfrm>
+            <a:off x="838200" y="1791569"/>
+            <a:ext cx="8602683" cy="4831492"/>
+          </a:xfrm>
+        </p:spPr>
+        <p:txBody>
+          <a:bodyPr>
+            <a:normAutofit/>
+          </a:bodyPr>
+          <a:lstStyle/>
+          <a:p>
+            <a:pPr marL="0" indent="0">
+              <a:spcBef>
+                <a:spcPts val="1800"/>
+              </a:spcBef>
+              <a:buNone/>
+            </a:pPr>
+            <a:r>
+              <a:rPr lang="en-US" dirty="0"/>
+              <a:t>Example: * has higher precedence than +</a:t>
+            </a:r>
+          </a:p>
+          <a:p>
+            <a:pPr marL="0" indent="0" algn="ctr">
+              <a:spcBef>
+                <a:spcPts val="1800"/>
+              </a:spcBef>
+              <a:buNone/>
+            </a:pPr>
+            <a:r>
+              <a:rPr lang="en-US" dirty="0"/>
+              <a:t>2 + 3 * 4  </a:t>
+            </a:r>
+            <a:r>
+              <a:rPr lang="en-US" dirty="0">
+                <a:sym typeface="Wingdings" panose="05000000000000000000" pitchFamily="2" charset="2"/>
+              </a:rPr>
+              <a:t> ≡ </a:t>
+            </a:r>
+            <a:r>
+              <a:rPr lang="en-US" dirty="0"/>
+              <a:t>  2 + (3 * 4) </a:t>
+            </a:r>
+            <a:r>
+              <a:rPr lang="en-US" dirty="0">
+                <a:sym typeface="Wingdings" panose="05000000000000000000" pitchFamily="2" charset="2"/>
+              </a:rPr>
+              <a:t> 14    and  (2 + 3) * 4  20</a:t>
+            </a:r>
+          </a:p>
+          <a:p>
+            <a:pPr marL="0" indent="0">
+              <a:spcBef>
+                <a:spcPts val="1800"/>
+              </a:spcBef>
+              <a:buNone/>
+            </a:pPr>
+            <a:r>
+              <a:rPr lang="en-US" dirty="0">
+                <a:sym typeface="Wingdings" panose="05000000000000000000" pitchFamily="2" charset="2"/>
+              </a:rPr>
+              <a:t>All operators in same group are evaluated left-to-right</a:t>
+            </a:r>
+          </a:p>
+          <a:p>
+            <a:pPr marL="0" indent="0" algn="ctr">
+              <a:spcBef>
+                <a:spcPts val="1800"/>
+              </a:spcBef>
+              <a:buNone/>
+            </a:pPr>
+            <a:r>
+              <a:rPr lang="en-US" dirty="0">
+                <a:sym typeface="Wingdings" panose="05000000000000000000" pitchFamily="2" charset="2"/>
+              </a:rPr>
+              <a:t>2 + 3 - 4 - 5   ≡   ((2 + 3) - 4) - 5      -4</a:t>
+            </a:r>
+          </a:p>
+          <a:p>
+            <a:pPr marL="0" indent="0">
+              <a:spcBef>
+                <a:spcPts val="1800"/>
+              </a:spcBef>
+              <a:buNone/>
+            </a:pPr>
+            <a:r>
+              <a:rPr lang="en-US" dirty="0">
+                <a:sym typeface="Wingdings" panose="05000000000000000000" pitchFamily="2" charset="2"/>
+              </a:rPr>
+              <a:t>except for **, that is evaluated right-to-left</a:t>
+            </a:r>
+          </a:p>
+          <a:p>
+            <a:pPr marL="0" indent="0" algn="ctr">
+              <a:spcBef>
+                <a:spcPts val="1800"/>
+              </a:spcBef>
+              <a:buNone/>
+            </a:pPr>
+            <a:r>
+              <a:rPr lang="en-US" dirty="0">
+                <a:sym typeface="Wingdings" panose="05000000000000000000" pitchFamily="2" charset="2"/>
+              </a:rPr>
+              <a:t>2**2**3   ≡   2**(2**3)      256</a:t>
+            </a:r>
+          </a:p>
+          <a:p>
+            <a:pPr marL="0" indent="0">
+              <a:spcBef>
+                <a:spcPts val="1800"/>
+              </a:spcBef>
+              <a:buNone/>
+            </a:pPr>
+            <a:r>
+              <a:rPr lang="en-US" dirty="0">
+                <a:sym typeface="Wingdings" panose="05000000000000000000" pitchFamily="2" charset="2"/>
+              </a:rPr>
+              <a:t>Rule: Use </a:t>
+            </a:r>
+            <a:r>
+              <a:rPr lang="en-US" dirty="0">
+                <a:solidFill>
+                  <a:srgbClr val="C00000"/>
+                </a:solidFill>
+                <a:sym typeface="Wingdings" panose="05000000000000000000" pitchFamily="2" charset="2"/>
+              </a:rPr>
+              <a:t>parenthesis</a:t>
+            </a:r>
+            <a:r>
+              <a:rPr lang="en-US" dirty="0">
+                <a:sym typeface="Wingdings" panose="05000000000000000000" pitchFamily="2" charset="2"/>
+              </a:rPr>
+              <a:t> whenever in doubt of precedence!</a:t>
+            </a:r>
+            <a:endParaRPr lang="en-US" dirty="0"/>
+          </a:p>
+          <a:p>
+            <a:pPr marL="0" indent="0" algn="ctr">
+              <a:spcBef>
+                <a:spcPts val="1800"/>
+              </a:spcBef>
+              <a:buNone/>
+            </a:pPr>
+            <a:endParaRPr lang="en-US" dirty="0">
+              <a:sym typeface="Wingdings" panose="05000000000000000000" pitchFamily="2" charset="2"/>
+            </a:endParaRPr>
+          </a:p>
+        </p:txBody>
+      </p:sp>
+      <p:graphicFrame>
+        <p:nvGraphicFramePr>
+          <p:cNvPr id="4" name="Table 3"/>
+          <p:cNvGraphicFramePr>
+            <a:graphicFrameLocks noGrp="1"/>
+          </p:cNvGraphicFramePr>
+          <p:nvPr>
+            <p:extLst>
+              <p:ext uri="{D42A27DB-BD31-4B8C-83A1-F6EECF244321}">
+                <p14:modId xmlns:p14="http://schemas.microsoft.com/office/powerpoint/2010/main" val="3756868397"/>
+              </p:ext>
+            </p:extLst>
+          </p:nvPr>
+        </p:nvGraphicFramePr>
+        <p:xfrm>
+          <a:off x="9440883" y="190003"/>
+          <a:ext cx="2589786" cy="6533940"/>
+        </p:xfrm>
+        <a:graphic>
+          <a:graphicData uri="http://schemas.openxmlformats.org/drawingml/2006/table">
+            <a:tbl>
+              <a:tblPr/>
+              <a:tblGrid>
+                <a:gridCol w="2589786">
+                  <a:extLst>
+                    <a:ext uri="{9D8B030D-6E8A-4147-A177-3AD203B41FA5}">
+                      <a16:colId xmlns:a16="http://schemas.microsoft.com/office/drawing/2014/main" val="2486659109"/>
+                    </a:ext>
+                  </a:extLst>
+                </a:gridCol>
+              </a:tblGrid>
+              <a:tr h="324928">
+                <a:tc>
+                  <a:txBody>
+                    <a:bodyPr/>
+                    <a:lstStyle/>
+                    <a:p>
+                      <a:pPr algn="ctr"/>
+                      <a:r>
+                        <a:rPr lang="da-DK" sz="2000" u="none" dirty="0" err="1">
+                          <a:solidFill>
+                            <a:schemeClr val="bg1"/>
+                          </a:solidFill>
+                        </a:rPr>
+                        <a:t>Precedence</a:t>
+                      </a:r>
+                      <a:br>
+                        <a:rPr lang="da-DK" sz="2000" u="none" dirty="0">
+                          <a:solidFill>
+                            <a:schemeClr val="bg1"/>
+                          </a:solidFill>
+                        </a:rPr>
+                      </a:br>
+                      <a:r>
+                        <a:rPr lang="da-DK" sz="2000" u="none" baseline="0" dirty="0">
+                          <a:solidFill>
+                            <a:schemeClr val="bg1"/>
+                          </a:solidFill>
+                        </a:rPr>
+                        <a:t> (</a:t>
+                      </a:r>
+                      <a:r>
+                        <a:rPr lang="da-DK" sz="2000" u="none" baseline="0" dirty="0" err="1">
+                          <a:solidFill>
+                            <a:schemeClr val="bg1"/>
+                          </a:solidFill>
+                        </a:rPr>
+                        <a:t>low</a:t>
+                      </a:r>
+                      <a:r>
+                        <a:rPr lang="da-DK" sz="2000" u="none" baseline="0" dirty="0">
+                          <a:solidFill>
+                            <a:schemeClr val="bg1"/>
+                          </a:solidFill>
+                        </a:rPr>
+                        <a:t> to </a:t>
+                      </a:r>
+                      <a:r>
+                        <a:rPr lang="da-DK" sz="2000" u="none" baseline="0" dirty="0" err="1">
+                          <a:solidFill>
+                            <a:schemeClr val="bg1"/>
+                          </a:solidFill>
+                        </a:rPr>
+                        <a:t>high</a:t>
+                      </a:r>
+                      <a:r>
+                        <a:rPr lang="da-DK" sz="2000" u="none" baseline="0" dirty="0">
+                          <a:solidFill>
+                            <a:schemeClr val="bg1"/>
+                          </a:solidFill>
+                        </a:rPr>
+                        <a:t>)</a:t>
+                      </a:r>
+                      <a:endParaRPr lang="da-DK" sz="2000" u="none" dirty="0">
+                        <a:solidFill>
+                          <a:schemeClr val="bg1"/>
+                        </a:solidFill>
+                      </a:endParaRPr>
+                    </a:p>
+                  </a:txBody>
+                  <a:tcPr marL="80580" marR="80580" marT="40290" marB="40290" anchor="ctr">
+                    <a:lnL w="12700" cap="flat" cmpd="sng" algn="ctr">
+                      <a:solidFill>
+                        <a:schemeClr val="tx1"/>
+                      </a:solidFill>
+                      <a:prstDash val="solid"/>
+                      <a:round/>
+                      <a:headEnd type="none" w="med" len="med"/>
+                      <a:tailEnd type="none" w="med" len="med"/>
+                    </a:lnL>
+                    <a:lnR w="12700" cap="flat" cmpd="sng" algn="ctr">
+                      <a:solidFill>
+                        <a:schemeClr val="tx1"/>
+                      </a:solidFill>
+                      <a:prstDash val="solid"/>
+                      <a:round/>
+                      <a:headEnd type="none" w="med" len="med"/>
+                      <a:tailEnd type="none" w="med" len="med"/>
+                    </a:lnR>
+                    <a:lnT w="12700" cap="flat" cmpd="sng" algn="ctr">
+                      <a:solidFill>
+                        <a:schemeClr val="tx1"/>
+                      </a:solidFill>
+                      <a:prstDash val="solid"/>
+                      <a:round/>
+                      <a:headEnd type="none" w="med" len="med"/>
+                      <a:tailEnd type="none" w="med" len="med"/>
+                    </a:lnT>
+                    <a:lnB w="12700" cap="flat" cmpd="sng" algn="ctr">
+                      <a:solidFill>
+                        <a:schemeClr val="tx1"/>
+                      </a:solidFill>
+                      <a:prstDash val="solid"/>
+                      <a:round/>
+                      <a:headEnd type="none" w="med" len="med"/>
+                      <a:tailEnd type="none" w="med" len="med"/>
+                    </a:lnB>
+                    <a:solidFill>
+                      <a:srgbClr val="C00000"/>
+                    </a:solidFill>
+                  </a:tcPr>
+                </a:tc>
+                <a:extLst>
+                  <a:ext uri="{0D108BD9-81ED-4DB2-BD59-A6C34878D82A}">
+                    <a16:rowId xmlns:a16="http://schemas.microsoft.com/office/drawing/2014/main" val="3138802606"/>
+                  </a:ext>
+                </a:extLst>
+              </a:tr>
+              <a:tr h="324928">
+                <a:tc>
+                  <a:txBody>
+                    <a:bodyPr/>
+                    <a:lstStyle/>
+                    <a:p>
+                      <a:pPr algn="ctr"/>
+                      <a:r>
+                        <a:rPr lang="da-DK" sz="2000" u="none" dirty="0">
+                          <a:latin typeface="Courier New" panose="02070309020205020404" pitchFamily="49" charset="0"/>
+                          <a:cs typeface="Courier New" panose="02070309020205020404" pitchFamily="49" charset="0"/>
+                        </a:rPr>
+                        <a:t>or</a:t>
+                      </a:r>
+                    </a:p>
+                  </a:txBody>
+                  <a:tcPr marL="80580" marR="80580" marT="40290" marB="40290" anchor="ctr">
+                    <a:lnL w="12700" cap="flat" cmpd="sng" algn="ctr">
+                      <a:solidFill>
+                        <a:schemeClr val="tx1"/>
+                      </a:solidFill>
+                      <a:prstDash val="solid"/>
+                      <a:round/>
+                      <a:headEnd type="none" w="med" len="med"/>
+                      <a:tailEnd type="none" w="med" len="med"/>
+                    </a:lnL>
+                    <a:lnR w="12700" cap="flat" cmpd="sng" algn="ctr">
+                      <a:solidFill>
+                        <a:schemeClr val="tx1"/>
+                      </a:solidFill>
+                      <a:prstDash val="solid"/>
+                      <a:round/>
+                      <a:headEnd type="none" w="med" len="med"/>
+                      <a:tailEnd type="none" w="med" len="med"/>
+                    </a:lnR>
+                    <a:lnT w="12700" cap="flat" cmpd="sng" algn="ctr">
+                      <a:solidFill>
+                        <a:schemeClr val="tx1"/>
+                      </a:solidFill>
+                      <a:prstDash val="solid"/>
+                      <a:round/>
+                      <a:headEnd type="none" w="med" len="med"/>
+                      <a:tailEnd type="none" w="med" len="med"/>
+                    </a:lnT>
+                    <a:lnB w="12700" cap="flat" cmpd="sng" algn="ctr">
+                      <a:solidFill>
+                        <a:schemeClr val="tx1"/>
+                      </a:solidFill>
+                      <a:prstDash val="solid"/>
+                      <a:round/>
+                      <a:headEnd type="none" w="med" len="med"/>
+                      <a:tailEnd type="none" w="med" len="med"/>
+                    </a:lnB>
+                    <a:solidFill>
+                      <a:schemeClr val="accent5">
+                        <a:lumMod val="20000"/>
+                        <a:lumOff val="80000"/>
+                      </a:schemeClr>
+                    </a:solidFill>
+                  </a:tcPr>
+                </a:tc>
+                <a:extLst>
+                  <a:ext uri="{0D108BD9-81ED-4DB2-BD59-A6C34878D82A}">
+                    <a16:rowId xmlns:a16="http://schemas.microsoft.com/office/drawing/2014/main" val="564454404"/>
+                  </a:ext>
+                </a:extLst>
+              </a:tr>
+              <a:tr h="324928">
+                <a:tc>
+                  <a:txBody>
+                    <a:bodyPr/>
+                    <a:lstStyle/>
+                    <a:p>
+                      <a:pPr algn="ctr"/>
+                      <a:r>
+                        <a:rPr lang="da-DK" sz="2000" u="none" dirty="0">
+                          <a:latin typeface="Courier New" panose="02070309020205020404" pitchFamily="49" charset="0"/>
+                          <a:cs typeface="Courier New" panose="02070309020205020404" pitchFamily="49" charset="0"/>
+                        </a:rPr>
+                        <a:t>and</a:t>
+                      </a:r>
+                    </a:p>
+                  </a:txBody>
+                  <a:tcPr marL="80580" marR="80580" marT="40290" marB="40290" anchor="ctr">
+                    <a:lnL w="12700" cap="flat" cmpd="sng" algn="ctr">
+                      <a:solidFill>
+                        <a:schemeClr val="tx1"/>
+                      </a:solidFill>
+                      <a:prstDash val="solid"/>
+                      <a:round/>
+                      <a:headEnd type="none" w="med" len="med"/>
+                      <a:tailEnd type="none" w="med" len="med"/>
+                    </a:lnL>
+                    <a:lnR w="12700" cap="flat" cmpd="sng" algn="ctr">
+                      <a:solidFill>
+                        <a:schemeClr val="tx1"/>
+                      </a:solidFill>
+                      <a:prstDash val="solid"/>
+                      <a:round/>
+                      <a:headEnd type="none" w="med" len="med"/>
+                      <a:tailEnd type="none" w="med" len="med"/>
+                    </a:lnR>
+                    <a:lnT w="12700" cap="flat" cmpd="sng" algn="ctr">
+                      <a:solidFill>
+                        <a:schemeClr val="tx1"/>
+                      </a:solidFill>
+                      <a:prstDash val="solid"/>
+                      <a:round/>
+                      <a:headEnd type="none" w="med" len="med"/>
+                      <a:tailEnd type="none" w="med" len="med"/>
+                    </a:lnT>
+                    <a:lnB w="12700" cap="flat" cmpd="sng" algn="ctr">
+                      <a:solidFill>
+                        <a:schemeClr val="tx1"/>
+                      </a:solidFill>
+                      <a:prstDash val="solid"/>
+                      <a:round/>
+                      <a:headEnd type="none" w="med" len="med"/>
+                      <a:tailEnd type="none" w="med" len="med"/>
+                    </a:lnB>
+                    <a:solidFill>
+                      <a:schemeClr val="accent5">
+                        <a:lumMod val="20000"/>
+                        <a:lumOff val="80000"/>
+                      </a:schemeClr>
+                    </a:solidFill>
+                  </a:tcPr>
+                </a:tc>
+                <a:extLst>
+                  <a:ext uri="{0D108BD9-81ED-4DB2-BD59-A6C34878D82A}">
+                    <a16:rowId xmlns:a16="http://schemas.microsoft.com/office/drawing/2014/main" val="2863982840"/>
+                  </a:ext>
+                </a:extLst>
+              </a:tr>
+              <a:tr h="324928">
+                <a:tc>
+                  <a:txBody>
+                    <a:bodyPr/>
+                    <a:lstStyle/>
+                    <a:p>
+                      <a:pPr algn="ctr"/>
+                      <a:r>
+                        <a:rPr lang="da-DK" sz="2000" u="none" dirty="0">
+                          <a:latin typeface="Courier New" panose="02070309020205020404" pitchFamily="49" charset="0"/>
+                          <a:cs typeface="Courier New" panose="02070309020205020404" pitchFamily="49" charset="0"/>
+                        </a:rPr>
+                        <a:t>not </a:t>
+                      </a:r>
+                      <a:r>
+                        <a:rPr lang="da-DK" sz="2000" i="1" u="none" dirty="0">
+                          <a:latin typeface="Courier New" panose="02070309020205020404" pitchFamily="49" charset="0"/>
+                          <a:cs typeface="Courier New" panose="02070309020205020404" pitchFamily="49" charset="0"/>
+                        </a:rPr>
+                        <a:t>x</a:t>
+                      </a:r>
+                    </a:p>
+                  </a:txBody>
+                  <a:tcPr marL="80580" marR="80580" marT="40290" marB="40290" anchor="ctr">
+                    <a:lnL w="12700" cap="flat" cmpd="sng" algn="ctr">
+                      <a:solidFill>
+                        <a:schemeClr val="tx1"/>
+                      </a:solidFill>
+                      <a:prstDash val="solid"/>
+                      <a:round/>
+                      <a:headEnd type="none" w="med" len="med"/>
+                      <a:tailEnd type="none" w="med" len="med"/>
+                    </a:lnL>
+                    <a:lnR w="12700" cap="flat" cmpd="sng" algn="ctr">
+                      <a:solidFill>
+                        <a:schemeClr val="tx1"/>
+                      </a:solidFill>
+                      <a:prstDash val="solid"/>
+                      <a:round/>
+                      <a:headEnd type="none" w="med" len="med"/>
+                      <a:tailEnd type="none" w="med" len="med"/>
+                    </a:lnR>
+                    <a:lnT w="12700" cap="flat" cmpd="sng" algn="ctr">
+                      <a:solidFill>
+                        <a:schemeClr val="tx1"/>
+                      </a:solidFill>
+                      <a:prstDash val="solid"/>
+                      <a:round/>
+                      <a:headEnd type="none" w="med" len="med"/>
+                      <a:tailEnd type="none" w="med" len="med"/>
+                    </a:lnT>
+                    <a:lnB w="12700" cap="flat" cmpd="sng" algn="ctr">
+                      <a:solidFill>
+                        <a:schemeClr val="tx1"/>
+                      </a:solidFill>
+                      <a:prstDash val="solid"/>
+                      <a:round/>
+                      <a:headEnd type="none" w="med" len="med"/>
+                      <a:tailEnd type="none" w="med" len="med"/>
+                    </a:lnB>
+                    <a:solidFill>
+                      <a:schemeClr val="accent5">
+                        <a:lumMod val="20000"/>
+                        <a:lumOff val="80000"/>
+                      </a:schemeClr>
+                    </a:solidFill>
+                  </a:tcPr>
+                </a:tc>
+                <a:extLst>
+                  <a:ext uri="{0D108BD9-81ED-4DB2-BD59-A6C34878D82A}">
+                    <a16:rowId xmlns:a16="http://schemas.microsoft.com/office/drawing/2014/main" val="2243352647"/>
+                  </a:ext>
+                </a:extLst>
+              </a:tr>
+              <a:tr h="564945">
+                <a:tc>
+                  <a:txBody>
+                    <a:bodyPr/>
+                    <a:lstStyle/>
+                    <a:p>
+                      <a:pPr algn="ctr"/>
+                      <a:r>
+                        <a:rPr lang="en-US" sz="2000" u="none" dirty="0">
+                          <a:latin typeface="Courier New" panose="02070309020205020404" pitchFamily="49" charset="0"/>
+                          <a:cs typeface="Courier New" panose="02070309020205020404" pitchFamily="49" charset="0"/>
+                        </a:rPr>
+                        <a:t>in</a:t>
+                      </a:r>
+                      <a:r>
+                        <a:rPr lang="en-US" sz="2000" u="none" baseline="0" dirty="0">
+                          <a:latin typeface="Courier New" panose="02070309020205020404" pitchFamily="49" charset="0"/>
+                          <a:cs typeface="Courier New" panose="02070309020205020404" pitchFamily="49" charset="0"/>
+                        </a:rPr>
+                        <a:t>  </a:t>
+                      </a:r>
+                      <a:r>
+                        <a:rPr lang="en-US" sz="2000" u="none" dirty="0">
+                          <a:latin typeface="Courier New" panose="02070309020205020404" pitchFamily="49" charset="0"/>
+                          <a:cs typeface="Courier New" panose="02070309020205020404" pitchFamily="49" charset="0"/>
+                        </a:rPr>
+                        <a:t> not in</a:t>
+                      </a:r>
+                    </a:p>
+                    <a:p>
+                      <a:pPr algn="ctr"/>
+                      <a:r>
+                        <a:rPr lang="en-US" sz="2000" u="none" dirty="0">
+                          <a:latin typeface="Courier New" panose="02070309020205020404" pitchFamily="49" charset="0"/>
+                          <a:cs typeface="Courier New" panose="02070309020205020404" pitchFamily="49" charset="0"/>
+                        </a:rPr>
+                        <a:t>is   </a:t>
+                      </a:r>
+                      <a:r>
+                        <a:rPr lang="en-US" sz="2000" u="none" dirty="0" err="1">
+                          <a:latin typeface="Courier New" panose="02070309020205020404" pitchFamily="49" charset="0"/>
+                          <a:cs typeface="Courier New" panose="02070309020205020404" pitchFamily="49" charset="0"/>
+                        </a:rPr>
+                        <a:t>is</a:t>
+                      </a:r>
+                      <a:r>
+                        <a:rPr lang="en-US" sz="2000" u="none" dirty="0">
+                          <a:latin typeface="Courier New" panose="02070309020205020404" pitchFamily="49" charset="0"/>
+                          <a:cs typeface="Courier New" panose="02070309020205020404" pitchFamily="49" charset="0"/>
+                        </a:rPr>
+                        <a:t> not</a:t>
+                      </a:r>
+                    </a:p>
+                    <a:p>
+                      <a:pPr algn="ctr"/>
+                      <a:r>
+                        <a:rPr lang="en-US" sz="2000" u="none" dirty="0">
+                          <a:latin typeface="Courier New" panose="02070309020205020404" pitchFamily="49" charset="0"/>
+                          <a:cs typeface="Courier New" panose="02070309020205020404" pitchFamily="49" charset="0"/>
+                        </a:rPr>
+                        <a:t>==   &lt;   &lt;=</a:t>
+                      </a:r>
+                    </a:p>
+                    <a:p>
+                      <a:pPr algn="ctr"/>
+                      <a:r>
+                        <a:rPr lang="en-US" sz="2000" u="none" dirty="0">
+                          <a:latin typeface="Courier New" panose="02070309020205020404" pitchFamily="49" charset="0"/>
+                          <a:cs typeface="Courier New" panose="02070309020205020404" pitchFamily="49" charset="0"/>
+                        </a:rPr>
+                        <a:t>!=   &gt;</a:t>
+                      </a:r>
+                      <a:r>
+                        <a:rPr lang="en-US" sz="2000" u="none" baseline="0" dirty="0">
+                          <a:latin typeface="Courier New" panose="02070309020205020404" pitchFamily="49" charset="0"/>
+                          <a:cs typeface="Courier New" panose="02070309020205020404" pitchFamily="49" charset="0"/>
+                        </a:rPr>
+                        <a:t>  </a:t>
+                      </a:r>
+                      <a:r>
+                        <a:rPr lang="en-US" sz="2000" u="none" dirty="0">
+                          <a:latin typeface="Courier New" panose="02070309020205020404" pitchFamily="49" charset="0"/>
+                          <a:cs typeface="Courier New" panose="02070309020205020404" pitchFamily="49" charset="0"/>
+                        </a:rPr>
+                        <a:t> &gt;=</a:t>
+                      </a:r>
+                    </a:p>
+                  </a:txBody>
+                  <a:tcPr marL="80580" marR="80580" marT="40290" marB="40290" anchor="ctr">
+                    <a:lnL w="12700" cap="flat" cmpd="sng" algn="ctr">
+                      <a:solidFill>
+                        <a:schemeClr val="tx1"/>
+                      </a:solidFill>
+                      <a:prstDash val="solid"/>
+                      <a:round/>
+                      <a:headEnd type="none" w="med" len="med"/>
+                      <a:tailEnd type="none" w="med" len="med"/>
+                    </a:lnL>
+                    <a:lnR w="12700" cap="flat" cmpd="sng" algn="ctr">
+                      <a:solidFill>
+                        <a:schemeClr val="tx1"/>
+                      </a:solidFill>
+                      <a:prstDash val="solid"/>
+                      <a:round/>
+                      <a:headEnd type="none" w="med" len="med"/>
+                      <a:tailEnd type="none" w="med" len="med"/>
+                    </a:lnR>
+                    <a:lnT w="12700" cap="flat" cmpd="sng" algn="ctr">
+                      <a:solidFill>
+                        <a:schemeClr val="tx1"/>
+                      </a:solidFill>
+                      <a:prstDash val="solid"/>
+                      <a:round/>
+                      <a:headEnd type="none" w="med" len="med"/>
+                      <a:tailEnd type="none" w="med" len="med"/>
+                    </a:lnT>
+                    <a:lnB w="12700" cap="flat" cmpd="sng" algn="ctr">
+                      <a:solidFill>
+                        <a:schemeClr val="tx1"/>
+                      </a:solidFill>
+                      <a:prstDash val="solid"/>
+                      <a:round/>
+                      <a:headEnd type="none" w="med" len="med"/>
+                      <a:tailEnd type="none" w="med" len="med"/>
+                    </a:lnB>
+                    <a:solidFill>
+                      <a:schemeClr val="accent5">
+                        <a:lumMod val="20000"/>
+                        <a:lumOff val="80000"/>
+                      </a:schemeClr>
+                    </a:solidFill>
+                  </a:tcPr>
+                </a:tc>
+                <a:extLst>
+                  <a:ext uri="{0D108BD9-81ED-4DB2-BD59-A6C34878D82A}">
+                    <a16:rowId xmlns:a16="http://schemas.microsoft.com/office/drawing/2014/main" val="268387812"/>
+                  </a:ext>
+                </a:extLst>
+              </a:tr>
+              <a:tr h="324928">
+                <a:tc>
+                  <a:txBody>
+                    <a:bodyPr/>
+                    <a:lstStyle/>
+                    <a:p>
+                      <a:pPr algn="ctr"/>
+                      <a:r>
+                        <a:rPr lang="da-DK" sz="2000" u="none" dirty="0">
+                          <a:latin typeface="Courier New" panose="02070309020205020404" pitchFamily="49" charset="0"/>
+                          <a:cs typeface="Courier New" panose="02070309020205020404" pitchFamily="49" charset="0"/>
+                        </a:rPr>
+                        <a:t>|</a:t>
+                      </a:r>
+                    </a:p>
+                  </a:txBody>
+                  <a:tcPr marL="80580" marR="80580" marT="40290" marB="40290" anchor="ctr">
+                    <a:lnL w="12700" cap="flat" cmpd="sng" algn="ctr">
+                      <a:solidFill>
+                        <a:schemeClr val="tx1"/>
+                      </a:solidFill>
+                      <a:prstDash val="solid"/>
+                      <a:round/>
+                      <a:headEnd type="none" w="med" len="med"/>
+                      <a:tailEnd type="none" w="med" len="med"/>
+                    </a:lnL>
+                    <a:lnR w="12700" cap="flat" cmpd="sng" algn="ctr">
+                      <a:solidFill>
+                        <a:schemeClr val="tx1"/>
+                      </a:solidFill>
+                      <a:prstDash val="solid"/>
+                      <a:round/>
+                      <a:headEnd type="none" w="med" len="med"/>
+                      <a:tailEnd type="none" w="med" len="med"/>
+                    </a:lnR>
+                    <a:lnT w="12700" cap="flat" cmpd="sng" algn="ctr">
+                      <a:solidFill>
+                        <a:schemeClr val="tx1"/>
+                      </a:solidFill>
+                      <a:prstDash val="solid"/>
+                      <a:round/>
+                      <a:headEnd type="none" w="med" len="med"/>
+                      <a:tailEnd type="none" w="med" len="med"/>
+                    </a:lnT>
+                    <a:lnB w="12700" cap="flat" cmpd="sng" algn="ctr">
+                      <a:solidFill>
+                        <a:schemeClr val="tx1"/>
+                      </a:solidFill>
+                      <a:prstDash val="solid"/>
+                      <a:round/>
+                      <a:headEnd type="none" w="med" len="med"/>
+                      <a:tailEnd type="none" w="med" len="med"/>
+                    </a:lnB>
+                    <a:solidFill>
+                      <a:schemeClr val="accent5">
+                        <a:lumMod val="20000"/>
+                        <a:lumOff val="80000"/>
+                      </a:schemeClr>
+                    </a:solidFill>
+                  </a:tcPr>
+                </a:tc>
+                <a:extLst>
+                  <a:ext uri="{0D108BD9-81ED-4DB2-BD59-A6C34878D82A}">
+                    <a16:rowId xmlns:a16="http://schemas.microsoft.com/office/drawing/2014/main" val="2141160183"/>
+                  </a:ext>
+                </a:extLst>
+              </a:tr>
+              <a:tr h="324928">
+                <a:tc>
+                  <a:txBody>
+                    <a:bodyPr/>
+                    <a:lstStyle/>
+                    <a:p>
+                      <a:pPr algn="ctr"/>
+                      <a:r>
+                        <a:rPr lang="da-DK" sz="2000" u="none" dirty="0">
+                          <a:latin typeface="Courier New" panose="02070309020205020404" pitchFamily="49" charset="0"/>
+                          <a:cs typeface="Courier New" panose="02070309020205020404" pitchFamily="49" charset="0"/>
+                        </a:rPr>
+                        <a:t>^</a:t>
+                      </a:r>
+                    </a:p>
+                  </a:txBody>
+                  <a:tcPr marL="80580" marR="80580" marT="40290" marB="40290" anchor="ctr">
+                    <a:lnL w="12700" cap="flat" cmpd="sng" algn="ctr">
+                      <a:solidFill>
+                        <a:schemeClr val="tx1"/>
+                      </a:solidFill>
+                      <a:prstDash val="solid"/>
+                      <a:round/>
+                      <a:headEnd type="none" w="med" len="med"/>
+                      <a:tailEnd type="none" w="med" len="med"/>
+                    </a:lnL>
+                    <a:lnR w="12700" cap="flat" cmpd="sng" algn="ctr">
+                      <a:solidFill>
+                        <a:schemeClr val="tx1"/>
+                      </a:solidFill>
+                      <a:prstDash val="solid"/>
+                      <a:round/>
+                      <a:headEnd type="none" w="med" len="med"/>
+                      <a:tailEnd type="none" w="med" len="med"/>
+                    </a:lnR>
+                    <a:lnT w="12700" cap="flat" cmpd="sng" algn="ctr">
+                      <a:solidFill>
+                        <a:schemeClr val="tx1"/>
+                      </a:solidFill>
+                      <a:prstDash val="solid"/>
+                      <a:round/>
+                      <a:headEnd type="none" w="med" len="med"/>
+                      <a:tailEnd type="none" w="med" len="med"/>
+                    </a:lnT>
+                    <a:lnB w="12700" cap="flat" cmpd="sng" algn="ctr">
+                      <a:solidFill>
+                        <a:schemeClr val="tx1"/>
+                      </a:solidFill>
+                      <a:prstDash val="solid"/>
+                      <a:round/>
+                      <a:headEnd type="none" w="med" len="med"/>
+                      <a:tailEnd type="none" w="med" len="med"/>
+                    </a:lnB>
+                    <a:solidFill>
+                      <a:schemeClr val="accent5">
+                        <a:lumMod val="20000"/>
+                        <a:lumOff val="80000"/>
+                      </a:schemeClr>
+                    </a:solidFill>
+                  </a:tcPr>
+                </a:tc>
+                <a:extLst>
+                  <a:ext uri="{0D108BD9-81ED-4DB2-BD59-A6C34878D82A}">
+                    <a16:rowId xmlns:a16="http://schemas.microsoft.com/office/drawing/2014/main" val="751939433"/>
+                  </a:ext>
+                </a:extLst>
+              </a:tr>
+              <a:tr h="324928">
+                <a:tc>
+                  <a:txBody>
+                    <a:bodyPr/>
+                    <a:lstStyle/>
+                    <a:p>
+                      <a:pPr algn="ctr"/>
+                      <a:r>
+                        <a:rPr lang="da-DK" sz="2000" u="none" dirty="0">
+                          <a:latin typeface="Courier New" panose="02070309020205020404" pitchFamily="49" charset="0"/>
+                          <a:cs typeface="Courier New" panose="02070309020205020404" pitchFamily="49" charset="0"/>
+                        </a:rPr>
+                        <a:t>&amp;</a:t>
+                      </a:r>
+                    </a:p>
+                  </a:txBody>
+                  <a:tcPr marL="80580" marR="80580" marT="40290" marB="40290" anchor="ctr">
+                    <a:lnL w="12700" cap="flat" cmpd="sng" algn="ctr">
+                      <a:solidFill>
+                        <a:schemeClr val="tx1"/>
+                      </a:solidFill>
+                      <a:prstDash val="solid"/>
+                      <a:round/>
+                      <a:headEnd type="none" w="med" len="med"/>
+                      <a:tailEnd type="none" w="med" len="med"/>
+                    </a:lnL>
+                    <a:lnR w="12700" cap="flat" cmpd="sng" algn="ctr">
+                      <a:solidFill>
+                        <a:schemeClr val="tx1"/>
+                      </a:solidFill>
+                      <a:prstDash val="solid"/>
+                      <a:round/>
+                      <a:headEnd type="none" w="med" len="med"/>
+                      <a:tailEnd type="none" w="med" len="med"/>
+                    </a:lnR>
+                    <a:lnT w="12700" cap="flat" cmpd="sng" algn="ctr">
+                      <a:solidFill>
+                        <a:schemeClr val="tx1"/>
+                      </a:solidFill>
+                      <a:prstDash val="solid"/>
+                      <a:round/>
+                      <a:headEnd type="none" w="med" len="med"/>
+                      <a:tailEnd type="none" w="med" len="med"/>
+                    </a:lnT>
+                    <a:lnB w="12700" cap="flat" cmpd="sng" algn="ctr">
+                      <a:solidFill>
+                        <a:schemeClr val="tx1"/>
+                      </a:solidFill>
+                      <a:prstDash val="solid"/>
+                      <a:round/>
+                      <a:headEnd type="none" w="med" len="med"/>
+                      <a:tailEnd type="none" w="med" len="med"/>
+                    </a:lnB>
+                    <a:solidFill>
+                      <a:schemeClr val="accent5">
+                        <a:lumMod val="20000"/>
+                        <a:lumOff val="80000"/>
+                      </a:schemeClr>
+                    </a:solidFill>
+                  </a:tcPr>
+                </a:tc>
+                <a:extLst>
+                  <a:ext uri="{0D108BD9-81ED-4DB2-BD59-A6C34878D82A}">
+                    <a16:rowId xmlns:a16="http://schemas.microsoft.com/office/drawing/2014/main" val="3957012914"/>
+                  </a:ext>
+                </a:extLst>
+              </a:tr>
+              <a:tr h="324928">
+                <a:tc>
+                  <a:txBody>
+                    <a:bodyPr/>
+                    <a:lstStyle/>
+                    <a:p>
+                      <a:pPr algn="ctr"/>
+                      <a:r>
+                        <a:rPr lang="da-DK" sz="2000" u="none" dirty="0">
+                          <a:latin typeface="Courier New" panose="02070309020205020404" pitchFamily="49" charset="0"/>
+                          <a:cs typeface="Courier New" panose="02070309020205020404" pitchFamily="49" charset="0"/>
+                        </a:rPr>
+                        <a:t>&lt;&lt;</a:t>
+                      </a:r>
+                      <a:r>
+                        <a:rPr lang="da-DK" sz="2000" u="none" baseline="0" dirty="0">
+                          <a:latin typeface="Courier New" panose="02070309020205020404" pitchFamily="49" charset="0"/>
+                          <a:cs typeface="Courier New" panose="02070309020205020404" pitchFamily="49" charset="0"/>
+                        </a:rPr>
+                        <a:t>  </a:t>
+                      </a:r>
+                      <a:r>
+                        <a:rPr lang="da-DK" sz="2000" u="none" dirty="0">
+                          <a:latin typeface="Courier New" panose="02070309020205020404" pitchFamily="49" charset="0"/>
+                          <a:cs typeface="Courier New" panose="02070309020205020404" pitchFamily="49" charset="0"/>
+                        </a:rPr>
+                        <a:t> &gt;&gt;</a:t>
+                      </a:r>
+                    </a:p>
+                  </a:txBody>
+                  <a:tcPr marL="80580" marR="80580" marT="40290" marB="40290" anchor="ctr">
+                    <a:lnL w="12700" cap="flat" cmpd="sng" algn="ctr">
+                      <a:solidFill>
+                        <a:schemeClr val="tx1"/>
+                      </a:solidFill>
+                      <a:prstDash val="solid"/>
+                      <a:round/>
+                      <a:headEnd type="none" w="med" len="med"/>
+                      <a:tailEnd type="none" w="med" len="med"/>
+                    </a:lnL>
+                    <a:lnR w="12700" cap="flat" cmpd="sng" algn="ctr">
+                      <a:solidFill>
+                        <a:schemeClr val="tx1"/>
+                      </a:solidFill>
+                      <a:prstDash val="solid"/>
+                      <a:round/>
+                      <a:headEnd type="none" w="med" len="med"/>
+                      <a:tailEnd type="none" w="med" len="med"/>
+                    </a:lnR>
+                    <a:lnT w="12700" cap="flat" cmpd="sng" algn="ctr">
+                      <a:solidFill>
+                        <a:schemeClr val="tx1"/>
+                      </a:solidFill>
+                      <a:prstDash val="solid"/>
+                      <a:round/>
+                      <a:headEnd type="none" w="med" len="med"/>
+                      <a:tailEnd type="none" w="med" len="med"/>
+                    </a:lnT>
+                    <a:lnB w="12700" cap="flat" cmpd="sng" algn="ctr">
+                      <a:solidFill>
+                        <a:schemeClr val="tx1"/>
+                      </a:solidFill>
+                      <a:prstDash val="solid"/>
+                      <a:round/>
+                      <a:headEnd type="none" w="med" len="med"/>
+                      <a:tailEnd type="none" w="med" len="med"/>
+                    </a:lnB>
+                    <a:solidFill>
+                      <a:schemeClr val="accent5">
+                        <a:lumMod val="20000"/>
+                        <a:lumOff val="80000"/>
+                      </a:schemeClr>
+                    </a:solidFill>
+                  </a:tcPr>
+                </a:tc>
+                <a:extLst>
+                  <a:ext uri="{0D108BD9-81ED-4DB2-BD59-A6C34878D82A}">
+                    <a16:rowId xmlns:a16="http://schemas.microsoft.com/office/drawing/2014/main" val="672009882"/>
+                  </a:ext>
+                </a:extLst>
+              </a:tr>
+              <a:tr h="324928">
+                <a:tc>
+                  <a:txBody>
+                    <a:bodyPr/>
+                    <a:lstStyle/>
+                    <a:p>
+                      <a:pPr algn="ctr"/>
+                      <a:r>
+                        <a:rPr lang="da-DK" sz="2000" u="none" dirty="0">
+                          <a:latin typeface="Courier New" panose="02070309020205020404" pitchFamily="49" charset="0"/>
+                          <a:cs typeface="Courier New" panose="02070309020205020404" pitchFamily="49" charset="0"/>
+                        </a:rPr>
+                        <a:t>+</a:t>
+                      </a:r>
+                      <a:r>
+                        <a:rPr lang="da-DK" sz="2000" u="none" baseline="0" dirty="0">
+                          <a:latin typeface="Courier New" panose="02070309020205020404" pitchFamily="49" charset="0"/>
+                          <a:cs typeface="Courier New" panose="02070309020205020404" pitchFamily="49" charset="0"/>
+                        </a:rPr>
+                        <a:t>  </a:t>
+                      </a:r>
+                      <a:r>
+                        <a:rPr lang="da-DK" sz="2000" u="none" dirty="0">
+                          <a:latin typeface="Courier New" panose="02070309020205020404" pitchFamily="49" charset="0"/>
+                          <a:cs typeface="Courier New" panose="02070309020205020404" pitchFamily="49" charset="0"/>
+                        </a:rPr>
+                        <a:t> -</a:t>
+                      </a:r>
+                    </a:p>
+                  </a:txBody>
+                  <a:tcPr marL="80580" marR="80580" marT="40290" marB="40290" anchor="ctr">
+                    <a:lnL w="12700" cap="flat" cmpd="sng" algn="ctr">
+                      <a:solidFill>
+                        <a:schemeClr val="tx1"/>
+                      </a:solidFill>
+                      <a:prstDash val="solid"/>
+                      <a:round/>
+                      <a:headEnd type="none" w="med" len="med"/>
+                      <a:tailEnd type="none" w="med" len="med"/>
+                    </a:lnL>
+                    <a:lnR w="12700" cap="flat" cmpd="sng" algn="ctr">
+                      <a:solidFill>
+                        <a:schemeClr val="tx1"/>
+                      </a:solidFill>
+                      <a:prstDash val="solid"/>
+                      <a:round/>
+                      <a:headEnd type="none" w="med" len="med"/>
+                      <a:tailEnd type="none" w="med" len="med"/>
+                    </a:lnR>
+                    <a:lnT w="12700" cap="flat" cmpd="sng" algn="ctr">
+                      <a:solidFill>
+                        <a:schemeClr val="tx1"/>
+                      </a:solidFill>
+                      <a:prstDash val="solid"/>
+                      <a:round/>
+                      <a:headEnd type="none" w="med" len="med"/>
+                      <a:tailEnd type="none" w="med" len="med"/>
+                    </a:lnT>
+                    <a:lnB w="12700" cap="flat" cmpd="sng" algn="ctr">
+                      <a:solidFill>
+                        <a:schemeClr val="tx1"/>
+                      </a:solidFill>
+                      <a:prstDash val="solid"/>
+                      <a:round/>
+                      <a:headEnd type="none" w="med" len="med"/>
+                      <a:tailEnd type="none" w="med" len="med"/>
+                    </a:lnB>
+                    <a:solidFill>
+                      <a:schemeClr val="accent5">
+                        <a:lumMod val="20000"/>
+                        <a:lumOff val="80000"/>
+                      </a:schemeClr>
+                    </a:solidFill>
+                  </a:tcPr>
+                </a:tc>
+                <a:extLst>
+                  <a:ext uri="{0D108BD9-81ED-4DB2-BD59-A6C34878D82A}">
+                    <a16:rowId xmlns:a16="http://schemas.microsoft.com/office/drawing/2014/main" val="662020469"/>
+                  </a:ext>
+                </a:extLst>
+              </a:tr>
+              <a:tr h="564945">
+                <a:tc>
+                  <a:txBody>
+                    <a:bodyPr/>
+                    <a:lstStyle/>
+                    <a:p>
+                      <a:pPr algn="ctr"/>
+                      <a:r>
+                        <a:rPr lang="da-DK" sz="2000" u="none" dirty="0">
+                          <a:latin typeface="Courier New" panose="02070309020205020404" pitchFamily="49" charset="0"/>
+                          <a:cs typeface="Courier New" panose="02070309020205020404" pitchFamily="49" charset="0"/>
+                        </a:rPr>
+                        <a:t>*   @   </a:t>
+                      </a:r>
+                    </a:p>
+                    <a:p>
+                      <a:pPr algn="ctr"/>
+                      <a:r>
+                        <a:rPr lang="da-DK" sz="2000" u="none" dirty="0">
+                          <a:latin typeface="Courier New" panose="02070309020205020404" pitchFamily="49" charset="0"/>
+                          <a:cs typeface="Courier New" panose="02070309020205020404" pitchFamily="49" charset="0"/>
+                        </a:rPr>
+                        <a:t>/   //   %</a:t>
+                      </a:r>
+                    </a:p>
+                  </a:txBody>
+                  <a:tcPr marL="80580" marR="80580" marT="40290" marB="40290" anchor="ctr">
+                    <a:lnL w="12700" cap="flat" cmpd="sng" algn="ctr">
+                      <a:solidFill>
+                        <a:schemeClr val="tx1"/>
+                      </a:solidFill>
+                      <a:prstDash val="solid"/>
+                      <a:round/>
+                      <a:headEnd type="none" w="med" len="med"/>
+                      <a:tailEnd type="none" w="med" len="med"/>
+                    </a:lnL>
+                    <a:lnR w="12700" cap="flat" cmpd="sng" algn="ctr">
+                      <a:solidFill>
+                        <a:schemeClr val="tx1"/>
+                      </a:solidFill>
+                      <a:prstDash val="solid"/>
+                      <a:round/>
+                      <a:headEnd type="none" w="med" len="med"/>
+                      <a:tailEnd type="none" w="med" len="med"/>
+                    </a:lnR>
+                    <a:lnT w="12700" cap="flat" cmpd="sng" algn="ctr">
+                      <a:solidFill>
+                        <a:schemeClr val="tx1"/>
+                      </a:solidFill>
+                      <a:prstDash val="solid"/>
+                      <a:round/>
+                      <a:headEnd type="none" w="med" len="med"/>
+                      <a:tailEnd type="none" w="med" len="med"/>
+                    </a:lnT>
+                    <a:lnB w="12700" cap="flat" cmpd="sng" algn="ctr">
+                      <a:solidFill>
+                        <a:schemeClr val="tx1"/>
+                      </a:solidFill>
+                      <a:prstDash val="solid"/>
+                      <a:round/>
+                      <a:headEnd type="none" w="med" len="med"/>
+                      <a:tailEnd type="none" w="med" len="med"/>
+                    </a:lnB>
+                    <a:solidFill>
+                      <a:schemeClr val="accent5">
+                        <a:lumMod val="20000"/>
+                        <a:lumOff val="80000"/>
+                      </a:schemeClr>
+                    </a:solidFill>
+                  </a:tcPr>
+                </a:tc>
+                <a:extLst>
+                  <a:ext uri="{0D108BD9-81ED-4DB2-BD59-A6C34878D82A}">
+                    <a16:rowId xmlns:a16="http://schemas.microsoft.com/office/drawing/2014/main" val="2838861763"/>
+                  </a:ext>
+                </a:extLst>
+              </a:tr>
+              <a:tr h="0">
+                <a:tc>
+                  <a:txBody>
+                    <a:bodyPr/>
+                    <a:lstStyle/>
+                    <a:p>
+                      <a:pPr algn="ctr"/>
+                      <a:r>
+                        <a:rPr lang="da-DK" sz="2000" u="none" dirty="0">
+                          <a:latin typeface="Courier New" panose="02070309020205020404" pitchFamily="49" charset="0"/>
+                          <a:cs typeface="Courier New" panose="02070309020205020404" pitchFamily="49" charset="0"/>
+                        </a:rPr>
+                        <a:t>+</a:t>
+                      </a:r>
+                      <a:r>
+                        <a:rPr lang="da-DK" sz="2000" i="1" u="none" dirty="0">
+                          <a:latin typeface="Courier New" panose="02070309020205020404" pitchFamily="49" charset="0"/>
+                          <a:cs typeface="Courier New" panose="02070309020205020404" pitchFamily="49" charset="0"/>
+                        </a:rPr>
+                        <a:t>x</a:t>
+                      </a:r>
+                      <a:r>
+                        <a:rPr lang="da-DK" sz="2000" u="none" baseline="0" dirty="0">
+                          <a:latin typeface="Courier New" panose="02070309020205020404" pitchFamily="49" charset="0"/>
+                          <a:cs typeface="Courier New" panose="02070309020205020404" pitchFamily="49" charset="0"/>
+                        </a:rPr>
+                        <a:t>  </a:t>
+                      </a:r>
+                      <a:r>
+                        <a:rPr lang="da-DK" sz="2000" u="none" dirty="0">
+                          <a:latin typeface="Courier New" panose="02070309020205020404" pitchFamily="49" charset="0"/>
+                          <a:cs typeface="Courier New" panose="02070309020205020404" pitchFamily="49" charset="0"/>
+                        </a:rPr>
+                        <a:t> -</a:t>
+                      </a:r>
+                      <a:r>
+                        <a:rPr lang="da-DK" sz="2000" i="1" u="none" dirty="0">
+                          <a:latin typeface="Courier New" panose="02070309020205020404" pitchFamily="49" charset="0"/>
+                          <a:cs typeface="Courier New" panose="02070309020205020404" pitchFamily="49" charset="0"/>
+                        </a:rPr>
+                        <a:t>x</a:t>
+                      </a:r>
+                      <a:r>
+                        <a:rPr lang="da-DK" sz="2000" u="none" baseline="0" dirty="0">
+                          <a:latin typeface="Courier New" panose="02070309020205020404" pitchFamily="49" charset="0"/>
+                          <a:cs typeface="Courier New" panose="02070309020205020404" pitchFamily="49" charset="0"/>
+                        </a:rPr>
+                        <a:t>  </a:t>
+                      </a:r>
+                      <a:r>
+                        <a:rPr lang="da-DK" sz="2000" u="none" dirty="0">
+                          <a:latin typeface="Courier New" panose="02070309020205020404" pitchFamily="49" charset="0"/>
+                          <a:cs typeface="Courier New" panose="02070309020205020404" pitchFamily="49" charset="0"/>
+                        </a:rPr>
+                        <a:t> ~</a:t>
+                      </a:r>
+                      <a:r>
+                        <a:rPr lang="da-DK" sz="2000" i="1" u="none" dirty="0">
+                          <a:latin typeface="Courier New" panose="02070309020205020404" pitchFamily="49" charset="0"/>
+                          <a:cs typeface="Courier New" panose="02070309020205020404" pitchFamily="49" charset="0"/>
+                        </a:rPr>
+                        <a:t>x</a:t>
+                      </a:r>
+                    </a:p>
+                  </a:txBody>
+                  <a:tcPr marL="80580" marR="80580" marT="40290" marB="40290" anchor="ctr">
+                    <a:lnL w="12700" cap="flat" cmpd="sng" algn="ctr">
+                      <a:solidFill>
+                        <a:schemeClr val="tx1"/>
+                      </a:solidFill>
+                      <a:prstDash val="solid"/>
+                      <a:round/>
+                      <a:headEnd type="none" w="med" len="med"/>
+                      <a:tailEnd type="none" w="med" len="med"/>
+                    </a:lnL>
+                    <a:lnR w="12700" cap="flat" cmpd="sng" algn="ctr">
+                      <a:solidFill>
+                        <a:schemeClr val="tx1"/>
+                      </a:solidFill>
+                      <a:prstDash val="solid"/>
+                      <a:round/>
+                      <a:headEnd type="none" w="med" len="med"/>
+                      <a:tailEnd type="none" w="med" len="med"/>
+                    </a:lnR>
+                    <a:lnT w="12700" cap="flat" cmpd="sng" algn="ctr">
+                      <a:solidFill>
+                        <a:schemeClr val="tx1"/>
+                      </a:solidFill>
+                      <a:prstDash val="solid"/>
+                      <a:round/>
+                      <a:headEnd type="none" w="med" len="med"/>
+                      <a:tailEnd type="none" w="med" len="med"/>
+                    </a:lnT>
+                    <a:lnB w="12700" cap="flat" cmpd="sng" algn="ctr">
+                      <a:solidFill>
+                        <a:schemeClr val="tx1"/>
+                      </a:solidFill>
+                      <a:prstDash val="solid"/>
+                      <a:round/>
+                      <a:headEnd type="none" w="med" len="med"/>
+                      <a:tailEnd type="none" w="med" len="med"/>
+                    </a:lnB>
+                    <a:solidFill>
+                      <a:schemeClr val="accent5">
+                        <a:lumMod val="20000"/>
+                        <a:lumOff val="80000"/>
+                      </a:schemeClr>
+                    </a:solidFill>
+                  </a:tcPr>
+                </a:tc>
+                <a:extLst>
+                  <a:ext uri="{0D108BD9-81ED-4DB2-BD59-A6C34878D82A}">
+                    <a16:rowId xmlns:a16="http://schemas.microsoft.com/office/drawing/2014/main" val="1553472579"/>
+                  </a:ext>
+                </a:extLst>
+              </a:tr>
+              <a:tr h="324928">
+                <a:tc>
+                  <a:txBody>
+                    <a:bodyPr/>
+                    <a:lstStyle/>
+                    <a:p>
+                      <a:pPr algn="ctr"/>
+                      <a:r>
+                        <a:rPr lang="da-DK" sz="2000" u="none" dirty="0">
+                          <a:latin typeface="Courier New" panose="02070309020205020404" pitchFamily="49" charset="0"/>
+                          <a:cs typeface="Courier New" panose="02070309020205020404" pitchFamily="49" charset="0"/>
+                        </a:rPr>
+                        <a:t>**</a:t>
+                      </a:r>
+                    </a:p>
+                  </a:txBody>
+                  <a:tcPr marL="80580" marR="80580" marT="40290" marB="40290" anchor="ctr">
+                    <a:lnL w="12700" cap="flat" cmpd="sng" algn="ctr">
+                      <a:solidFill>
+                        <a:schemeClr val="tx1"/>
+                      </a:solidFill>
+                      <a:prstDash val="solid"/>
+                      <a:round/>
+                      <a:headEnd type="none" w="med" len="med"/>
+                      <a:tailEnd type="none" w="med" len="med"/>
+                    </a:lnL>
+                    <a:lnR w="12700" cap="flat" cmpd="sng" algn="ctr">
+                      <a:solidFill>
+                        <a:schemeClr val="tx1"/>
+                      </a:solidFill>
+                      <a:prstDash val="solid"/>
+                      <a:round/>
+                      <a:headEnd type="none" w="med" len="med"/>
+                      <a:tailEnd type="none" w="med" len="med"/>
+                    </a:lnR>
+                    <a:lnT w="12700" cap="flat" cmpd="sng" algn="ctr">
+                      <a:solidFill>
+                        <a:schemeClr val="tx1"/>
+                      </a:solidFill>
+                      <a:prstDash val="solid"/>
+                      <a:round/>
+                      <a:headEnd type="none" w="med" len="med"/>
+                      <a:tailEnd type="none" w="med" len="med"/>
+                    </a:lnT>
+                    <a:lnB w="12700" cap="flat" cmpd="sng" algn="ctr">
+                      <a:solidFill>
+                        <a:schemeClr val="tx1"/>
+                      </a:solidFill>
+                      <a:prstDash val="solid"/>
+                      <a:round/>
+                      <a:headEnd type="none" w="med" len="med"/>
+                      <a:tailEnd type="none" w="med" len="med"/>
+                    </a:lnB>
+                    <a:solidFill>
+                      <a:schemeClr val="accent5">
+                        <a:lumMod val="20000"/>
+                        <a:lumOff val="80000"/>
+                      </a:schemeClr>
+                    </a:solidFill>
+                  </a:tcPr>
+                </a:tc>
+                <a:extLst>
+                  <a:ext uri="{0D108BD9-81ED-4DB2-BD59-A6C34878D82A}">
+                    <a16:rowId xmlns:a16="http://schemas.microsoft.com/office/drawing/2014/main" val="1975563258"/>
+                  </a:ext>
+                </a:extLst>
+              </a:tr>
+            </a:tbl>
+          </a:graphicData>
+        </a:graphic>
+      </p:graphicFrame>
+      <p:sp>
+        <p:nvSpPr>
+          <p:cNvPr id="5" name="Rectangle 4"/>
+          <p:cNvSpPr/>
+          <p:nvPr/>
+        </p:nvSpPr>
+        <p:spPr>
+          <a:xfrm>
+            <a:off x="184332" y="6438395"/>
+            <a:ext cx="4579395" cy="369332"/>
+          </a:xfrm>
+          <a:prstGeom prst="rect">
+            <a:avLst/>
+          </a:prstGeom>
+        </p:spPr>
+        <p:txBody>
+          <a:bodyPr wrap="none">
+            <a:spAutoFit/>
+          </a:bodyPr>
+          <a:lstStyle/>
+          <a:p>
+            <a:r>
+              <a:rPr lang="en-US" dirty="0">
+                <a:hlinkClick r:id="rId3"/>
+              </a:rPr>
+              <a:t>docs.python.org/3/reference/expressions.html</a:t>
+            </a:r>
+            <a:endParaRPr lang="en-US" dirty="0"/>
+          </a:p>
+        </p:txBody>
+      </p:sp>
+    </p:spTree>
+    <p:extLst>
+      <p:ext uri="{BB962C8B-B14F-4D97-AF65-F5344CB8AC3E}">
+        <p14:creationId xmlns:p14="http://schemas.microsoft.com/office/powerpoint/2010/main" val="3996596200"/>
+      </p:ext>
+    </p:extLst>
+  </p:cSld>
+  <p:clrMapOvr>
+    <a:masterClrMapping/>
+  </p:clrMapOvr>
+</p:sld>
+</file>
+
+<file path=ppt/slides/slide26.xml><?xml version="1.0" encoding="utf-8"?>
+<p:sld xmlns:a="http://schemas.openxmlformats.org/drawingml/2006/main" xmlns:r="http://schemas.openxmlformats.org/officeDocument/2006/relationships" xmlns:p="http://schemas.openxmlformats.org/presentationml/2006/main">
+  <p:cSld>
+    <p:spTree>
+      <p:nvGrpSpPr>
+        <p:cNvPr id="1" name=""/>
+        <p:cNvGrpSpPr/>
+        <p:nvPr/>
+      </p:nvGrpSpPr>
+      <p:grpSpPr>
+        <a:xfrm>
+          <a:off x="0" y="0"/>
+          <a:ext cx="0" cy="0"/>
+          <a:chOff x="0" y="0"/>
+          <a:chExt cx="0" cy="0"/>
+        </a:xfrm>
+      </p:grpSpPr>
+      <p:sp>
+        <p:nvSpPr>
+          <p:cNvPr id="2" name="Title 1"/>
+          <p:cNvSpPr>
+            <a:spLocks noGrp="1"/>
+          </p:cNvSpPr>
+          <p:nvPr>
+            <p:ph type="title"/>
+          </p:nvPr>
+        </p:nvSpPr>
+        <p:spPr/>
+        <p:txBody>
+          <a:bodyPr/>
+          <a:lstStyle/>
+          <a:p>
+            <a:r>
+              <a:rPr lang="en-US" dirty="0"/>
               <a:t>Long expressions</a:t>
             </a:r>
           </a:p>
@@ -24857,7 +25942,7 @@
 </p:sld>
 </file>
 
-<file path=ppt/slides/slide26.xml><?xml version="1.0" encoding="utf-8"?>
+<file path=ppt/slides/slide27.xml><?xml version="1.0" encoding="utf-8"?>
 <p:sld xmlns:a="http://schemas.openxmlformats.org/drawingml/2006/main" xmlns:r="http://schemas.openxmlformats.org/officeDocument/2006/relationships" xmlns:p="http://schemas.openxmlformats.org/presentationml/2006/main">
   <p:cSld>
     <p:spTree>
@@ -25343,7 +26428,7 @@
 </p:sld>
 </file>
 
-<file path=ppt/slides/slide27.xml><?xml version="1.0" encoding="utf-8"?>
+<file path=ppt/slides/slide28.xml><?xml version="1.0" encoding="utf-8"?>
 <p:sld xmlns:a="http://schemas.openxmlformats.org/drawingml/2006/main" xmlns:r="http://schemas.openxmlformats.org/officeDocument/2006/relationships" xmlns:p="http://schemas.openxmlformats.org/presentationml/2006/main">
   <p:cSld>
     <p:spTree>

</xml_diff>

<commit_message>
all-slides-with-answers.pdf all-slides.pdf lists.pdf lists.pptx operations.pdf operations.pptx
</commit_message>
<xml_diff>
--- a/ipsa/slides/operations.pptx
+++ b/ipsa/slides/operations.pptx
@@ -145,7 +145,7 @@
 <file path=ppt/revisionInfo.xml><?xml version="1.0" encoding="utf-8"?>
 <p1510:revInfo xmlns:a="http://schemas.openxmlformats.org/drawingml/2006/main" xmlns:r="http://schemas.openxmlformats.org/officeDocument/2006/relationships" xmlns:p1510="http://schemas.microsoft.com/office/powerpoint/2015/10/main">
   <p1510:revLst>
-    <p1510:client id="{30B24765-B06B-490D-A3A5-6C11ABC1C1E5}" v="189" dt="2026-02-01T21:42:02.920"/>
+    <p1510:client id="{87E65862-5A4D-4BC3-B535-35C8930C2FE3}" v="1" dt="2026-02-03T19:24:05.955"/>
   </p1510:revLst>
 </p1510:revInfo>
 </file>
@@ -249,6 +249,44 @@
       </pc:sldChg>
     </pc:docChg>
   </pc:docChgLst>
+  <pc:docChgLst>
+    <pc:chgData name="Gerth Stølting Brodal" userId="04ef4784-6591-4f86-a140-f5c3b108582a" providerId="ADAL" clId="{73BAC7D6-516A-44B5-B4B0-C7B08CA8B392}"/>
+    <pc:docChg chg="undo custSel modSld">
+      <pc:chgData name="Gerth Stølting Brodal" userId="04ef4784-6591-4f86-a140-f5c3b108582a" providerId="ADAL" clId="{73BAC7D6-516A-44B5-B4B0-C7B08CA8B392}" dt="2026-02-03T19:38:20.350" v="163" actId="20577"/>
+      <pc:docMkLst>
+        <pc:docMk/>
+      </pc:docMkLst>
+      <pc:sldChg chg="modNotesTx">
+        <pc:chgData name="Gerth Stølting Brodal" userId="04ef4784-6591-4f86-a140-f5c3b108582a" providerId="ADAL" clId="{73BAC7D6-516A-44B5-B4B0-C7B08CA8B392}" dt="2026-02-03T19:38:20.350" v="163" actId="20577"/>
+        <pc:sldMkLst>
+          <pc:docMk/>
+          <pc:sldMk cId="1674286268" sldId="391"/>
+        </pc:sldMkLst>
+      </pc:sldChg>
+      <pc:sldChg chg="modNotesTx">
+        <pc:chgData name="Gerth Stølting Brodal" userId="04ef4784-6591-4f86-a140-f5c3b108582a" providerId="ADAL" clId="{73BAC7D6-516A-44B5-B4B0-C7B08CA8B392}" dt="2026-02-03T19:24:22.306" v="73" actId="20577"/>
+        <pc:sldMkLst>
+          <pc:docMk/>
+          <pc:sldMk cId="207293764" sldId="435"/>
+        </pc:sldMkLst>
+      </pc:sldChg>
+      <pc:sldChg chg="modSp mod">
+        <pc:chgData name="Gerth Stølting Brodal" userId="04ef4784-6591-4f86-a140-f5c3b108582a" providerId="ADAL" clId="{73BAC7D6-516A-44B5-B4B0-C7B08CA8B392}" dt="2026-02-03T19:35:51.149" v="119" actId="20577"/>
+        <pc:sldMkLst>
+          <pc:docMk/>
+          <pc:sldMk cId="3203409752" sldId="440"/>
+        </pc:sldMkLst>
+        <pc:spChg chg="mod">
+          <ac:chgData name="Gerth Stølting Brodal" userId="04ef4784-6591-4f86-a140-f5c3b108582a" providerId="ADAL" clId="{73BAC7D6-516A-44B5-B4B0-C7B08CA8B392}" dt="2026-02-03T19:35:51.149" v="119" actId="20577"/>
+          <ac:spMkLst>
+            <pc:docMk/>
+            <pc:sldMk cId="3203409752" sldId="440"/>
+            <ac:spMk id="3" creationId="{00000000-0000-0000-0000-000000000000}"/>
+          </ac:spMkLst>
+        </pc:spChg>
+      </pc:sldChg>
+    </pc:docChg>
+  </pc:docChgLst>
 </pc:chgInfo>
 </file>
 
@@ -334,7 +372,7 @@
           <a:p>
             <a:fld id="{FB1A172F-81D4-4DC4-9113-1DBD56EC3646}" type="datetimeFigureOut">
               <a:rPr lang="en-US" smtClean="0"/>
-              <a:t>2/1/2026</a:t>
+              <a:t>2/3/2026</a:t>
             </a:fld>
             <a:endParaRPr lang="en-US"/>
           </a:p>
@@ -1912,6 +1950,93 @@
           <a:bodyPr/>
           <a:lstStyle/>
           <a:p>
+            <a:r>
+              <a:rPr lang="en-US" dirty="0"/>
+              <a:t>Python does not have a  x++ operator</a:t>
+            </a:r>
+          </a:p>
+        </p:txBody>
+      </p:sp>
+      <p:sp>
+        <p:nvSpPr>
+          <p:cNvPr id="4" name="Slide Number Placeholder 3"/>
+          <p:cNvSpPr>
+            <a:spLocks noGrp="1"/>
+          </p:cNvSpPr>
+          <p:nvPr>
+            <p:ph type="sldNum" sz="quarter" idx="5"/>
+          </p:nvPr>
+        </p:nvSpPr>
+        <p:spPr/>
+        <p:txBody>
+          <a:bodyPr/>
+          <a:lstStyle/>
+          <a:p>
+            <a:fld id="{CD563DD8-32AB-41BE-B1C6-8EAC45222ACE}" type="slidenum">
+              <a:rPr lang="en-US" smtClean="0"/>
+              <a:t>27</a:t>
+            </a:fld>
+            <a:endParaRPr lang="en-US"/>
+          </a:p>
+        </p:txBody>
+      </p:sp>
+    </p:spTree>
+    <p:extLst>
+      <p:ext uri="{BB962C8B-B14F-4D97-AF65-F5344CB8AC3E}">
+        <p14:creationId xmlns:p14="http://schemas.microsoft.com/office/powerpoint/2010/main" val="3783014399"/>
+      </p:ext>
+    </p:extLst>
+  </p:cSld>
+  <p:clrMapOvr>
+    <a:masterClrMapping/>
+  </p:clrMapOvr>
+</p:notes>
+</file>
+
+<file path=ppt/notesSlides/notesSlide16.xml><?xml version="1.0" encoding="utf-8"?>
+<p:notes xmlns:a="http://schemas.openxmlformats.org/drawingml/2006/main" xmlns:r="http://schemas.openxmlformats.org/officeDocument/2006/relationships" xmlns:p="http://schemas.openxmlformats.org/presentationml/2006/main">
+  <p:cSld>
+    <p:spTree>
+      <p:nvGrpSpPr>
+        <p:cNvPr id="1" name=""/>
+        <p:cNvGrpSpPr/>
+        <p:nvPr/>
+      </p:nvGrpSpPr>
+      <p:grpSpPr>
+        <a:xfrm>
+          <a:off x="0" y="0"/>
+          <a:ext cx="0" cy="0"/>
+          <a:chOff x="0" y="0"/>
+          <a:chExt cx="0" cy="0"/>
+        </a:xfrm>
+      </p:grpSpPr>
+      <p:sp>
+        <p:nvSpPr>
+          <p:cNvPr id="2" name="Slide Image Placeholder 1"/>
+          <p:cNvSpPr>
+            <a:spLocks noGrp="1" noRot="1" noChangeAspect="1"/>
+          </p:cNvSpPr>
+          <p:nvPr>
+            <p:ph type="sldImg"/>
+          </p:nvPr>
+        </p:nvSpPr>
+        <p:spPr/>
+      </p:sp>
+      <p:sp>
+        <p:nvSpPr>
+          <p:cNvPr id="3" name="Notes Placeholder 2"/>
+          <p:cNvSpPr>
+            <a:spLocks noGrp="1"/>
+          </p:cNvSpPr>
+          <p:nvPr>
+            <p:ph type="body" idx="1"/>
+          </p:nvPr>
+        </p:nvSpPr>
+        <p:spPr/>
+        <p:txBody>
+          <a:bodyPr/>
+          <a:lstStyle/>
+          <a:p>
             <a:pPr marL="0" marR="0" lvl="0" indent="0" algn="l" defTabSz="914400" rtl="0" eaLnBrk="1" fontAlgn="auto" latinLnBrk="0" hangingPunct="1">
               <a:lnSpc>
                 <a:spcPct val="100000"/>
@@ -2886,6 +3011,18 @@
         <p:txBody>
           <a:bodyPr/>
           <a:lstStyle/>
+          <a:p>
+            <a:r>
+              <a:rPr lang="en-US" dirty="0"/>
+              <a:t>Chained comparisons do not need to be the same comparator, e.g.</a:t>
+            </a:r>
+          </a:p>
+          <a:p>
+            <a:r>
+              <a:rPr lang="en-US" dirty="0"/>
+              <a:t>print(1 &lt; 3 &gt; 2 == 2.0 &lt; 7 != 4 &gt; 3)</a:t>
+            </a:r>
+          </a:p>
           <a:p>
             <a:endParaRPr lang="en-US" dirty="0"/>
           </a:p>
@@ -3064,7 +3201,7 @@
           <a:p>
             <a:fld id="{0560A9CD-0304-4E0B-9E82-E7E0115DE05B}" type="datetimeFigureOut">
               <a:rPr lang="en-US" smtClean="0"/>
-              <a:t>2/1/2026</a:t>
+              <a:t>2/3/2026</a:t>
             </a:fld>
             <a:endParaRPr lang="en-US"/>
           </a:p>
@@ -3232,7 +3369,7 @@
           <a:p>
             <a:fld id="{0560A9CD-0304-4E0B-9E82-E7E0115DE05B}" type="datetimeFigureOut">
               <a:rPr lang="en-US" smtClean="0"/>
-              <a:t>2/1/2026</a:t>
+              <a:t>2/3/2026</a:t>
             </a:fld>
             <a:endParaRPr lang="en-US"/>
           </a:p>
@@ -3410,7 +3547,7 @@
           <a:p>
             <a:fld id="{0560A9CD-0304-4E0B-9E82-E7E0115DE05B}" type="datetimeFigureOut">
               <a:rPr lang="en-US" smtClean="0"/>
-              <a:t>2/1/2026</a:t>
+              <a:t>2/3/2026</a:t>
             </a:fld>
             <a:endParaRPr lang="en-US"/>
           </a:p>
@@ -3587,7 +3724,7 @@
           <a:p>
             <a:fld id="{0560A9CD-0304-4E0B-9E82-E7E0115DE05B}" type="datetimeFigureOut">
               <a:rPr lang="en-US" smtClean="0"/>
-              <a:t>2/1/2026</a:t>
+              <a:t>2/3/2026</a:t>
             </a:fld>
             <a:endParaRPr lang="en-US"/>
           </a:p>
@@ -3832,7 +3969,7 @@
           <a:p>
             <a:fld id="{0560A9CD-0304-4E0B-9E82-E7E0115DE05B}" type="datetimeFigureOut">
               <a:rPr lang="en-US" smtClean="0"/>
-              <a:t>2/1/2026</a:t>
+              <a:t>2/3/2026</a:t>
             </a:fld>
             <a:endParaRPr lang="en-US"/>
           </a:p>
@@ -4061,7 +4198,7 @@
           <a:p>
             <a:fld id="{0560A9CD-0304-4E0B-9E82-E7E0115DE05B}" type="datetimeFigureOut">
               <a:rPr lang="en-US" smtClean="0"/>
-              <a:t>2/1/2026</a:t>
+              <a:t>2/3/2026</a:t>
             </a:fld>
             <a:endParaRPr lang="en-US"/>
           </a:p>
@@ -4425,7 +4562,7 @@
           <a:p>
             <a:fld id="{0560A9CD-0304-4E0B-9E82-E7E0115DE05B}" type="datetimeFigureOut">
               <a:rPr lang="en-US" smtClean="0"/>
-              <a:t>2/1/2026</a:t>
+              <a:t>2/3/2026</a:t>
             </a:fld>
             <a:endParaRPr lang="en-US"/>
           </a:p>
@@ -4542,7 +4679,7 @@
           <a:p>
             <a:fld id="{0560A9CD-0304-4E0B-9E82-E7E0115DE05B}" type="datetimeFigureOut">
               <a:rPr lang="en-US" smtClean="0"/>
-              <a:t>2/1/2026</a:t>
+              <a:t>2/3/2026</a:t>
             </a:fld>
             <a:endParaRPr lang="en-US"/>
           </a:p>
@@ -4637,7 +4774,7 @@
           <a:p>
             <a:fld id="{0560A9CD-0304-4E0B-9E82-E7E0115DE05B}" type="datetimeFigureOut">
               <a:rPr lang="en-US" smtClean="0"/>
-              <a:t>2/1/2026</a:t>
+              <a:t>2/3/2026</a:t>
             </a:fld>
             <a:endParaRPr lang="en-US"/>
           </a:p>
@@ -4912,7 +5049,7 @@
           <a:p>
             <a:fld id="{0560A9CD-0304-4E0B-9E82-E7E0115DE05B}" type="datetimeFigureOut">
               <a:rPr lang="en-US" smtClean="0"/>
-              <a:t>2/1/2026</a:t>
+              <a:t>2/3/2026</a:t>
             </a:fld>
             <a:endParaRPr lang="en-US"/>
           </a:p>
@@ -5164,7 +5301,7 @@
           <a:p>
             <a:fld id="{0560A9CD-0304-4E0B-9E82-E7E0115DE05B}" type="datetimeFigureOut">
               <a:rPr lang="en-US" smtClean="0"/>
-              <a:t>2/1/2026</a:t>
+              <a:t>2/3/2026</a:t>
             </a:fld>
             <a:endParaRPr lang="en-US"/>
           </a:p>
@@ -5375,7 +5512,7 @@
           <a:p>
             <a:fld id="{0560A9CD-0304-4E0B-9E82-E7E0115DE05B}" type="datetimeFigureOut">
               <a:rPr lang="en-US" smtClean="0"/>
-              <a:t>2/1/2026</a:t>
+              <a:t>2/3/2026</a:t>
             </a:fld>
             <a:endParaRPr lang="en-US"/>
           </a:p>
@@ -24827,8 +24964,23 @@
                 </a:solidFill>
                 <a:latin typeface="Courier"/>
               </a:rPr>
-              <a:t>s[3] = "x"</a:t>
-            </a:r>
+              <a:t>      s[3] = "x"     </a:t>
+            </a:r>
+            <a:r>
+              <a:rPr lang="en-US" i="1" dirty="0" err="1">
+                <a:solidFill>
+                  <a:srgbClr val="C00000"/>
+                </a:solidFill>
+                <a:latin typeface="Courier"/>
+              </a:rPr>
+              <a:t>TypeError</a:t>
+            </a:r>
+            <a:endParaRPr lang="en-US" i="1" dirty="0">
+              <a:solidFill>
+                <a:srgbClr val="C00000"/>
+              </a:solidFill>
+              <a:latin typeface="Courier"/>
+            </a:endParaRPr>
           </a:p>
           <a:p>
             <a:pPr>

</xml_diff>